<commit_message>
Agregando Mod10 Ejercicio teorico de implementacion de gobierno de datos
</commit_message>
<xml_diff>
--- a/Mod10_Implementacion_programa_gobiermo_datos.pptx
+++ b/Mod10_Implementacion_programa_gobiermo_datos.pptx
@@ -5,7 +5,7 @@
     <p:sldMasterId id="2147483648" r:id="rId1"/>
   </p:sldMasterIdLst>
   <p:notesMasterIdLst>
-    <p:notesMasterId r:id="rId10"/>
+    <p:notesMasterId r:id="rId11"/>
   </p:notesMasterIdLst>
   <p:sldIdLst>
     <p:sldId id="256" r:id="rId2"/>
@@ -15,7 +15,8 @@
     <p:sldId id="2147374930" r:id="rId6"/>
     <p:sldId id="2147374929" r:id="rId7"/>
     <p:sldId id="2147374932" r:id="rId8"/>
-    <p:sldId id="2147374933" r:id="rId9"/>
+    <p:sldId id="2147374934" r:id="rId9"/>
+    <p:sldId id="2147374933" r:id="rId10"/>
   </p:sldIdLst>
   <p:sldSz cx="12192000" cy="6858000"/>
   <p:notesSz cx="6858000" cy="9144000"/>
@@ -264,7 +265,7 @@
       </p15:sldGuideLst>
     </p:ext>
     <p:ext uri="GoogleSlidesCustomDataVersion2">
-      <go:slidesCustomData xmlns="" xmlns:mc="http://schemas.openxmlformats.org/markup-compatibility/2006" xmlns:mv="urn:schemas-microsoft-com:mac:vml" xmlns:c="http://schemas.openxmlformats.org/drawingml/2006/chart" xmlns:dgm="http://schemas.openxmlformats.org/drawingml/2006/diagram" xmlns:o="urn:schemas-microsoft-com:office:office" xmlns:v="urn:schemas-microsoft-com:vml" xmlns:pvml="urn:schemas-microsoft-com:office:powerpoint" xmlns:com="http://schemas.openxmlformats.org/drawingml/2006/compatibility" xmlns:p14="http://schemas.microsoft.com/office/powerpoint/2010/main" xmlns:p15="http://schemas.microsoft.com/office/powerpoint/2012/main" xmlns:ahyp="http://schemas.microsoft.com/office/drawing/2018/hyperlinkcolor" xmlns:go="http://customooxmlschemas.google.com/" r:id="rId11" roundtripDataSignature="AMtx7mgHnMHIZxhnZr2j+tVR2DpQdbinhg=="/>
+      <go:slidesCustomData xmlns:go="http://customooxmlschemas.google.com/" xmlns:ahyp="http://schemas.microsoft.com/office/drawing/2018/hyperlinkcolor" xmlns:p15="http://schemas.microsoft.com/office/powerpoint/2012/main" xmlns:p14="http://schemas.microsoft.com/office/powerpoint/2010/main" xmlns:com="http://schemas.openxmlformats.org/drawingml/2006/compatibility" xmlns:pvml="urn:schemas-microsoft-com:office:powerpoint" xmlns:v="urn:schemas-microsoft-com:vml" xmlns:o="urn:schemas-microsoft-com:office:office" xmlns:dgm="http://schemas.openxmlformats.org/drawingml/2006/diagram" xmlns:c="http://schemas.openxmlformats.org/drawingml/2006/chart" xmlns:mv="urn:schemas-microsoft-com:mac:vml" xmlns:mc="http://schemas.openxmlformats.org/markup-compatibility/2006" xmlns="" r:id="rId12" roundtripDataSignature="AMtx7mgHnMHIZxhnZr2j+tVR2DpQdbinhg=="/>
     </p:ext>
   </p:extLst>
 </p:presentation>
@@ -1233,7 +1234,7 @@
                 <a:cs typeface="Calibri"/>
                 <a:sym typeface="Calibri"/>
               </a:rPr>
-              <a:t>‹Nº›</a:t>
+              <a:t>‹#›</a:t>
             </a:fld>
             <a:endParaRPr sz="1200" b="0" i="0" u="none" strike="noStrike" cap="none">
               <a:solidFill>
@@ -2663,7 +2664,7 @@
             </a:pPr>
             <a:fld id="{00000000-1234-1234-1234-123412341234}" type="slidenum">
               <a:rPr lang="es-MX"/>
-              <a:t>‹Nº›</a:t>
+              <a:t>‹#›</a:t>
             </a:fld>
             <a:endParaRPr/>
           </a:p>
@@ -3053,7 +3054,7 @@
             </a:pPr>
             <a:fld id="{00000000-1234-1234-1234-123412341234}" type="slidenum">
               <a:rPr lang="es-MX"/>
-              <a:t>‹Nº›</a:t>
+              <a:t>‹#›</a:t>
             </a:fld>
             <a:endParaRPr/>
           </a:p>
@@ -5002,7 +5003,7 @@
             </a:pPr>
             <a:fld id="{00000000-1234-1234-1234-123412341234}" type="slidenum">
               <a:rPr lang="es-MX"/>
-              <a:t>‹Nº›</a:t>
+              <a:t>‹#›</a:t>
             </a:fld>
             <a:endParaRPr/>
           </a:p>
@@ -5906,7 +5907,7 @@
             </a:pPr>
             <a:fld id="{00000000-1234-1234-1234-123412341234}" type="slidenum">
               <a:rPr lang="es-MX"/>
-              <a:t>‹Nº›</a:t>
+              <a:t>‹#›</a:t>
             </a:fld>
             <a:endParaRPr/>
           </a:p>
@@ -6809,7 +6810,7 @@
             </a:pPr>
             <a:fld id="{00000000-1234-1234-1234-123412341234}" type="slidenum">
               <a:rPr lang="es-MX"/>
-              <a:t>‹Nº›</a:t>
+              <a:t>‹#›</a:t>
             </a:fld>
             <a:endParaRPr/>
           </a:p>
@@ -7741,7 +7742,7 @@
             </a:pPr>
             <a:fld id="{00000000-1234-1234-1234-123412341234}" type="slidenum">
               <a:rPr lang="es-MX"/>
-              <a:t>‹Nº›</a:t>
+              <a:t>‹#›</a:t>
             </a:fld>
             <a:endParaRPr/>
           </a:p>
@@ -8575,6 +8576,15 @@
             <a:r>
               <a:rPr lang="es-MX" sz="3200" b="1" dirty="0">
                 <a:latin typeface="Arial"/>
+                <a:ea typeface="Arial"/>
+                <a:cs typeface="Arial"/>
+                <a:sym typeface="Arial"/>
+              </a:rPr>
+              <a:t>Modulo 10 </a:t>
+            </a:r>
+            <a:r>
+              <a:rPr lang="es-MX" sz="3200" b="1" dirty="0">
+                <a:latin typeface="Arial"/>
                 <a:cs typeface="Arial"/>
               </a:rPr>
               <a:t>Implementación del Programa de Gobierno de Datos</a:t>
@@ -8819,7 +8829,29 @@
                 <a:cs typeface="Arial"/>
                 <a:sym typeface="Arial"/>
               </a:rPr>
-              <a:t>Definición de beneficios para el negocio</a:t>
+              <a:t>Definición de beneficios para el negocio y </a:t>
+            </a:r>
+            <a:r>
+              <a:rPr lang="es-ES" dirty="0" err="1">
+                <a:solidFill>
+                  <a:srgbClr val="373A3C"/>
+                </a:solidFill>
+                <a:latin typeface="Arial"/>
+                <a:cs typeface="Arial"/>
+                <a:sym typeface="Arial"/>
+              </a:rPr>
+              <a:t>roadmap</a:t>
+            </a:r>
+            <a:r>
+              <a:rPr lang="es-ES" dirty="0">
+                <a:solidFill>
+                  <a:srgbClr val="373A3C"/>
+                </a:solidFill>
+                <a:latin typeface="Arial"/>
+                <a:cs typeface="Arial"/>
+                <a:sym typeface="Arial"/>
+              </a:rPr>
+              <a:t> de implementación</a:t>
             </a:r>
             <a:endParaRPr dirty="0">
               <a:solidFill>
@@ -9587,9 +9619,10 @@
           <a:p>
             <a:pPr algn="ctr"/>
             <a:r>
-              <a:rPr lang="en-US" sz="1200" b="1" dirty="0"/>
-              <a:t>Theme</a:t>
-            </a:r>
+              <a:rPr lang="en-US" sz="1200" b="1" dirty="0" err="1"/>
+              <a:t>Aspecto</a:t>
+            </a:r>
+            <a:endParaRPr lang="en-US" sz="1200" b="1" dirty="0"/>
           </a:p>
         </p:txBody>
       </p:sp>
@@ -12549,9 +12582,10 @@
           <a:p>
             <a:pPr algn="ctr"/>
             <a:r>
-              <a:rPr lang="en-US" sz="1200" b="1" dirty="0"/>
-              <a:t>Theme</a:t>
-            </a:r>
+              <a:rPr lang="en-US" sz="1200" b="1" dirty="0" err="1"/>
+              <a:t>Aspecto</a:t>
+            </a:r>
+            <a:endParaRPr lang="en-US" sz="1200" b="1" dirty="0"/>
           </a:p>
         </p:txBody>
       </p:sp>
@@ -14736,7 +14770,7 @@
             </a:r>
             <a:r>
               <a:rPr lang="es-MX" sz="2400" dirty="0"/>
-              <a:t> parece ser la mejor opción si es que la empresa no tiene ya sistemas en SAP o IBM </a:t>
+              <a:t> se perfila como la mejor opción para MDM si es que la empresa no tiene ya sistemas en SAP o IBM </a:t>
             </a:r>
           </a:p>
         </p:txBody>
@@ -14790,9 +14824,10 @@
           <a:p>
             <a:pPr algn="ctr"/>
             <a:r>
-              <a:rPr lang="en-US" sz="1200" b="1" dirty="0"/>
-              <a:t>Theme</a:t>
-            </a:r>
+              <a:rPr lang="en-US" sz="1200" b="1" dirty="0" err="1"/>
+              <a:t>Aspecto</a:t>
+            </a:r>
+            <a:endParaRPr lang="en-US" sz="1200" b="1" dirty="0"/>
           </a:p>
         </p:txBody>
       </p:sp>
@@ -20799,6 +20834,59 @@
           </a:extLst>
         </p:spPr>
       </p:pic>
+      <p:sp>
+        <p:nvSpPr>
+          <p:cNvPr id="26" name="Rectangle 25">
+            <a:extLst>
+              <a:ext uri="{FF2B5EF4-FFF2-40B4-BE49-F238E27FC236}">
+                <a16:creationId xmlns:a16="http://schemas.microsoft.com/office/drawing/2014/main" id="{8605E68C-8EDA-111D-9E1A-B96D26890F3B}"/>
+              </a:ext>
+            </a:extLst>
+          </p:cNvPr>
+          <p:cNvSpPr/>
+          <p:nvPr/>
+        </p:nvSpPr>
+        <p:spPr>
+          <a:xfrm>
+            <a:off x="1897803" y="1072891"/>
+            <a:ext cx="2101726" cy="5164553"/>
+          </a:xfrm>
+          <a:prstGeom prst="rect">
+            <a:avLst/>
+          </a:prstGeom>
+          <a:noFill/>
+          <a:ln w="38100">
+            <a:solidFill>
+              <a:srgbClr val="00B050"/>
+            </a:solidFill>
+            <a:prstDash val="sysDot"/>
+          </a:ln>
+        </p:spPr>
+        <p:style>
+          <a:lnRef idx="2">
+            <a:schemeClr val="accent1">
+              <a:shade val="15000"/>
+            </a:schemeClr>
+          </a:lnRef>
+          <a:fillRef idx="1">
+            <a:schemeClr val="accent1"/>
+          </a:fillRef>
+          <a:effectRef idx="0">
+            <a:schemeClr val="accent1"/>
+          </a:effectRef>
+          <a:fontRef idx="minor">
+            <a:schemeClr val="lt1"/>
+          </a:fontRef>
+        </p:style>
+        <p:txBody>
+          <a:bodyPr rtlCol="0" anchor="ctr"/>
+          <a:lstStyle/>
+          <a:p>
+            <a:pPr algn="ctr"/>
+            <a:endParaRPr lang="es-MX"/>
+          </a:p>
+        </p:txBody>
+      </p:sp>
     </p:spTree>
     <p:extLst>
       <p:ext uri="{BB962C8B-B14F-4D97-AF65-F5344CB8AC3E}">
@@ -22128,7 +22216,7 @@
                 </a:solidFill>
                 <a:latin typeface="-apple-system"/>
               </a:rPr>
-              <a:t> provee conectividad y ETL para integrar datos de múltiples fuentes.</a:t>
+              <a:t> provee conectividad y ETL para integrar datos de múltiples fuentes</a:t>
             </a:r>
             <a:r>
               <a:rPr lang="es-MX" sz="1200" b="0" i="0" dirty="0">
@@ -23010,12 +23098,8 @@
           </a:lstStyle>
           <a:p>
             <a:r>
-              <a:rPr lang="es-MX" sz="2400" dirty="0" err="1"/>
-              <a:t>Informatica</a:t>
-            </a:r>
-            <a:r>
               <a:rPr lang="es-MX" sz="2400" dirty="0"/>
-              <a:t> cuenta con las características necesarias para atender los requerimientos hipotéticos de El banco “Inversión para todos, S.A.”</a:t>
+              <a:t>El cambio de MDM permitirá a “Inversión para todos, S.A” posicionarse como una empresa líder en el mercado y apalancarse del poder de los datos </a:t>
             </a:r>
           </a:p>
         </p:txBody>
@@ -23197,9 +23281,2781 @@
             </a:avLst>
           </a:prstGeom>
           <a:solidFill>
+            <a:srgbClr val="89BCC5"/>
+          </a:solidFill>
+          <a:ln w="12700" cap="rnd" algn="ctr">
+            <a:noFill/>
+            <a:miter lim="800000"/>
+            <a:headEnd/>
+            <a:tailEnd/>
+          </a:ln>
+        </p:spPr>
+        <p:txBody>
+          <a:bodyPr lIns="0" tIns="0" rIns="0" bIns="0" anchor="ctr" anchorCtr="1"/>
+          <a:lstStyle/>
+          <a:p>
+            <a:pPr>
+              <a:lnSpc>
+                <a:spcPct val="106000"/>
+              </a:lnSpc>
+            </a:pPr>
+            <a:r>
+              <a:rPr lang="es-MX" sz="800" dirty="0">
+                <a:solidFill>
+                  <a:schemeClr val="bg1"/>
+                </a:solidFill>
+                <a:latin typeface="Candara Light" panose="020E0502030303020204" pitchFamily="34" charset="0"/>
+              </a:rPr>
+              <a:t>Definición de beneficios para el negocio</a:t>
+            </a:r>
+          </a:p>
+        </p:txBody>
+      </p:sp>
+      <p:sp>
+        <p:nvSpPr>
+          <p:cNvPr id="35" name="TextBox 64">
+            <a:extLst>
+              <a:ext uri="{FF2B5EF4-FFF2-40B4-BE49-F238E27FC236}">
+                <a16:creationId xmlns:a16="http://schemas.microsoft.com/office/drawing/2014/main" id="{3269D83A-F2D4-6FF2-E7B4-0A80651C5D38}"/>
+              </a:ext>
+            </a:extLst>
+          </p:cNvPr>
+          <p:cNvSpPr txBox="1">
+            <a:spLocks noChangeArrowheads="1"/>
+          </p:cNvSpPr>
+          <p:nvPr/>
+        </p:nvSpPr>
+        <p:spPr bwMode="auto">
+          <a:xfrm>
+            <a:off x="3012068" y="1717828"/>
+            <a:ext cx="2601994" cy="584775"/>
+          </a:xfrm>
+          <a:prstGeom prst="rect">
+            <a:avLst/>
+          </a:prstGeom>
+          <a:noFill/>
+          <a:ln>
+            <a:noFill/>
+          </a:ln>
+          <a:extLst>
+            <a:ext uri="{909E8E84-426E-40DD-AFC4-6F175D3DCCD1}">
+              <a14:hiddenFill xmlns:a14="http://schemas.microsoft.com/office/drawing/2010/main">
+                <a:solidFill>
+                  <a:srgbClr val="FFFFFF"/>
+                </a:solidFill>
+              </a14:hiddenFill>
+            </a:ext>
+            <a:ext uri="{91240B29-F687-4F45-9708-019B960494DF}">
+              <a14:hiddenLine xmlns:a14="http://schemas.microsoft.com/office/drawing/2010/main" w="9525">
+                <a:solidFill>
+                  <a:srgbClr val="000000"/>
+                </a:solidFill>
+                <a:miter lim="800000"/>
+                <a:headEnd/>
+                <a:tailEnd/>
+              </a14:hiddenLine>
+            </a:ext>
+          </a:extLst>
+        </p:spPr>
+        <p:txBody>
+          <a:bodyPr wrap="none">
+            <a:spAutoFit/>
+          </a:bodyPr>
+          <a:lstStyle>
+            <a:lvl1pPr>
+              <a:defRPr>
+                <a:solidFill>
+                  <a:schemeClr val="tx1"/>
+                </a:solidFill>
+                <a:latin typeface="Calibri" panose="020F0502020204030204" pitchFamily="34" charset="0"/>
+              </a:defRPr>
+            </a:lvl1pPr>
+            <a:lvl2pPr marL="742950" indent="-285750">
+              <a:defRPr>
+                <a:solidFill>
+                  <a:schemeClr val="tx1"/>
+                </a:solidFill>
+                <a:latin typeface="Calibri" panose="020F0502020204030204" pitchFamily="34" charset="0"/>
+              </a:defRPr>
+            </a:lvl2pPr>
+            <a:lvl3pPr marL="1143000" indent="-228600">
+              <a:defRPr>
+                <a:solidFill>
+                  <a:schemeClr val="tx1"/>
+                </a:solidFill>
+                <a:latin typeface="Calibri" panose="020F0502020204030204" pitchFamily="34" charset="0"/>
+              </a:defRPr>
+            </a:lvl3pPr>
+            <a:lvl4pPr marL="1600200" indent="-228600">
+              <a:defRPr>
+                <a:solidFill>
+                  <a:schemeClr val="tx1"/>
+                </a:solidFill>
+                <a:latin typeface="Calibri" panose="020F0502020204030204" pitchFamily="34" charset="0"/>
+              </a:defRPr>
+            </a:lvl4pPr>
+            <a:lvl5pPr marL="2057400" indent="-228600">
+              <a:defRPr>
+                <a:solidFill>
+                  <a:schemeClr val="tx1"/>
+                </a:solidFill>
+                <a:latin typeface="Calibri" panose="020F0502020204030204" pitchFamily="34" charset="0"/>
+              </a:defRPr>
+            </a:lvl5pPr>
+            <a:lvl6pPr marL="2514600" indent="-228600" fontAlgn="base">
+              <a:spcBef>
+                <a:spcPct val="0"/>
+              </a:spcBef>
+              <a:spcAft>
+                <a:spcPct val="0"/>
+              </a:spcAft>
+              <a:defRPr>
+                <a:solidFill>
+                  <a:schemeClr val="tx1"/>
+                </a:solidFill>
+                <a:latin typeface="Calibri" panose="020F0502020204030204" pitchFamily="34" charset="0"/>
+              </a:defRPr>
+            </a:lvl6pPr>
+            <a:lvl7pPr marL="2971800" indent="-228600" fontAlgn="base">
+              <a:spcBef>
+                <a:spcPct val="0"/>
+              </a:spcBef>
+              <a:spcAft>
+                <a:spcPct val="0"/>
+              </a:spcAft>
+              <a:defRPr>
+                <a:solidFill>
+                  <a:schemeClr val="tx1"/>
+                </a:solidFill>
+                <a:latin typeface="Calibri" panose="020F0502020204030204" pitchFamily="34" charset="0"/>
+              </a:defRPr>
+            </a:lvl7pPr>
+            <a:lvl8pPr marL="3429000" indent="-228600" fontAlgn="base">
+              <a:spcBef>
+                <a:spcPct val="0"/>
+              </a:spcBef>
+              <a:spcAft>
+                <a:spcPct val="0"/>
+              </a:spcAft>
+              <a:defRPr>
+                <a:solidFill>
+                  <a:schemeClr val="tx1"/>
+                </a:solidFill>
+                <a:latin typeface="Calibri" panose="020F0502020204030204" pitchFamily="34" charset="0"/>
+              </a:defRPr>
+            </a:lvl8pPr>
+            <a:lvl9pPr marL="3886200" indent="-228600" fontAlgn="base">
+              <a:spcBef>
+                <a:spcPct val="0"/>
+              </a:spcBef>
+              <a:spcAft>
+                <a:spcPct val="0"/>
+              </a:spcAft>
+              <a:defRPr>
+                <a:solidFill>
+                  <a:schemeClr val="tx1"/>
+                </a:solidFill>
+                <a:latin typeface="Calibri" panose="020F0502020204030204" pitchFamily="34" charset="0"/>
+              </a:defRPr>
+            </a:lvl9pPr>
+          </a:lstStyle>
+          <a:p>
+            <a:pPr eaLnBrk="1" hangingPunct="1"/>
+            <a:r>
+              <a:rPr lang="es-MX" altLang="es-MX" sz="1600" b="1" dirty="0">
+                <a:solidFill>
+                  <a:srgbClr val="356FA2"/>
+                </a:solidFill>
+                <a:ea typeface="Verdana" panose="020B0604030504040204" pitchFamily="34" charset="0"/>
+                <a:cs typeface="Verdana" panose="020B0604030504040204" pitchFamily="34" charset="0"/>
+              </a:rPr>
+              <a:t>Automatización de Tareas </a:t>
+            </a:r>
+          </a:p>
+          <a:p>
+            <a:pPr eaLnBrk="1" hangingPunct="1"/>
+            <a:r>
+              <a:rPr lang="es-MX" altLang="es-MX" sz="1600" b="1" dirty="0">
+                <a:solidFill>
+                  <a:srgbClr val="356FA2"/>
+                </a:solidFill>
+                <a:ea typeface="Verdana" panose="020B0604030504040204" pitchFamily="34" charset="0"/>
+                <a:cs typeface="Verdana" panose="020B0604030504040204" pitchFamily="34" charset="0"/>
+              </a:rPr>
+              <a:t>Y </a:t>
+            </a:r>
+            <a:r>
+              <a:rPr lang="es-MX" altLang="es-MX" sz="1600" b="1" i="1" dirty="0" err="1">
+                <a:solidFill>
+                  <a:srgbClr val="356FA2"/>
+                </a:solidFill>
+                <a:ea typeface="Verdana" panose="020B0604030504040204" pitchFamily="34" charset="0"/>
+                <a:cs typeface="Verdana" panose="020B0604030504040204" pitchFamily="34" charset="0"/>
+              </a:rPr>
+              <a:t>workflows</a:t>
+            </a:r>
+            <a:r>
+              <a:rPr lang="es-MX" altLang="es-MX" sz="1600" b="1" i="1" dirty="0">
+                <a:solidFill>
+                  <a:srgbClr val="356FA2"/>
+                </a:solidFill>
+                <a:ea typeface="Verdana" panose="020B0604030504040204" pitchFamily="34" charset="0"/>
+                <a:cs typeface="Verdana" panose="020B0604030504040204" pitchFamily="34" charset="0"/>
+              </a:rPr>
+              <a:t> </a:t>
+            </a:r>
+            <a:r>
+              <a:rPr lang="es-MX" altLang="es-MX" sz="1600" b="1" dirty="0">
+                <a:solidFill>
+                  <a:srgbClr val="356FA2"/>
+                </a:solidFill>
+                <a:ea typeface="Verdana" panose="020B0604030504040204" pitchFamily="34" charset="0"/>
+                <a:cs typeface="Verdana" panose="020B0604030504040204" pitchFamily="34" charset="0"/>
+              </a:rPr>
+              <a:t>personalizados </a:t>
+            </a:r>
+          </a:p>
+        </p:txBody>
+      </p:sp>
+      <p:sp>
+        <p:nvSpPr>
+          <p:cNvPr id="51" name="TextBox 20">
+            <a:extLst>
+              <a:ext uri="{FF2B5EF4-FFF2-40B4-BE49-F238E27FC236}">
+                <a16:creationId xmlns:a16="http://schemas.microsoft.com/office/drawing/2014/main" id="{29341691-F412-73C7-406E-E776C1CB4E5F}"/>
+              </a:ext>
+            </a:extLst>
+          </p:cNvPr>
+          <p:cNvSpPr txBox="1">
+            <a:spLocks noChangeArrowheads="1"/>
+          </p:cNvSpPr>
+          <p:nvPr/>
+        </p:nvSpPr>
+        <p:spPr bwMode="auto">
+          <a:xfrm>
+            <a:off x="2273830" y="1252978"/>
+            <a:ext cx="776287" cy="1514475"/>
+          </a:xfrm>
+          <a:prstGeom prst="rect">
+            <a:avLst/>
+          </a:prstGeom>
+          <a:noFill/>
+          <a:ln>
+            <a:noFill/>
+          </a:ln>
+          <a:extLst>
+            <a:ext uri="{909E8E84-426E-40DD-AFC4-6F175D3DCCD1}">
+              <a14:hiddenFill xmlns:a14="http://schemas.microsoft.com/office/drawing/2010/main">
+                <a:solidFill>
+                  <a:srgbClr val="FFFFFF"/>
+                </a:solidFill>
+              </a14:hiddenFill>
+            </a:ext>
+            <a:ext uri="{91240B29-F687-4F45-9708-019B960494DF}">
+              <a14:hiddenLine xmlns:a14="http://schemas.microsoft.com/office/drawing/2010/main" w="9525">
+                <a:solidFill>
+                  <a:srgbClr val="000000"/>
+                </a:solidFill>
+                <a:miter lim="800000"/>
+                <a:headEnd/>
+                <a:tailEnd/>
+              </a14:hiddenLine>
+            </a:ext>
+          </a:extLst>
+        </p:spPr>
+        <p:txBody>
+          <a:bodyPr wrap="none" lIns="0" tIns="0" rIns="0" bIns="0"/>
+          <a:lstStyle>
+            <a:lvl1pPr>
+              <a:defRPr>
+                <a:solidFill>
+                  <a:schemeClr val="tx1"/>
+                </a:solidFill>
+                <a:latin typeface="Calibri" panose="020F0502020204030204" pitchFamily="34" charset="0"/>
+              </a:defRPr>
+            </a:lvl1pPr>
+            <a:lvl2pPr marL="742950" indent="-285750">
+              <a:defRPr>
+                <a:solidFill>
+                  <a:schemeClr val="tx1"/>
+                </a:solidFill>
+                <a:latin typeface="Calibri" panose="020F0502020204030204" pitchFamily="34" charset="0"/>
+              </a:defRPr>
+            </a:lvl2pPr>
+            <a:lvl3pPr marL="1143000" indent="-228600">
+              <a:defRPr>
+                <a:solidFill>
+                  <a:schemeClr val="tx1"/>
+                </a:solidFill>
+                <a:latin typeface="Calibri" panose="020F0502020204030204" pitchFamily="34" charset="0"/>
+              </a:defRPr>
+            </a:lvl3pPr>
+            <a:lvl4pPr marL="1600200" indent="-228600">
+              <a:defRPr>
+                <a:solidFill>
+                  <a:schemeClr val="tx1"/>
+                </a:solidFill>
+                <a:latin typeface="Calibri" panose="020F0502020204030204" pitchFamily="34" charset="0"/>
+              </a:defRPr>
+            </a:lvl4pPr>
+            <a:lvl5pPr marL="2057400" indent="-228600">
+              <a:defRPr>
+                <a:solidFill>
+                  <a:schemeClr val="tx1"/>
+                </a:solidFill>
+                <a:latin typeface="Calibri" panose="020F0502020204030204" pitchFamily="34" charset="0"/>
+              </a:defRPr>
+            </a:lvl5pPr>
+            <a:lvl6pPr marL="2514600" indent="-228600" fontAlgn="base">
+              <a:spcBef>
+                <a:spcPct val="0"/>
+              </a:spcBef>
+              <a:spcAft>
+                <a:spcPct val="0"/>
+              </a:spcAft>
+              <a:defRPr>
+                <a:solidFill>
+                  <a:schemeClr val="tx1"/>
+                </a:solidFill>
+                <a:latin typeface="Calibri" panose="020F0502020204030204" pitchFamily="34" charset="0"/>
+              </a:defRPr>
+            </a:lvl6pPr>
+            <a:lvl7pPr marL="2971800" indent="-228600" fontAlgn="base">
+              <a:spcBef>
+                <a:spcPct val="0"/>
+              </a:spcBef>
+              <a:spcAft>
+                <a:spcPct val="0"/>
+              </a:spcAft>
+              <a:defRPr>
+                <a:solidFill>
+                  <a:schemeClr val="tx1"/>
+                </a:solidFill>
+                <a:latin typeface="Calibri" panose="020F0502020204030204" pitchFamily="34" charset="0"/>
+              </a:defRPr>
+            </a:lvl7pPr>
+            <a:lvl8pPr marL="3429000" indent="-228600" fontAlgn="base">
+              <a:spcBef>
+                <a:spcPct val="0"/>
+              </a:spcBef>
+              <a:spcAft>
+                <a:spcPct val="0"/>
+              </a:spcAft>
+              <a:defRPr>
+                <a:solidFill>
+                  <a:schemeClr val="tx1"/>
+                </a:solidFill>
+                <a:latin typeface="Calibri" panose="020F0502020204030204" pitchFamily="34" charset="0"/>
+              </a:defRPr>
+            </a:lvl8pPr>
+            <a:lvl9pPr marL="3886200" indent="-228600" fontAlgn="base">
+              <a:spcBef>
+                <a:spcPct val="0"/>
+              </a:spcBef>
+              <a:spcAft>
+                <a:spcPct val="0"/>
+              </a:spcAft>
+              <a:defRPr>
+                <a:solidFill>
+                  <a:schemeClr val="tx1"/>
+                </a:solidFill>
+                <a:latin typeface="Calibri" panose="020F0502020204030204" pitchFamily="34" charset="0"/>
+              </a:defRPr>
+            </a:lvl9pPr>
+          </a:lstStyle>
+          <a:p>
+            <a:pPr eaLnBrk="1" hangingPunct="1"/>
+            <a:r>
+              <a:rPr lang="es-MX" altLang="es-MX" sz="11500" dirty="0">
+                <a:solidFill>
+                  <a:srgbClr val="356FA2"/>
+                </a:solidFill>
+              </a:rPr>
+              <a:t>1</a:t>
+            </a:r>
+          </a:p>
+        </p:txBody>
+      </p:sp>
+      <p:pic>
+        <p:nvPicPr>
+          <p:cNvPr id="3074" name="Picture 2" descr="automation icon">
+            <a:extLst>
+              <a:ext uri="{FF2B5EF4-FFF2-40B4-BE49-F238E27FC236}">
+                <a16:creationId xmlns:a16="http://schemas.microsoft.com/office/drawing/2014/main" id="{D7216427-6C19-23E8-123A-01F15951A363}"/>
+              </a:ext>
+            </a:extLst>
+          </p:cNvPr>
+          <p:cNvPicPr>
+            <a:picLocks noChangeAspect="1" noChangeArrowheads="1"/>
+          </p:cNvPicPr>
+          <p:nvPr/>
+        </p:nvPicPr>
+        <p:blipFill rotWithShape="1">
+          <a:blip r:embed="rId2">
+            <a:duotone>
+              <a:schemeClr val="accent2">
+                <a:shade val="45000"/>
+                <a:satMod val="135000"/>
+              </a:schemeClr>
+              <a:prstClr val="white"/>
+            </a:duotone>
+            <a:extLst>
+              <a:ext uri="{28A0092B-C50C-407E-A947-70E740481C1C}">
+                <a14:useLocalDpi xmlns:a14="http://schemas.microsoft.com/office/drawing/2010/main" val="0"/>
+              </a:ext>
+            </a:extLst>
+          </a:blip>
+          <a:srcRect t="10276" b="10224"/>
+          <a:stretch/>
+        </p:blipFill>
+        <p:spPr bwMode="auto">
+          <a:xfrm>
+            <a:off x="1194729" y="1689073"/>
+            <a:ext cx="807905" cy="642285"/>
+          </a:xfrm>
+          <a:prstGeom prst="rect">
+            <a:avLst/>
+          </a:prstGeom>
+          <a:noFill/>
+          <a:extLst>
+            <a:ext uri="{909E8E84-426E-40DD-AFC4-6F175D3DCCD1}">
+              <a14:hiddenFill xmlns:a14="http://schemas.microsoft.com/office/drawing/2010/main">
+                <a:solidFill>
+                  <a:srgbClr val="FFFFFF"/>
+                </a:solidFill>
+              </a14:hiddenFill>
+            </a:ext>
+          </a:extLst>
+        </p:spPr>
+      </p:pic>
+      <p:sp>
+        <p:nvSpPr>
+          <p:cNvPr id="52" name="TextBox 64">
+            <a:extLst>
+              <a:ext uri="{FF2B5EF4-FFF2-40B4-BE49-F238E27FC236}">
+                <a16:creationId xmlns:a16="http://schemas.microsoft.com/office/drawing/2014/main" id="{ED8B472C-CE49-9417-E588-B7A0CB04CC67}"/>
+              </a:ext>
+            </a:extLst>
+          </p:cNvPr>
+          <p:cNvSpPr txBox="1">
+            <a:spLocks noChangeArrowheads="1"/>
+          </p:cNvSpPr>
+          <p:nvPr/>
+        </p:nvSpPr>
+        <p:spPr bwMode="auto">
+          <a:xfrm>
+            <a:off x="3167157" y="3458352"/>
+            <a:ext cx="2462534" cy="584775"/>
+          </a:xfrm>
+          <a:prstGeom prst="rect">
+            <a:avLst/>
+          </a:prstGeom>
+          <a:noFill/>
+          <a:ln>
+            <a:noFill/>
+          </a:ln>
+          <a:extLst>
+            <a:ext uri="{909E8E84-426E-40DD-AFC4-6F175D3DCCD1}">
+              <a14:hiddenFill xmlns:a14="http://schemas.microsoft.com/office/drawing/2010/main">
+                <a:solidFill>
+                  <a:srgbClr val="FFFFFF"/>
+                </a:solidFill>
+              </a14:hiddenFill>
+            </a:ext>
+            <a:ext uri="{91240B29-F687-4F45-9708-019B960494DF}">
+              <a14:hiddenLine xmlns:a14="http://schemas.microsoft.com/office/drawing/2010/main" w="9525">
+                <a:solidFill>
+                  <a:srgbClr val="000000"/>
+                </a:solidFill>
+                <a:miter lim="800000"/>
+                <a:headEnd/>
+                <a:tailEnd/>
+              </a14:hiddenLine>
+            </a:ext>
+          </a:extLst>
+        </p:spPr>
+        <p:txBody>
+          <a:bodyPr wrap="none">
+            <a:spAutoFit/>
+          </a:bodyPr>
+          <a:lstStyle>
+            <a:lvl1pPr>
+              <a:defRPr>
+                <a:solidFill>
+                  <a:schemeClr val="tx1"/>
+                </a:solidFill>
+                <a:latin typeface="Calibri" panose="020F0502020204030204" pitchFamily="34" charset="0"/>
+              </a:defRPr>
+            </a:lvl1pPr>
+            <a:lvl2pPr marL="742950" indent="-285750">
+              <a:defRPr>
+                <a:solidFill>
+                  <a:schemeClr val="tx1"/>
+                </a:solidFill>
+                <a:latin typeface="Calibri" panose="020F0502020204030204" pitchFamily="34" charset="0"/>
+              </a:defRPr>
+            </a:lvl2pPr>
+            <a:lvl3pPr marL="1143000" indent="-228600">
+              <a:defRPr>
+                <a:solidFill>
+                  <a:schemeClr val="tx1"/>
+                </a:solidFill>
+                <a:latin typeface="Calibri" panose="020F0502020204030204" pitchFamily="34" charset="0"/>
+              </a:defRPr>
+            </a:lvl3pPr>
+            <a:lvl4pPr marL="1600200" indent="-228600">
+              <a:defRPr>
+                <a:solidFill>
+                  <a:schemeClr val="tx1"/>
+                </a:solidFill>
+                <a:latin typeface="Calibri" panose="020F0502020204030204" pitchFamily="34" charset="0"/>
+              </a:defRPr>
+            </a:lvl4pPr>
+            <a:lvl5pPr marL="2057400" indent="-228600">
+              <a:defRPr>
+                <a:solidFill>
+                  <a:schemeClr val="tx1"/>
+                </a:solidFill>
+                <a:latin typeface="Calibri" panose="020F0502020204030204" pitchFamily="34" charset="0"/>
+              </a:defRPr>
+            </a:lvl5pPr>
+            <a:lvl6pPr marL="2514600" indent="-228600" fontAlgn="base">
+              <a:spcBef>
+                <a:spcPct val="0"/>
+              </a:spcBef>
+              <a:spcAft>
+                <a:spcPct val="0"/>
+              </a:spcAft>
+              <a:defRPr>
+                <a:solidFill>
+                  <a:schemeClr val="tx1"/>
+                </a:solidFill>
+                <a:latin typeface="Calibri" panose="020F0502020204030204" pitchFamily="34" charset="0"/>
+              </a:defRPr>
+            </a:lvl6pPr>
+            <a:lvl7pPr marL="2971800" indent="-228600" fontAlgn="base">
+              <a:spcBef>
+                <a:spcPct val="0"/>
+              </a:spcBef>
+              <a:spcAft>
+                <a:spcPct val="0"/>
+              </a:spcAft>
+              <a:defRPr>
+                <a:solidFill>
+                  <a:schemeClr val="tx1"/>
+                </a:solidFill>
+                <a:latin typeface="Calibri" panose="020F0502020204030204" pitchFamily="34" charset="0"/>
+              </a:defRPr>
+            </a:lvl7pPr>
+            <a:lvl8pPr marL="3429000" indent="-228600" fontAlgn="base">
+              <a:spcBef>
+                <a:spcPct val="0"/>
+              </a:spcBef>
+              <a:spcAft>
+                <a:spcPct val="0"/>
+              </a:spcAft>
+              <a:defRPr>
+                <a:solidFill>
+                  <a:schemeClr val="tx1"/>
+                </a:solidFill>
+                <a:latin typeface="Calibri" panose="020F0502020204030204" pitchFamily="34" charset="0"/>
+              </a:defRPr>
+            </a:lvl8pPr>
+            <a:lvl9pPr marL="3886200" indent="-228600" fontAlgn="base">
+              <a:spcBef>
+                <a:spcPct val="0"/>
+              </a:spcBef>
+              <a:spcAft>
+                <a:spcPct val="0"/>
+              </a:spcAft>
+              <a:defRPr>
+                <a:solidFill>
+                  <a:schemeClr val="tx1"/>
+                </a:solidFill>
+                <a:latin typeface="Calibri" panose="020F0502020204030204" pitchFamily="34" charset="0"/>
+              </a:defRPr>
+            </a:lvl9pPr>
+          </a:lstStyle>
+          <a:p>
+            <a:pPr eaLnBrk="1" hangingPunct="1"/>
+            <a:r>
+              <a:rPr lang="es-MX" altLang="es-MX" sz="1600" b="1" dirty="0">
+                <a:solidFill>
+                  <a:srgbClr val="356FA2"/>
+                </a:solidFill>
+                <a:ea typeface="Verdana" panose="020B0604030504040204" pitchFamily="34" charset="0"/>
+                <a:cs typeface="Verdana" panose="020B0604030504040204" pitchFamily="34" charset="0"/>
+              </a:rPr>
+              <a:t>Consolidación de datos de </a:t>
+            </a:r>
+          </a:p>
+          <a:p>
+            <a:pPr eaLnBrk="1" hangingPunct="1"/>
+            <a:r>
+              <a:rPr lang="es-MX" altLang="es-MX" sz="1600" b="1" dirty="0">
+                <a:solidFill>
+                  <a:srgbClr val="356FA2"/>
+                </a:solidFill>
+                <a:ea typeface="Verdana" panose="020B0604030504040204" pitchFamily="34" charset="0"/>
+                <a:cs typeface="Verdana" panose="020B0604030504040204" pitchFamily="34" charset="0"/>
+              </a:rPr>
+              <a:t>múltiples fuentes</a:t>
+            </a:r>
+          </a:p>
+        </p:txBody>
+      </p:sp>
+      <p:sp>
+        <p:nvSpPr>
+          <p:cNvPr id="54" name="TextBox 20">
+            <a:extLst>
+              <a:ext uri="{FF2B5EF4-FFF2-40B4-BE49-F238E27FC236}">
+                <a16:creationId xmlns:a16="http://schemas.microsoft.com/office/drawing/2014/main" id="{99A3D654-77AA-BEDB-79D5-2524BC904FD4}"/>
+              </a:ext>
+            </a:extLst>
+          </p:cNvPr>
+          <p:cNvSpPr txBox="1">
+            <a:spLocks noChangeArrowheads="1"/>
+          </p:cNvSpPr>
+          <p:nvPr/>
+        </p:nvSpPr>
+        <p:spPr bwMode="auto">
+          <a:xfrm>
+            <a:off x="2442633" y="2993502"/>
+            <a:ext cx="776287" cy="1514475"/>
+          </a:xfrm>
+          <a:prstGeom prst="rect">
+            <a:avLst/>
+          </a:prstGeom>
+          <a:noFill/>
+          <a:ln>
+            <a:noFill/>
+          </a:ln>
+          <a:extLst>
+            <a:ext uri="{909E8E84-426E-40DD-AFC4-6F175D3DCCD1}">
+              <a14:hiddenFill xmlns:a14="http://schemas.microsoft.com/office/drawing/2010/main">
+                <a:solidFill>
+                  <a:srgbClr val="FFFFFF"/>
+                </a:solidFill>
+              </a14:hiddenFill>
+            </a:ext>
+            <a:ext uri="{91240B29-F687-4F45-9708-019B960494DF}">
+              <a14:hiddenLine xmlns:a14="http://schemas.microsoft.com/office/drawing/2010/main" w="9525">
+                <a:solidFill>
+                  <a:srgbClr val="000000"/>
+                </a:solidFill>
+                <a:miter lim="800000"/>
+                <a:headEnd/>
+                <a:tailEnd/>
+              </a14:hiddenLine>
+            </a:ext>
+          </a:extLst>
+        </p:spPr>
+        <p:txBody>
+          <a:bodyPr wrap="none" lIns="0" tIns="0" rIns="0" bIns="0"/>
+          <a:lstStyle>
+            <a:lvl1pPr>
+              <a:defRPr>
+                <a:solidFill>
+                  <a:schemeClr val="tx1"/>
+                </a:solidFill>
+                <a:latin typeface="Calibri" panose="020F0502020204030204" pitchFamily="34" charset="0"/>
+              </a:defRPr>
+            </a:lvl1pPr>
+            <a:lvl2pPr marL="742950" indent="-285750">
+              <a:defRPr>
+                <a:solidFill>
+                  <a:schemeClr val="tx1"/>
+                </a:solidFill>
+                <a:latin typeface="Calibri" panose="020F0502020204030204" pitchFamily="34" charset="0"/>
+              </a:defRPr>
+            </a:lvl2pPr>
+            <a:lvl3pPr marL="1143000" indent="-228600">
+              <a:defRPr>
+                <a:solidFill>
+                  <a:schemeClr val="tx1"/>
+                </a:solidFill>
+                <a:latin typeface="Calibri" panose="020F0502020204030204" pitchFamily="34" charset="0"/>
+              </a:defRPr>
+            </a:lvl3pPr>
+            <a:lvl4pPr marL="1600200" indent="-228600">
+              <a:defRPr>
+                <a:solidFill>
+                  <a:schemeClr val="tx1"/>
+                </a:solidFill>
+                <a:latin typeface="Calibri" panose="020F0502020204030204" pitchFamily="34" charset="0"/>
+              </a:defRPr>
+            </a:lvl4pPr>
+            <a:lvl5pPr marL="2057400" indent="-228600">
+              <a:defRPr>
+                <a:solidFill>
+                  <a:schemeClr val="tx1"/>
+                </a:solidFill>
+                <a:latin typeface="Calibri" panose="020F0502020204030204" pitchFamily="34" charset="0"/>
+              </a:defRPr>
+            </a:lvl5pPr>
+            <a:lvl6pPr marL="2514600" indent="-228600" fontAlgn="base">
+              <a:spcBef>
+                <a:spcPct val="0"/>
+              </a:spcBef>
+              <a:spcAft>
+                <a:spcPct val="0"/>
+              </a:spcAft>
+              <a:defRPr>
+                <a:solidFill>
+                  <a:schemeClr val="tx1"/>
+                </a:solidFill>
+                <a:latin typeface="Calibri" panose="020F0502020204030204" pitchFamily="34" charset="0"/>
+              </a:defRPr>
+            </a:lvl6pPr>
+            <a:lvl7pPr marL="2971800" indent="-228600" fontAlgn="base">
+              <a:spcBef>
+                <a:spcPct val="0"/>
+              </a:spcBef>
+              <a:spcAft>
+                <a:spcPct val="0"/>
+              </a:spcAft>
+              <a:defRPr>
+                <a:solidFill>
+                  <a:schemeClr val="tx1"/>
+                </a:solidFill>
+                <a:latin typeface="Calibri" panose="020F0502020204030204" pitchFamily="34" charset="0"/>
+              </a:defRPr>
+            </a:lvl7pPr>
+            <a:lvl8pPr marL="3429000" indent="-228600" fontAlgn="base">
+              <a:spcBef>
+                <a:spcPct val="0"/>
+              </a:spcBef>
+              <a:spcAft>
+                <a:spcPct val="0"/>
+              </a:spcAft>
+              <a:defRPr>
+                <a:solidFill>
+                  <a:schemeClr val="tx1"/>
+                </a:solidFill>
+                <a:latin typeface="Calibri" panose="020F0502020204030204" pitchFamily="34" charset="0"/>
+              </a:defRPr>
+            </a:lvl8pPr>
+            <a:lvl9pPr marL="3886200" indent="-228600" fontAlgn="base">
+              <a:spcBef>
+                <a:spcPct val="0"/>
+              </a:spcBef>
+              <a:spcAft>
+                <a:spcPct val="0"/>
+              </a:spcAft>
+              <a:defRPr>
+                <a:solidFill>
+                  <a:schemeClr val="tx1"/>
+                </a:solidFill>
+                <a:latin typeface="Calibri" panose="020F0502020204030204" pitchFamily="34" charset="0"/>
+              </a:defRPr>
+            </a:lvl9pPr>
+          </a:lstStyle>
+          <a:p>
+            <a:pPr eaLnBrk="1" hangingPunct="1"/>
+            <a:r>
+              <a:rPr lang="es-ES" altLang="es-MX" sz="11500" dirty="0">
+                <a:solidFill>
+                  <a:srgbClr val="356FA2"/>
+                </a:solidFill>
+              </a:rPr>
+              <a:t>2</a:t>
+            </a:r>
+            <a:endParaRPr lang="es-MX" altLang="es-MX" sz="11500" dirty="0">
+              <a:solidFill>
+                <a:srgbClr val="356FA2"/>
+              </a:solidFill>
+            </a:endParaRPr>
+          </a:p>
+        </p:txBody>
+      </p:sp>
+      <p:pic>
+        <p:nvPicPr>
+          <p:cNvPr id="3076" name="Picture 4" descr="aggregate icon">
+            <a:extLst>
+              <a:ext uri="{FF2B5EF4-FFF2-40B4-BE49-F238E27FC236}">
+                <a16:creationId xmlns:a16="http://schemas.microsoft.com/office/drawing/2014/main" id="{2A8D1FD9-54B6-44AD-BF0A-E56F08515CE9}"/>
+              </a:ext>
+            </a:extLst>
+          </p:cNvPr>
+          <p:cNvPicPr>
+            <a:picLocks noChangeAspect="1" noChangeArrowheads="1"/>
+          </p:cNvPicPr>
+          <p:nvPr/>
+        </p:nvPicPr>
+        <p:blipFill>
+          <a:blip r:embed="rId3">
+            <a:duotone>
+              <a:schemeClr val="accent2">
+                <a:shade val="45000"/>
+                <a:satMod val="135000"/>
+              </a:schemeClr>
+              <a:prstClr val="white"/>
+            </a:duotone>
+            <a:extLst>
+              <a:ext uri="{28A0092B-C50C-407E-A947-70E740481C1C}">
+                <a14:useLocalDpi xmlns:a14="http://schemas.microsoft.com/office/drawing/2010/main" val="0"/>
+              </a:ext>
+            </a:extLst>
+          </a:blip>
+          <a:srcRect/>
+          <a:stretch>
+            <a:fillRect/>
+          </a:stretch>
+        </p:blipFill>
+        <p:spPr bwMode="auto">
+          <a:xfrm>
+            <a:off x="1251771" y="3383510"/>
+            <a:ext cx="734459" cy="734459"/>
+          </a:xfrm>
+          <a:prstGeom prst="rect">
+            <a:avLst/>
+          </a:prstGeom>
+          <a:noFill/>
+          <a:extLst>
+            <a:ext uri="{909E8E84-426E-40DD-AFC4-6F175D3DCCD1}">
+              <a14:hiddenFill xmlns:a14="http://schemas.microsoft.com/office/drawing/2010/main">
+                <a:solidFill>
+                  <a:srgbClr val="FFFFFF"/>
+                </a:solidFill>
+              </a14:hiddenFill>
+            </a:ext>
+          </a:extLst>
+        </p:spPr>
+      </p:pic>
+      <p:sp>
+        <p:nvSpPr>
+          <p:cNvPr id="55" name="TextBox 64">
+            <a:extLst>
+              <a:ext uri="{FF2B5EF4-FFF2-40B4-BE49-F238E27FC236}">
+                <a16:creationId xmlns:a16="http://schemas.microsoft.com/office/drawing/2014/main" id="{CB92EFFF-9878-9CD9-8230-BA8095F4FFD2}"/>
+              </a:ext>
+            </a:extLst>
+          </p:cNvPr>
+          <p:cNvSpPr txBox="1">
+            <a:spLocks noChangeArrowheads="1"/>
+          </p:cNvSpPr>
+          <p:nvPr/>
+        </p:nvSpPr>
+        <p:spPr bwMode="auto">
+          <a:xfrm>
+            <a:off x="3151528" y="5181624"/>
+            <a:ext cx="2419252" cy="584775"/>
+          </a:xfrm>
+          <a:prstGeom prst="rect">
+            <a:avLst/>
+          </a:prstGeom>
+          <a:noFill/>
+          <a:ln>
+            <a:noFill/>
+          </a:ln>
+          <a:extLst>
+            <a:ext uri="{909E8E84-426E-40DD-AFC4-6F175D3DCCD1}">
+              <a14:hiddenFill xmlns:a14="http://schemas.microsoft.com/office/drawing/2010/main">
+                <a:solidFill>
+                  <a:srgbClr val="FFFFFF"/>
+                </a:solidFill>
+              </a14:hiddenFill>
+            </a:ext>
+            <a:ext uri="{91240B29-F687-4F45-9708-019B960494DF}">
+              <a14:hiddenLine xmlns:a14="http://schemas.microsoft.com/office/drawing/2010/main" w="9525">
+                <a:solidFill>
+                  <a:srgbClr val="000000"/>
+                </a:solidFill>
+                <a:miter lim="800000"/>
+                <a:headEnd/>
+                <a:tailEnd/>
+              </a14:hiddenLine>
+            </a:ext>
+          </a:extLst>
+        </p:spPr>
+        <p:txBody>
+          <a:bodyPr wrap="none">
+            <a:spAutoFit/>
+          </a:bodyPr>
+          <a:lstStyle>
+            <a:lvl1pPr>
+              <a:defRPr>
+                <a:solidFill>
+                  <a:schemeClr val="tx1"/>
+                </a:solidFill>
+                <a:latin typeface="Calibri" panose="020F0502020204030204" pitchFamily="34" charset="0"/>
+              </a:defRPr>
+            </a:lvl1pPr>
+            <a:lvl2pPr marL="742950" indent="-285750">
+              <a:defRPr>
+                <a:solidFill>
+                  <a:schemeClr val="tx1"/>
+                </a:solidFill>
+                <a:latin typeface="Calibri" panose="020F0502020204030204" pitchFamily="34" charset="0"/>
+              </a:defRPr>
+            </a:lvl2pPr>
+            <a:lvl3pPr marL="1143000" indent="-228600">
+              <a:defRPr>
+                <a:solidFill>
+                  <a:schemeClr val="tx1"/>
+                </a:solidFill>
+                <a:latin typeface="Calibri" panose="020F0502020204030204" pitchFamily="34" charset="0"/>
+              </a:defRPr>
+            </a:lvl3pPr>
+            <a:lvl4pPr marL="1600200" indent="-228600">
+              <a:defRPr>
+                <a:solidFill>
+                  <a:schemeClr val="tx1"/>
+                </a:solidFill>
+                <a:latin typeface="Calibri" panose="020F0502020204030204" pitchFamily="34" charset="0"/>
+              </a:defRPr>
+            </a:lvl4pPr>
+            <a:lvl5pPr marL="2057400" indent="-228600">
+              <a:defRPr>
+                <a:solidFill>
+                  <a:schemeClr val="tx1"/>
+                </a:solidFill>
+                <a:latin typeface="Calibri" panose="020F0502020204030204" pitchFamily="34" charset="0"/>
+              </a:defRPr>
+            </a:lvl5pPr>
+            <a:lvl6pPr marL="2514600" indent="-228600" fontAlgn="base">
+              <a:spcBef>
+                <a:spcPct val="0"/>
+              </a:spcBef>
+              <a:spcAft>
+                <a:spcPct val="0"/>
+              </a:spcAft>
+              <a:defRPr>
+                <a:solidFill>
+                  <a:schemeClr val="tx1"/>
+                </a:solidFill>
+                <a:latin typeface="Calibri" panose="020F0502020204030204" pitchFamily="34" charset="0"/>
+              </a:defRPr>
+            </a:lvl6pPr>
+            <a:lvl7pPr marL="2971800" indent="-228600" fontAlgn="base">
+              <a:spcBef>
+                <a:spcPct val="0"/>
+              </a:spcBef>
+              <a:spcAft>
+                <a:spcPct val="0"/>
+              </a:spcAft>
+              <a:defRPr>
+                <a:solidFill>
+                  <a:schemeClr val="tx1"/>
+                </a:solidFill>
+                <a:latin typeface="Calibri" panose="020F0502020204030204" pitchFamily="34" charset="0"/>
+              </a:defRPr>
+            </a:lvl7pPr>
+            <a:lvl8pPr marL="3429000" indent="-228600" fontAlgn="base">
+              <a:spcBef>
+                <a:spcPct val="0"/>
+              </a:spcBef>
+              <a:spcAft>
+                <a:spcPct val="0"/>
+              </a:spcAft>
+              <a:defRPr>
+                <a:solidFill>
+                  <a:schemeClr val="tx1"/>
+                </a:solidFill>
+                <a:latin typeface="Calibri" panose="020F0502020204030204" pitchFamily="34" charset="0"/>
+              </a:defRPr>
+            </a:lvl8pPr>
+            <a:lvl9pPr marL="3886200" indent="-228600" fontAlgn="base">
+              <a:spcBef>
+                <a:spcPct val="0"/>
+              </a:spcBef>
+              <a:spcAft>
+                <a:spcPct val="0"/>
+              </a:spcAft>
+              <a:defRPr>
+                <a:solidFill>
+                  <a:schemeClr val="tx1"/>
+                </a:solidFill>
+                <a:latin typeface="Calibri" panose="020F0502020204030204" pitchFamily="34" charset="0"/>
+              </a:defRPr>
+            </a:lvl9pPr>
+          </a:lstStyle>
+          <a:p>
+            <a:pPr eaLnBrk="1" hangingPunct="1"/>
+            <a:r>
+              <a:rPr lang="es-MX" altLang="es-MX" sz="1600" b="1" dirty="0">
+                <a:solidFill>
+                  <a:srgbClr val="356FA2"/>
+                </a:solidFill>
+                <a:ea typeface="Verdana" panose="020B0604030504040204" pitchFamily="34" charset="0"/>
+                <a:cs typeface="Verdana" panose="020B0604030504040204" pitchFamily="34" charset="0"/>
+              </a:rPr>
+              <a:t>Soporta modelos de datos</a:t>
+            </a:r>
+          </a:p>
+          <a:p>
+            <a:pPr eaLnBrk="1" hangingPunct="1"/>
+            <a:r>
+              <a:rPr lang="es-MX" altLang="es-MX" sz="1600" b="1" dirty="0">
+                <a:solidFill>
+                  <a:srgbClr val="356FA2"/>
+                </a:solidFill>
+                <a:ea typeface="Verdana" panose="020B0604030504040204" pitchFamily="34" charset="0"/>
+                <a:cs typeface="Verdana" panose="020B0604030504040204" pitchFamily="34" charset="0"/>
+              </a:rPr>
+              <a:t>Y relacionales complejos</a:t>
+            </a:r>
+          </a:p>
+        </p:txBody>
+      </p:sp>
+      <p:sp>
+        <p:nvSpPr>
+          <p:cNvPr id="56" name="TextBox 20">
+            <a:extLst>
+              <a:ext uri="{FF2B5EF4-FFF2-40B4-BE49-F238E27FC236}">
+                <a16:creationId xmlns:a16="http://schemas.microsoft.com/office/drawing/2014/main" id="{96049B25-7799-41F0-BFA6-FA8311C30D9E}"/>
+              </a:ext>
+            </a:extLst>
+          </p:cNvPr>
+          <p:cNvSpPr txBox="1">
+            <a:spLocks noChangeArrowheads="1"/>
+          </p:cNvSpPr>
+          <p:nvPr/>
+        </p:nvSpPr>
+        <p:spPr bwMode="auto">
+          <a:xfrm>
+            <a:off x="2427004" y="4716774"/>
+            <a:ext cx="776287" cy="1514475"/>
+          </a:xfrm>
+          <a:prstGeom prst="rect">
+            <a:avLst/>
+          </a:prstGeom>
+          <a:noFill/>
+          <a:ln>
+            <a:noFill/>
+          </a:ln>
+          <a:extLst>
+            <a:ext uri="{909E8E84-426E-40DD-AFC4-6F175D3DCCD1}">
+              <a14:hiddenFill xmlns:a14="http://schemas.microsoft.com/office/drawing/2010/main">
+                <a:solidFill>
+                  <a:srgbClr val="FFFFFF"/>
+                </a:solidFill>
+              </a14:hiddenFill>
+            </a:ext>
+            <a:ext uri="{91240B29-F687-4F45-9708-019B960494DF}">
+              <a14:hiddenLine xmlns:a14="http://schemas.microsoft.com/office/drawing/2010/main" w="9525">
+                <a:solidFill>
+                  <a:srgbClr val="000000"/>
+                </a:solidFill>
+                <a:miter lim="800000"/>
+                <a:headEnd/>
+                <a:tailEnd/>
+              </a14:hiddenLine>
+            </a:ext>
+          </a:extLst>
+        </p:spPr>
+        <p:txBody>
+          <a:bodyPr wrap="none" lIns="0" tIns="0" rIns="0" bIns="0"/>
+          <a:lstStyle>
+            <a:lvl1pPr>
+              <a:defRPr>
+                <a:solidFill>
+                  <a:schemeClr val="tx1"/>
+                </a:solidFill>
+                <a:latin typeface="Calibri" panose="020F0502020204030204" pitchFamily="34" charset="0"/>
+              </a:defRPr>
+            </a:lvl1pPr>
+            <a:lvl2pPr marL="742950" indent="-285750">
+              <a:defRPr>
+                <a:solidFill>
+                  <a:schemeClr val="tx1"/>
+                </a:solidFill>
+                <a:latin typeface="Calibri" panose="020F0502020204030204" pitchFamily="34" charset="0"/>
+              </a:defRPr>
+            </a:lvl2pPr>
+            <a:lvl3pPr marL="1143000" indent="-228600">
+              <a:defRPr>
+                <a:solidFill>
+                  <a:schemeClr val="tx1"/>
+                </a:solidFill>
+                <a:latin typeface="Calibri" panose="020F0502020204030204" pitchFamily="34" charset="0"/>
+              </a:defRPr>
+            </a:lvl3pPr>
+            <a:lvl4pPr marL="1600200" indent="-228600">
+              <a:defRPr>
+                <a:solidFill>
+                  <a:schemeClr val="tx1"/>
+                </a:solidFill>
+                <a:latin typeface="Calibri" panose="020F0502020204030204" pitchFamily="34" charset="0"/>
+              </a:defRPr>
+            </a:lvl4pPr>
+            <a:lvl5pPr marL="2057400" indent="-228600">
+              <a:defRPr>
+                <a:solidFill>
+                  <a:schemeClr val="tx1"/>
+                </a:solidFill>
+                <a:latin typeface="Calibri" panose="020F0502020204030204" pitchFamily="34" charset="0"/>
+              </a:defRPr>
+            </a:lvl5pPr>
+            <a:lvl6pPr marL="2514600" indent="-228600" fontAlgn="base">
+              <a:spcBef>
+                <a:spcPct val="0"/>
+              </a:spcBef>
+              <a:spcAft>
+                <a:spcPct val="0"/>
+              </a:spcAft>
+              <a:defRPr>
+                <a:solidFill>
+                  <a:schemeClr val="tx1"/>
+                </a:solidFill>
+                <a:latin typeface="Calibri" panose="020F0502020204030204" pitchFamily="34" charset="0"/>
+              </a:defRPr>
+            </a:lvl6pPr>
+            <a:lvl7pPr marL="2971800" indent="-228600" fontAlgn="base">
+              <a:spcBef>
+                <a:spcPct val="0"/>
+              </a:spcBef>
+              <a:spcAft>
+                <a:spcPct val="0"/>
+              </a:spcAft>
+              <a:defRPr>
+                <a:solidFill>
+                  <a:schemeClr val="tx1"/>
+                </a:solidFill>
+                <a:latin typeface="Calibri" panose="020F0502020204030204" pitchFamily="34" charset="0"/>
+              </a:defRPr>
+            </a:lvl7pPr>
+            <a:lvl8pPr marL="3429000" indent="-228600" fontAlgn="base">
+              <a:spcBef>
+                <a:spcPct val="0"/>
+              </a:spcBef>
+              <a:spcAft>
+                <a:spcPct val="0"/>
+              </a:spcAft>
+              <a:defRPr>
+                <a:solidFill>
+                  <a:schemeClr val="tx1"/>
+                </a:solidFill>
+                <a:latin typeface="Calibri" panose="020F0502020204030204" pitchFamily="34" charset="0"/>
+              </a:defRPr>
+            </a:lvl8pPr>
+            <a:lvl9pPr marL="3886200" indent="-228600" fontAlgn="base">
+              <a:spcBef>
+                <a:spcPct val="0"/>
+              </a:spcBef>
+              <a:spcAft>
+                <a:spcPct val="0"/>
+              </a:spcAft>
+              <a:defRPr>
+                <a:solidFill>
+                  <a:schemeClr val="tx1"/>
+                </a:solidFill>
+                <a:latin typeface="Calibri" panose="020F0502020204030204" pitchFamily="34" charset="0"/>
+              </a:defRPr>
+            </a:lvl9pPr>
+          </a:lstStyle>
+          <a:p>
+            <a:pPr eaLnBrk="1" hangingPunct="1"/>
+            <a:r>
+              <a:rPr lang="es-ES" altLang="es-MX" sz="11500" dirty="0">
+                <a:solidFill>
+                  <a:srgbClr val="356FA2"/>
+                </a:solidFill>
+              </a:rPr>
+              <a:t>3</a:t>
+            </a:r>
+            <a:endParaRPr lang="es-MX" altLang="es-MX" sz="11500" dirty="0">
+              <a:solidFill>
+                <a:srgbClr val="356FA2"/>
+              </a:solidFill>
+            </a:endParaRPr>
+          </a:p>
+        </p:txBody>
+      </p:sp>
+      <p:pic>
+        <p:nvPicPr>
+          <p:cNvPr id="3078" name="Picture 6" descr="complex data icon">
+            <a:extLst>
+              <a:ext uri="{FF2B5EF4-FFF2-40B4-BE49-F238E27FC236}">
+                <a16:creationId xmlns:a16="http://schemas.microsoft.com/office/drawing/2014/main" id="{0514448C-F17F-26E9-50E9-B1E1D8D35A89}"/>
+              </a:ext>
+            </a:extLst>
+          </p:cNvPr>
+          <p:cNvPicPr>
+            <a:picLocks noChangeAspect="1" noChangeArrowheads="1"/>
+          </p:cNvPicPr>
+          <p:nvPr/>
+        </p:nvPicPr>
+        <p:blipFill>
+          <a:blip r:embed="rId4">
+            <a:duotone>
+              <a:schemeClr val="accent2">
+                <a:shade val="45000"/>
+                <a:satMod val="135000"/>
+              </a:schemeClr>
+              <a:prstClr val="white"/>
+            </a:duotone>
+            <a:extLst>
+              <a:ext uri="{28A0092B-C50C-407E-A947-70E740481C1C}">
+                <a14:useLocalDpi xmlns:a14="http://schemas.microsoft.com/office/drawing/2010/main" val="0"/>
+              </a:ext>
+            </a:extLst>
+          </a:blip>
+          <a:srcRect/>
+          <a:stretch>
+            <a:fillRect/>
+          </a:stretch>
+        </p:blipFill>
+        <p:spPr bwMode="auto">
+          <a:xfrm>
+            <a:off x="1231451" y="5106782"/>
+            <a:ext cx="734459" cy="734459"/>
+          </a:xfrm>
+          <a:prstGeom prst="rect">
+            <a:avLst/>
+          </a:prstGeom>
+          <a:noFill/>
+          <a:extLst>
+            <a:ext uri="{909E8E84-426E-40DD-AFC4-6F175D3DCCD1}">
+              <a14:hiddenFill xmlns:a14="http://schemas.microsoft.com/office/drawing/2010/main">
+                <a:solidFill>
+                  <a:srgbClr val="FFFFFF"/>
+                </a:solidFill>
+              </a14:hiddenFill>
+            </a:ext>
+          </a:extLst>
+        </p:spPr>
+      </p:pic>
+      <p:sp>
+        <p:nvSpPr>
+          <p:cNvPr id="58" name="TextBox 64">
+            <a:extLst>
+              <a:ext uri="{FF2B5EF4-FFF2-40B4-BE49-F238E27FC236}">
+                <a16:creationId xmlns:a16="http://schemas.microsoft.com/office/drawing/2014/main" id="{CF7A93C7-FA89-B97F-1779-4D7038615440}"/>
+              </a:ext>
+            </a:extLst>
+          </p:cNvPr>
+          <p:cNvSpPr txBox="1">
+            <a:spLocks noChangeArrowheads="1"/>
+          </p:cNvSpPr>
+          <p:nvPr/>
+        </p:nvSpPr>
+        <p:spPr bwMode="auto">
+          <a:xfrm>
+            <a:off x="8312594" y="1840938"/>
+            <a:ext cx="2319866" cy="338554"/>
+          </a:xfrm>
+          <a:prstGeom prst="rect">
+            <a:avLst/>
+          </a:prstGeom>
+          <a:noFill/>
+          <a:ln>
+            <a:noFill/>
+          </a:ln>
+          <a:extLst>
+            <a:ext uri="{909E8E84-426E-40DD-AFC4-6F175D3DCCD1}">
+              <a14:hiddenFill xmlns:a14="http://schemas.microsoft.com/office/drawing/2010/main">
+                <a:solidFill>
+                  <a:srgbClr val="FFFFFF"/>
+                </a:solidFill>
+              </a14:hiddenFill>
+            </a:ext>
+            <a:ext uri="{91240B29-F687-4F45-9708-019B960494DF}">
+              <a14:hiddenLine xmlns:a14="http://schemas.microsoft.com/office/drawing/2010/main" w="9525">
+                <a:solidFill>
+                  <a:srgbClr val="000000"/>
+                </a:solidFill>
+                <a:miter lim="800000"/>
+                <a:headEnd/>
+                <a:tailEnd/>
+              </a14:hiddenLine>
+            </a:ext>
+          </a:extLst>
+        </p:spPr>
+        <p:txBody>
+          <a:bodyPr wrap="none">
+            <a:spAutoFit/>
+          </a:bodyPr>
+          <a:lstStyle>
+            <a:lvl1pPr>
+              <a:defRPr>
+                <a:solidFill>
+                  <a:schemeClr val="tx1"/>
+                </a:solidFill>
+                <a:latin typeface="Calibri" panose="020F0502020204030204" pitchFamily="34" charset="0"/>
+              </a:defRPr>
+            </a:lvl1pPr>
+            <a:lvl2pPr marL="742950" indent="-285750">
+              <a:defRPr>
+                <a:solidFill>
+                  <a:schemeClr val="tx1"/>
+                </a:solidFill>
+                <a:latin typeface="Calibri" panose="020F0502020204030204" pitchFamily="34" charset="0"/>
+              </a:defRPr>
+            </a:lvl2pPr>
+            <a:lvl3pPr marL="1143000" indent="-228600">
+              <a:defRPr>
+                <a:solidFill>
+                  <a:schemeClr val="tx1"/>
+                </a:solidFill>
+                <a:latin typeface="Calibri" panose="020F0502020204030204" pitchFamily="34" charset="0"/>
+              </a:defRPr>
+            </a:lvl3pPr>
+            <a:lvl4pPr marL="1600200" indent="-228600">
+              <a:defRPr>
+                <a:solidFill>
+                  <a:schemeClr val="tx1"/>
+                </a:solidFill>
+                <a:latin typeface="Calibri" panose="020F0502020204030204" pitchFamily="34" charset="0"/>
+              </a:defRPr>
+            </a:lvl4pPr>
+            <a:lvl5pPr marL="2057400" indent="-228600">
+              <a:defRPr>
+                <a:solidFill>
+                  <a:schemeClr val="tx1"/>
+                </a:solidFill>
+                <a:latin typeface="Calibri" panose="020F0502020204030204" pitchFamily="34" charset="0"/>
+              </a:defRPr>
+            </a:lvl5pPr>
+            <a:lvl6pPr marL="2514600" indent="-228600" fontAlgn="base">
+              <a:spcBef>
+                <a:spcPct val="0"/>
+              </a:spcBef>
+              <a:spcAft>
+                <a:spcPct val="0"/>
+              </a:spcAft>
+              <a:defRPr>
+                <a:solidFill>
+                  <a:schemeClr val="tx1"/>
+                </a:solidFill>
+                <a:latin typeface="Calibri" panose="020F0502020204030204" pitchFamily="34" charset="0"/>
+              </a:defRPr>
+            </a:lvl6pPr>
+            <a:lvl7pPr marL="2971800" indent="-228600" fontAlgn="base">
+              <a:spcBef>
+                <a:spcPct val="0"/>
+              </a:spcBef>
+              <a:spcAft>
+                <a:spcPct val="0"/>
+              </a:spcAft>
+              <a:defRPr>
+                <a:solidFill>
+                  <a:schemeClr val="tx1"/>
+                </a:solidFill>
+                <a:latin typeface="Calibri" panose="020F0502020204030204" pitchFamily="34" charset="0"/>
+              </a:defRPr>
+            </a:lvl7pPr>
+            <a:lvl8pPr marL="3429000" indent="-228600" fontAlgn="base">
+              <a:spcBef>
+                <a:spcPct val="0"/>
+              </a:spcBef>
+              <a:spcAft>
+                <a:spcPct val="0"/>
+              </a:spcAft>
+              <a:defRPr>
+                <a:solidFill>
+                  <a:schemeClr val="tx1"/>
+                </a:solidFill>
+                <a:latin typeface="Calibri" panose="020F0502020204030204" pitchFamily="34" charset="0"/>
+              </a:defRPr>
+            </a:lvl8pPr>
+            <a:lvl9pPr marL="3886200" indent="-228600" fontAlgn="base">
+              <a:spcBef>
+                <a:spcPct val="0"/>
+              </a:spcBef>
+              <a:spcAft>
+                <a:spcPct val="0"/>
+              </a:spcAft>
+              <a:defRPr>
+                <a:solidFill>
+                  <a:schemeClr val="tx1"/>
+                </a:solidFill>
+                <a:latin typeface="Calibri" panose="020F0502020204030204" pitchFamily="34" charset="0"/>
+              </a:defRPr>
+            </a:lvl9pPr>
+          </a:lstStyle>
+          <a:p>
+            <a:pPr eaLnBrk="1" hangingPunct="1"/>
+            <a:r>
+              <a:rPr lang="es-MX" altLang="es-MX" sz="1600" b="1" dirty="0">
+                <a:solidFill>
+                  <a:srgbClr val="356FA2"/>
+                </a:solidFill>
+                <a:ea typeface="Verdana" panose="020B0604030504040204" pitchFamily="34" charset="0"/>
+                <a:cs typeface="Verdana" panose="020B0604030504040204" pitchFamily="34" charset="0"/>
+              </a:rPr>
+              <a:t>Evita duplicidad de datos</a:t>
+            </a:r>
+          </a:p>
+        </p:txBody>
+      </p:sp>
+      <p:sp>
+        <p:nvSpPr>
+          <p:cNvPr id="59" name="TextBox 20">
+            <a:extLst>
+              <a:ext uri="{FF2B5EF4-FFF2-40B4-BE49-F238E27FC236}">
+                <a16:creationId xmlns:a16="http://schemas.microsoft.com/office/drawing/2014/main" id="{627A9B58-0882-996B-1B9C-5F3CD177F8F7}"/>
+              </a:ext>
+            </a:extLst>
+          </p:cNvPr>
+          <p:cNvSpPr txBox="1">
+            <a:spLocks noChangeArrowheads="1"/>
+          </p:cNvSpPr>
+          <p:nvPr/>
+        </p:nvSpPr>
+        <p:spPr bwMode="auto">
+          <a:xfrm>
+            <a:off x="7574356" y="1252978"/>
+            <a:ext cx="776287" cy="1514475"/>
+          </a:xfrm>
+          <a:prstGeom prst="rect">
+            <a:avLst/>
+          </a:prstGeom>
+          <a:noFill/>
+          <a:ln>
+            <a:noFill/>
+          </a:ln>
+          <a:extLst>
+            <a:ext uri="{909E8E84-426E-40DD-AFC4-6F175D3DCCD1}">
+              <a14:hiddenFill xmlns:a14="http://schemas.microsoft.com/office/drawing/2010/main">
+                <a:solidFill>
+                  <a:srgbClr val="FFFFFF"/>
+                </a:solidFill>
+              </a14:hiddenFill>
+            </a:ext>
+            <a:ext uri="{91240B29-F687-4F45-9708-019B960494DF}">
+              <a14:hiddenLine xmlns:a14="http://schemas.microsoft.com/office/drawing/2010/main" w="9525">
+                <a:solidFill>
+                  <a:srgbClr val="000000"/>
+                </a:solidFill>
+                <a:miter lim="800000"/>
+                <a:headEnd/>
+                <a:tailEnd/>
+              </a14:hiddenLine>
+            </a:ext>
+          </a:extLst>
+        </p:spPr>
+        <p:txBody>
+          <a:bodyPr wrap="none" lIns="0" tIns="0" rIns="0" bIns="0"/>
+          <a:lstStyle>
+            <a:lvl1pPr>
+              <a:defRPr>
+                <a:solidFill>
+                  <a:schemeClr val="tx1"/>
+                </a:solidFill>
+                <a:latin typeface="Calibri" panose="020F0502020204030204" pitchFamily="34" charset="0"/>
+              </a:defRPr>
+            </a:lvl1pPr>
+            <a:lvl2pPr marL="742950" indent="-285750">
+              <a:defRPr>
+                <a:solidFill>
+                  <a:schemeClr val="tx1"/>
+                </a:solidFill>
+                <a:latin typeface="Calibri" panose="020F0502020204030204" pitchFamily="34" charset="0"/>
+              </a:defRPr>
+            </a:lvl2pPr>
+            <a:lvl3pPr marL="1143000" indent="-228600">
+              <a:defRPr>
+                <a:solidFill>
+                  <a:schemeClr val="tx1"/>
+                </a:solidFill>
+                <a:latin typeface="Calibri" panose="020F0502020204030204" pitchFamily="34" charset="0"/>
+              </a:defRPr>
+            </a:lvl3pPr>
+            <a:lvl4pPr marL="1600200" indent="-228600">
+              <a:defRPr>
+                <a:solidFill>
+                  <a:schemeClr val="tx1"/>
+                </a:solidFill>
+                <a:latin typeface="Calibri" panose="020F0502020204030204" pitchFamily="34" charset="0"/>
+              </a:defRPr>
+            </a:lvl4pPr>
+            <a:lvl5pPr marL="2057400" indent="-228600">
+              <a:defRPr>
+                <a:solidFill>
+                  <a:schemeClr val="tx1"/>
+                </a:solidFill>
+                <a:latin typeface="Calibri" panose="020F0502020204030204" pitchFamily="34" charset="0"/>
+              </a:defRPr>
+            </a:lvl5pPr>
+            <a:lvl6pPr marL="2514600" indent="-228600" fontAlgn="base">
+              <a:spcBef>
+                <a:spcPct val="0"/>
+              </a:spcBef>
+              <a:spcAft>
+                <a:spcPct val="0"/>
+              </a:spcAft>
+              <a:defRPr>
+                <a:solidFill>
+                  <a:schemeClr val="tx1"/>
+                </a:solidFill>
+                <a:latin typeface="Calibri" panose="020F0502020204030204" pitchFamily="34" charset="0"/>
+              </a:defRPr>
+            </a:lvl6pPr>
+            <a:lvl7pPr marL="2971800" indent="-228600" fontAlgn="base">
+              <a:spcBef>
+                <a:spcPct val="0"/>
+              </a:spcBef>
+              <a:spcAft>
+                <a:spcPct val="0"/>
+              </a:spcAft>
+              <a:defRPr>
+                <a:solidFill>
+                  <a:schemeClr val="tx1"/>
+                </a:solidFill>
+                <a:latin typeface="Calibri" panose="020F0502020204030204" pitchFamily="34" charset="0"/>
+              </a:defRPr>
+            </a:lvl7pPr>
+            <a:lvl8pPr marL="3429000" indent="-228600" fontAlgn="base">
+              <a:spcBef>
+                <a:spcPct val="0"/>
+              </a:spcBef>
+              <a:spcAft>
+                <a:spcPct val="0"/>
+              </a:spcAft>
+              <a:defRPr>
+                <a:solidFill>
+                  <a:schemeClr val="tx1"/>
+                </a:solidFill>
+                <a:latin typeface="Calibri" panose="020F0502020204030204" pitchFamily="34" charset="0"/>
+              </a:defRPr>
+            </a:lvl8pPr>
+            <a:lvl9pPr marL="3886200" indent="-228600" fontAlgn="base">
+              <a:spcBef>
+                <a:spcPct val="0"/>
+              </a:spcBef>
+              <a:spcAft>
+                <a:spcPct val="0"/>
+              </a:spcAft>
+              <a:defRPr>
+                <a:solidFill>
+                  <a:schemeClr val="tx1"/>
+                </a:solidFill>
+                <a:latin typeface="Calibri" panose="020F0502020204030204" pitchFamily="34" charset="0"/>
+              </a:defRPr>
+            </a:lvl9pPr>
+          </a:lstStyle>
+          <a:p>
+            <a:pPr eaLnBrk="1" hangingPunct="1"/>
+            <a:r>
+              <a:rPr lang="es-ES" altLang="es-MX" sz="11500" dirty="0">
+                <a:solidFill>
+                  <a:srgbClr val="356FA2"/>
+                </a:solidFill>
+              </a:rPr>
+              <a:t>4</a:t>
+            </a:r>
+            <a:endParaRPr lang="es-MX" altLang="es-MX" sz="11500" dirty="0">
+              <a:solidFill>
+                <a:srgbClr val="356FA2"/>
+              </a:solidFill>
+            </a:endParaRPr>
+          </a:p>
+        </p:txBody>
+      </p:sp>
+      <p:sp>
+        <p:nvSpPr>
+          <p:cNvPr id="61" name="TextBox 64">
+            <a:extLst>
+              <a:ext uri="{FF2B5EF4-FFF2-40B4-BE49-F238E27FC236}">
+                <a16:creationId xmlns:a16="http://schemas.microsoft.com/office/drawing/2014/main" id="{17E3A0D5-522A-A409-D2F7-8C8E27E4AC19}"/>
+              </a:ext>
+            </a:extLst>
+          </p:cNvPr>
+          <p:cNvSpPr txBox="1">
+            <a:spLocks noChangeArrowheads="1"/>
+          </p:cNvSpPr>
+          <p:nvPr/>
+        </p:nvSpPr>
+        <p:spPr bwMode="auto">
+          <a:xfrm>
+            <a:off x="8467683" y="3458352"/>
+            <a:ext cx="2374368" cy="584775"/>
+          </a:xfrm>
+          <a:prstGeom prst="rect">
+            <a:avLst/>
+          </a:prstGeom>
+          <a:noFill/>
+          <a:ln>
+            <a:noFill/>
+          </a:ln>
+          <a:extLst>
+            <a:ext uri="{909E8E84-426E-40DD-AFC4-6F175D3DCCD1}">
+              <a14:hiddenFill xmlns:a14="http://schemas.microsoft.com/office/drawing/2010/main">
+                <a:solidFill>
+                  <a:srgbClr val="FFFFFF"/>
+                </a:solidFill>
+              </a14:hiddenFill>
+            </a:ext>
+            <a:ext uri="{91240B29-F687-4F45-9708-019B960494DF}">
+              <a14:hiddenLine xmlns:a14="http://schemas.microsoft.com/office/drawing/2010/main" w="9525">
+                <a:solidFill>
+                  <a:srgbClr val="000000"/>
+                </a:solidFill>
+                <a:miter lim="800000"/>
+                <a:headEnd/>
+                <a:tailEnd/>
+              </a14:hiddenLine>
+            </a:ext>
+          </a:extLst>
+        </p:spPr>
+        <p:txBody>
+          <a:bodyPr wrap="none">
+            <a:spAutoFit/>
+          </a:bodyPr>
+          <a:lstStyle>
+            <a:lvl1pPr>
+              <a:defRPr>
+                <a:solidFill>
+                  <a:schemeClr val="tx1"/>
+                </a:solidFill>
+                <a:latin typeface="Calibri" panose="020F0502020204030204" pitchFamily="34" charset="0"/>
+              </a:defRPr>
+            </a:lvl1pPr>
+            <a:lvl2pPr marL="742950" indent="-285750">
+              <a:defRPr>
+                <a:solidFill>
+                  <a:schemeClr val="tx1"/>
+                </a:solidFill>
+                <a:latin typeface="Calibri" panose="020F0502020204030204" pitchFamily="34" charset="0"/>
+              </a:defRPr>
+            </a:lvl2pPr>
+            <a:lvl3pPr marL="1143000" indent="-228600">
+              <a:defRPr>
+                <a:solidFill>
+                  <a:schemeClr val="tx1"/>
+                </a:solidFill>
+                <a:latin typeface="Calibri" panose="020F0502020204030204" pitchFamily="34" charset="0"/>
+              </a:defRPr>
+            </a:lvl3pPr>
+            <a:lvl4pPr marL="1600200" indent="-228600">
+              <a:defRPr>
+                <a:solidFill>
+                  <a:schemeClr val="tx1"/>
+                </a:solidFill>
+                <a:latin typeface="Calibri" panose="020F0502020204030204" pitchFamily="34" charset="0"/>
+              </a:defRPr>
+            </a:lvl4pPr>
+            <a:lvl5pPr marL="2057400" indent="-228600">
+              <a:defRPr>
+                <a:solidFill>
+                  <a:schemeClr val="tx1"/>
+                </a:solidFill>
+                <a:latin typeface="Calibri" panose="020F0502020204030204" pitchFamily="34" charset="0"/>
+              </a:defRPr>
+            </a:lvl5pPr>
+            <a:lvl6pPr marL="2514600" indent="-228600" fontAlgn="base">
+              <a:spcBef>
+                <a:spcPct val="0"/>
+              </a:spcBef>
+              <a:spcAft>
+                <a:spcPct val="0"/>
+              </a:spcAft>
+              <a:defRPr>
+                <a:solidFill>
+                  <a:schemeClr val="tx1"/>
+                </a:solidFill>
+                <a:latin typeface="Calibri" panose="020F0502020204030204" pitchFamily="34" charset="0"/>
+              </a:defRPr>
+            </a:lvl6pPr>
+            <a:lvl7pPr marL="2971800" indent="-228600" fontAlgn="base">
+              <a:spcBef>
+                <a:spcPct val="0"/>
+              </a:spcBef>
+              <a:spcAft>
+                <a:spcPct val="0"/>
+              </a:spcAft>
+              <a:defRPr>
+                <a:solidFill>
+                  <a:schemeClr val="tx1"/>
+                </a:solidFill>
+                <a:latin typeface="Calibri" panose="020F0502020204030204" pitchFamily="34" charset="0"/>
+              </a:defRPr>
+            </a:lvl7pPr>
+            <a:lvl8pPr marL="3429000" indent="-228600" fontAlgn="base">
+              <a:spcBef>
+                <a:spcPct val="0"/>
+              </a:spcBef>
+              <a:spcAft>
+                <a:spcPct val="0"/>
+              </a:spcAft>
+              <a:defRPr>
+                <a:solidFill>
+                  <a:schemeClr val="tx1"/>
+                </a:solidFill>
+                <a:latin typeface="Calibri" panose="020F0502020204030204" pitchFamily="34" charset="0"/>
+              </a:defRPr>
+            </a:lvl8pPr>
+            <a:lvl9pPr marL="3886200" indent="-228600" fontAlgn="base">
+              <a:spcBef>
+                <a:spcPct val="0"/>
+              </a:spcBef>
+              <a:spcAft>
+                <a:spcPct val="0"/>
+              </a:spcAft>
+              <a:defRPr>
+                <a:solidFill>
+                  <a:schemeClr val="tx1"/>
+                </a:solidFill>
+                <a:latin typeface="Calibri" panose="020F0502020204030204" pitchFamily="34" charset="0"/>
+              </a:defRPr>
+            </a:lvl9pPr>
+          </a:lstStyle>
+          <a:p>
+            <a:pPr eaLnBrk="1" hangingPunct="1"/>
+            <a:r>
+              <a:rPr lang="es-MX" altLang="es-MX" sz="1600" b="1" dirty="0">
+                <a:solidFill>
+                  <a:srgbClr val="356FA2"/>
+                </a:solidFill>
+                <a:ea typeface="Verdana" panose="020B0604030504040204" pitchFamily="34" charset="0"/>
+                <a:cs typeface="Verdana" panose="020B0604030504040204" pitchFamily="34" charset="0"/>
+              </a:rPr>
+              <a:t>Permite definir custodios </a:t>
+            </a:r>
+          </a:p>
+          <a:p>
+            <a:pPr eaLnBrk="1" hangingPunct="1"/>
+            <a:r>
+              <a:rPr lang="es-MX" altLang="es-MX" sz="1600" b="1" dirty="0">
+                <a:solidFill>
+                  <a:srgbClr val="356FA2"/>
+                </a:solidFill>
+                <a:ea typeface="Verdana" panose="020B0604030504040204" pitchFamily="34" charset="0"/>
+                <a:cs typeface="Verdana" panose="020B0604030504040204" pitchFamily="34" charset="0"/>
+              </a:rPr>
+              <a:t>de los datos</a:t>
+            </a:r>
+          </a:p>
+        </p:txBody>
+      </p:sp>
+      <p:sp>
+        <p:nvSpPr>
+          <p:cNvPr id="62" name="TextBox 20">
+            <a:extLst>
+              <a:ext uri="{FF2B5EF4-FFF2-40B4-BE49-F238E27FC236}">
+                <a16:creationId xmlns:a16="http://schemas.microsoft.com/office/drawing/2014/main" id="{2E11326F-E067-8FF0-4E00-1CED85E2ABE3}"/>
+              </a:ext>
+            </a:extLst>
+          </p:cNvPr>
+          <p:cNvSpPr txBox="1">
+            <a:spLocks noChangeArrowheads="1"/>
+          </p:cNvSpPr>
+          <p:nvPr/>
+        </p:nvSpPr>
+        <p:spPr bwMode="auto">
+          <a:xfrm>
+            <a:off x="7743159" y="2993502"/>
+            <a:ext cx="776287" cy="1514475"/>
+          </a:xfrm>
+          <a:prstGeom prst="rect">
+            <a:avLst/>
+          </a:prstGeom>
+          <a:noFill/>
+          <a:ln>
+            <a:noFill/>
+          </a:ln>
+          <a:extLst>
+            <a:ext uri="{909E8E84-426E-40DD-AFC4-6F175D3DCCD1}">
+              <a14:hiddenFill xmlns:a14="http://schemas.microsoft.com/office/drawing/2010/main">
+                <a:solidFill>
+                  <a:srgbClr val="FFFFFF"/>
+                </a:solidFill>
+              </a14:hiddenFill>
+            </a:ext>
+            <a:ext uri="{91240B29-F687-4F45-9708-019B960494DF}">
+              <a14:hiddenLine xmlns:a14="http://schemas.microsoft.com/office/drawing/2010/main" w="9525">
+                <a:solidFill>
+                  <a:srgbClr val="000000"/>
+                </a:solidFill>
+                <a:miter lim="800000"/>
+                <a:headEnd/>
+                <a:tailEnd/>
+              </a14:hiddenLine>
+            </a:ext>
+          </a:extLst>
+        </p:spPr>
+        <p:txBody>
+          <a:bodyPr wrap="none" lIns="0" tIns="0" rIns="0" bIns="0"/>
+          <a:lstStyle>
+            <a:lvl1pPr>
+              <a:defRPr>
+                <a:solidFill>
+                  <a:schemeClr val="tx1"/>
+                </a:solidFill>
+                <a:latin typeface="Calibri" panose="020F0502020204030204" pitchFamily="34" charset="0"/>
+              </a:defRPr>
+            </a:lvl1pPr>
+            <a:lvl2pPr marL="742950" indent="-285750">
+              <a:defRPr>
+                <a:solidFill>
+                  <a:schemeClr val="tx1"/>
+                </a:solidFill>
+                <a:latin typeface="Calibri" panose="020F0502020204030204" pitchFamily="34" charset="0"/>
+              </a:defRPr>
+            </a:lvl2pPr>
+            <a:lvl3pPr marL="1143000" indent="-228600">
+              <a:defRPr>
+                <a:solidFill>
+                  <a:schemeClr val="tx1"/>
+                </a:solidFill>
+                <a:latin typeface="Calibri" panose="020F0502020204030204" pitchFamily="34" charset="0"/>
+              </a:defRPr>
+            </a:lvl3pPr>
+            <a:lvl4pPr marL="1600200" indent="-228600">
+              <a:defRPr>
+                <a:solidFill>
+                  <a:schemeClr val="tx1"/>
+                </a:solidFill>
+                <a:latin typeface="Calibri" panose="020F0502020204030204" pitchFamily="34" charset="0"/>
+              </a:defRPr>
+            </a:lvl4pPr>
+            <a:lvl5pPr marL="2057400" indent="-228600">
+              <a:defRPr>
+                <a:solidFill>
+                  <a:schemeClr val="tx1"/>
+                </a:solidFill>
+                <a:latin typeface="Calibri" panose="020F0502020204030204" pitchFamily="34" charset="0"/>
+              </a:defRPr>
+            </a:lvl5pPr>
+            <a:lvl6pPr marL="2514600" indent="-228600" fontAlgn="base">
+              <a:spcBef>
+                <a:spcPct val="0"/>
+              </a:spcBef>
+              <a:spcAft>
+                <a:spcPct val="0"/>
+              </a:spcAft>
+              <a:defRPr>
+                <a:solidFill>
+                  <a:schemeClr val="tx1"/>
+                </a:solidFill>
+                <a:latin typeface="Calibri" panose="020F0502020204030204" pitchFamily="34" charset="0"/>
+              </a:defRPr>
+            </a:lvl6pPr>
+            <a:lvl7pPr marL="2971800" indent="-228600" fontAlgn="base">
+              <a:spcBef>
+                <a:spcPct val="0"/>
+              </a:spcBef>
+              <a:spcAft>
+                <a:spcPct val="0"/>
+              </a:spcAft>
+              <a:defRPr>
+                <a:solidFill>
+                  <a:schemeClr val="tx1"/>
+                </a:solidFill>
+                <a:latin typeface="Calibri" panose="020F0502020204030204" pitchFamily="34" charset="0"/>
+              </a:defRPr>
+            </a:lvl7pPr>
+            <a:lvl8pPr marL="3429000" indent="-228600" fontAlgn="base">
+              <a:spcBef>
+                <a:spcPct val="0"/>
+              </a:spcBef>
+              <a:spcAft>
+                <a:spcPct val="0"/>
+              </a:spcAft>
+              <a:defRPr>
+                <a:solidFill>
+                  <a:schemeClr val="tx1"/>
+                </a:solidFill>
+                <a:latin typeface="Calibri" panose="020F0502020204030204" pitchFamily="34" charset="0"/>
+              </a:defRPr>
+            </a:lvl8pPr>
+            <a:lvl9pPr marL="3886200" indent="-228600" fontAlgn="base">
+              <a:spcBef>
+                <a:spcPct val="0"/>
+              </a:spcBef>
+              <a:spcAft>
+                <a:spcPct val="0"/>
+              </a:spcAft>
+              <a:defRPr>
+                <a:solidFill>
+                  <a:schemeClr val="tx1"/>
+                </a:solidFill>
+                <a:latin typeface="Calibri" panose="020F0502020204030204" pitchFamily="34" charset="0"/>
+              </a:defRPr>
+            </a:lvl9pPr>
+          </a:lstStyle>
+          <a:p>
+            <a:pPr eaLnBrk="1" hangingPunct="1"/>
+            <a:r>
+              <a:rPr lang="es-ES" altLang="es-MX" sz="11500" dirty="0">
+                <a:solidFill>
+                  <a:srgbClr val="356FA2"/>
+                </a:solidFill>
+              </a:rPr>
+              <a:t>5</a:t>
+            </a:r>
+            <a:endParaRPr lang="es-MX" altLang="es-MX" sz="11500" dirty="0">
+              <a:solidFill>
+                <a:srgbClr val="356FA2"/>
+              </a:solidFill>
+            </a:endParaRPr>
+          </a:p>
+        </p:txBody>
+      </p:sp>
+      <p:sp>
+        <p:nvSpPr>
+          <p:cNvPr id="3072" name="TextBox 64">
+            <a:extLst>
+              <a:ext uri="{FF2B5EF4-FFF2-40B4-BE49-F238E27FC236}">
+                <a16:creationId xmlns:a16="http://schemas.microsoft.com/office/drawing/2014/main" id="{E840A320-358F-F8BD-3B99-1056F351AC40}"/>
+              </a:ext>
+            </a:extLst>
+          </p:cNvPr>
+          <p:cNvSpPr txBox="1">
+            <a:spLocks noChangeArrowheads="1"/>
+          </p:cNvSpPr>
+          <p:nvPr/>
+        </p:nvSpPr>
+        <p:spPr bwMode="auto">
+          <a:xfrm>
+            <a:off x="8452054" y="5181624"/>
+            <a:ext cx="2613216" cy="584775"/>
+          </a:xfrm>
+          <a:prstGeom prst="rect">
+            <a:avLst/>
+          </a:prstGeom>
+          <a:noFill/>
+          <a:ln>
+            <a:noFill/>
+          </a:ln>
+          <a:extLst>
+            <a:ext uri="{909E8E84-426E-40DD-AFC4-6F175D3DCCD1}">
+              <a14:hiddenFill xmlns:a14="http://schemas.microsoft.com/office/drawing/2010/main">
+                <a:solidFill>
+                  <a:srgbClr val="FFFFFF"/>
+                </a:solidFill>
+              </a14:hiddenFill>
+            </a:ext>
+            <a:ext uri="{91240B29-F687-4F45-9708-019B960494DF}">
+              <a14:hiddenLine xmlns:a14="http://schemas.microsoft.com/office/drawing/2010/main" w="9525">
+                <a:solidFill>
+                  <a:srgbClr val="000000"/>
+                </a:solidFill>
+                <a:miter lim="800000"/>
+                <a:headEnd/>
+                <a:tailEnd/>
+              </a14:hiddenLine>
+            </a:ext>
+          </a:extLst>
+        </p:spPr>
+        <p:txBody>
+          <a:bodyPr wrap="none">
+            <a:spAutoFit/>
+          </a:bodyPr>
+          <a:lstStyle>
+            <a:lvl1pPr>
+              <a:defRPr>
+                <a:solidFill>
+                  <a:schemeClr val="tx1"/>
+                </a:solidFill>
+                <a:latin typeface="Calibri" panose="020F0502020204030204" pitchFamily="34" charset="0"/>
+              </a:defRPr>
+            </a:lvl1pPr>
+            <a:lvl2pPr marL="742950" indent="-285750">
+              <a:defRPr>
+                <a:solidFill>
+                  <a:schemeClr val="tx1"/>
+                </a:solidFill>
+                <a:latin typeface="Calibri" panose="020F0502020204030204" pitchFamily="34" charset="0"/>
+              </a:defRPr>
+            </a:lvl2pPr>
+            <a:lvl3pPr marL="1143000" indent="-228600">
+              <a:defRPr>
+                <a:solidFill>
+                  <a:schemeClr val="tx1"/>
+                </a:solidFill>
+                <a:latin typeface="Calibri" panose="020F0502020204030204" pitchFamily="34" charset="0"/>
+              </a:defRPr>
+            </a:lvl3pPr>
+            <a:lvl4pPr marL="1600200" indent="-228600">
+              <a:defRPr>
+                <a:solidFill>
+                  <a:schemeClr val="tx1"/>
+                </a:solidFill>
+                <a:latin typeface="Calibri" panose="020F0502020204030204" pitchFamily="34" charset="0"/>
+              </a:defRPr>
+            </a:lvl4pPr>
+            <a:lvl5pPr marL="2057400" indent="-228600">
+              <a:defRPr>
+                <a:solidFill>
+                  <a:schemeClr val="tx1"/>
+                </a:solidFill>
+                <a:latin typeface="Calibri" panose="020F0502020204030204" pitchFamily="34" charset="0"/>
+              </a:defRPr>
+            </a:lvl5pPr>
+            <a:lvl6pPr marL="2514600" indent="-228600" fontAlgn="base">
+              <a:spcBef>
+                <a:spcPct val="0"/>
+              </a:spcBef>
+              <a:spcAft>
+                <a:spcPct val="0"/>
+              </a:spcAft>
+              <a:defRPr>
+                <a:solidFill>
+                  <a:schemeClr val="tx1"/>
+                </a:solidFill>
+                <a:latin typeface="Calibri" panose="020F0502020204030204" pitchFamily="34" charset="0"/>
+              </a:defRPr>
+            </a:lvl6pPr>
+            <a:lvl7pPr marL="2971800" indent="-228600" fontAlgn="base">
+              <a:spcBef>
+                <a:spcPct val="0"/>
+              </a:spcBef>
+              <a:spcAft>
+                <a:spcPct val="0"/>
+              </a:spcAft>
+              <a:defRPr>
+                <a:solidFill>
+                  <a:schemeClr val="tx1"/>
+                </a:solidFill>
+                <a:latin typeface="Calibri" panose="020F0502020204030204" pitchFamily="34" charset="0"/>
+              </a:defRPr>
+            </a:lvl7pPr>
+            <a:lvl8pPr marL="3429000" indent="-228600" fontAlgn="base">
+              <a:spcBef>
+                <a:spcPct val="0"/>
+              </a:spcBef>
+              <a:spcAft>
+                <a:spcPct val="0"/>
+              </a:spcAft>
+              <a:defRPr>
+                <a:solidFill>
+                  <a:schemeClr val="tx1"/>
+                </a:solidFill>
+                <a:latin typeface="Calibri" panose="020F0502020204030204" pitchFamily="34" charset="0"/>
+              </a:defRPr>
+            </a:lvl8pPr>
+            <a:lvl9pPr marL="3886200" indent="-228600" fontAlgn="base">
+              <a:spcBef>
+                <a:spcPct val="0"/>
+              </a:spcBef>
+              <a:spcAft>
+                <a:spcPct val="0"/>
+              </a:spcAft>
+              <a:defRPr>
+                <a:solidFill>
+                  <a:schemeClr val="tx1"/>
+                </a:solidFill>
+                <a:latin typeface="Calibri" panose="020F0502020204030204" pitchFamily="34" charset="0"/>
+              </a:defRPr>
+            </a:lvl9pPr>
+          </a:lstStyle>
+          <a:p>
+            <a:pPr eaLnBrk="1" hangingPunct="1"/>
+            <a:r>
+              <a:rPr lang="es-MX" altLang="es-MX" sz="1600" b="1" dirty="0">
+                <a:solidFill>
+                  <a:srgbClr val="356FA2"/>
+                </a:solidFill>
+                <a:ea typeface="Verdana" panose="020B0604030504040204" pitchFamily="34" charset="0"/>
+                <a:cs typeface="Verdana" panose="020B0604030504040204" pitchFamily="34" charset="0"/>
+              </a:rPr>
+              <a:t>Permite definir tablero para </a:t>
+            </a:r>
+          </a:p>
+          <a:p>
+            <a:pPr eaLnBrk="1" hangingPunct="1"/>
+            <a:r>
+              <a:rPr lang="es-MX" altLang="es-MX" sz="1600" b="1" dirty="0">
+                <a:solidFill>
+                  <a:srgbClr val="356FA2"/>
+                </a:solidFill>
+                <a:ea typeface="Verdana" panose="020B0604030504040204" pitchFamily="34" charset="0"/>
+                <a:cs typeface="Verdana" panose="020B0604030504040204" pitchFamily="34" charset="0"/>
+              </a:rPr>
+              <a:t>seguimiento de </a:t>
+            </a:r>
+            <a:r>
+              <a:rPr lang="es-MX" altLang="es-MX" sz="1600" b="1" dirty="0" err="1">
+                <a:solidFill>
+                  <a:srgbClr val="356FA2"/>
+                </a:solidFill>
+                <a:ea typeface="Verdana" panose="020B0604030504040204" pitchFamily="34" charset="0"/>
+                <a:cs typeface="Verdana" panose="020B0604030504040204" pitchFamily="34" charset="0"/>
+              </a:rPr>
+              <a:t>KPIs</a:t>
+            </a:r>
+            <a:endParaRPr lang="es-MX" altLang="es-MX" sz="1600" b="1" dirty="0">
+              <a:solidFill>
+                <a:srgbClr val="356FA2"/>
+              </a:solidFill>
+              <a:ea typeface="Verdana" panose="020B0604030504040204" pitchFamily="34" charset="0"/>
+              <a:cs typeface="Verdana" panose="020B0604030504040204" pitchFamily="34" charset="0"/>
+            </a:endParaRPr>
+          </a:p>
+        </p:txBody>
+      </p:sp>
+      <p:sp>
+        <p:nvSpPr>
+          <p:cNvPr id="3073" name="TextBox 20">
+            <a:extLst>
+              <a:ext uri="{FF2B5EF4-FFF2-40B4-BE49-F238E27FC236}">
+                <a16:creationId xmlns:a16="http://schemas.microsoft.com/office/drawing/2014/main" id="{21B128CE-5534-63C5-EA26-4429B5FD316E}"/>
+              </a:ext>
+            </a:extLst>
+          </p:cNvPr>
+          <p:cNvSpPr txBox="1">
+            <a:spLocks noChangeArrowheads="1"/>
+          </p:cNvSpPr>
+          <p:nvPr/>
+        </p:nvSpPr>
+        <p:spPr bwMode="auto">
+          <a:xfrm>
+            <a:off x="7727530" y="4716774"/>
+            <a:ext cx="776287" cy="1514475"/>
+          </a:xfrm>
+          <a:prstGeom prst="rect">
+            <a:avLst/>
+          </a:prstGeom>
+          <a:noFill/>
+          <a:ln>
+            <a:noFill/>
+          </a:ln>
+          <a:extLst>
+            <a:ext uri="{909E8E84-426E-40DD-AFC4-6F175D3DCCD1}">
+              <a14:hiddenFill xmlns:a14="http://schemas.microsoft.com/office/drawing/2010/main">
+                <a:solidFill>
+                  <a:srgbClr val="FFFFFF"/>
+                </a:solidFill>
+              </a14:hiddenFill>
+            </a:ext>
+            <a:ext uri="{91240B29-F687-4F45-9708-019B960494DF}">
+              <a14:hiddenLine xmlns:a14="http://schemas.microsoft.com/office/drawing/2010/main" w="9525">
+                <a:solidFill>
+                  <a:srgbClr val="000000"/>
+                </a:solidFill>
+                <a:miter lim="800000"/>
+                <a:headEnd/>
+                <a:tailEnd/>
+              </a14:hiddenLine>
+            </a:ext>
+          </a:extLst>
+        </p:spPr>
+        <p:txBody>
+          <a:bodyPr wrap="none" lIns="0" tIns="0" rIns="0" bIns="0"/>
+          <a:lstStyle>
+            <a:lvl1pPr>
+              <a:defRPr>
+                <a:solidFill>
+                  <a:schemeClr val="tx1"/>
+                </a:solidFill>
+                <a:latin typeface="Calibri" panose="020F0502020204030204" pitchFamily="34" charset="0"/>
+              </a:defRPr>
+            </a:lvl1pPr>
+            <a:lvl2pPr marL="742950" indent="-285750">
+              <a:defRPr>
+                <a:solidFill>
+                  <a:schemeClr val="tx1"/>
+                </a:solidFill>
+                <a:latin typeface="Calibri" panose="020F0502020204030204" pitchFamily="34" charset="0"/>
+              </a:defRPr>
+            </a:lvl2pPr>
+            <a:lvl3pPr marL="1143000" indent="-228600">
+              <a:defRPr>
+                <a:solidFill>
+                  <a:schemeClr val="tx1"/>
+                </a:solidFill>
+                <a:latin typeface="Calibri" panose="020F0502020204030204" pitchFamily="34" charset="0"/>
+              </a:defRPr>
+            </a:lvl3pPr>
+            <a:lvl4pPr marL="1600200" indent="-228600">
+              <a:defRPr>
+                <a:solidFill>
+                  <a:schemeClr val="tx1"/>
+                </a:solidFill>
+                <a:latin typeface="Calibri" panose="020F0502020204030204" pitchFamily="34" charset="0"/>
+              </a:defRPr>
+            </a:lvl4pPr>
+            <a:lvl5pPr marL="2057400" indent="-228600">
+              <a:defRPr>
+                <a:solidFill>
+                  <a:schemeClr val="tx1"/>
+                </a:solidFill>
+                <a:latin typeface="Calibri" panose="020F0502020204030204" pitchFamily="34" charset="0"/>
+              </a:defRPr>
+            </a:lvl5pPr>
+            <a:lvl6pPr marL="2514600" indent="-228600" fontAlgn="base">
+              <a:spcBef>
+                <a:spcPct val="0"/>
+              </a:spcBef>
+              <a:spcAft>
+                <a:spcPct val="0"/>
+              </a:spcAft>
+              <a:defRPr>
+                <a:solidFill>
+                  <a:schemeClr val="tx1"/>
+                </a:solidFill>
+                <a:latin typeface="Calibri" panose="020F0502020204030204" pitchFamily="34" charset="0"/>
+              </a:defRPr>
+            </a:lvl6pPr>
+            <a:lvl7pPr marL="2971800" indent="-228600" fontAlgn="base">
+              <a:spcBef>
+                <a:spcPct val="0"/>
+              </a:spcBef>
+              <a:spcAft>
+                <a:spcPct val="0"/>
+              </a:spcAft>
+              <a:defRPr>
+                <a:solidFill>
+                  <a:schemeClr val="tx1"/>
+                </a:solidFill>
+                <a:latin typeface="Calibri" panose="020F0502020204030204" pitchFamily="34" charset="0"/>
+              </a:defRPr>
+            </a:lvl7pPr>
+            <a:lvl8pPr marL="3429000" indent="-228600" fontAlgn="base">
+              <a:spcBef>
+                <a:spcPct val="0"/>
+              </a:spcBef>
+              <a:spcAft>
+                <a:spcPct val="0"/>
+              </a:spcAft>
+              <a:defRPr>
+                <a:solidFill>
+                  <a:schemeClr val="tx1"/>
+                </a:solidFill>
+                <a:latin typeface="Calibri" panose="020F0502020204030204" pitchFamily="34" charset="0"/>
+              </a:defRPr>
+            </a:lvl8pPr>
+            <a:lvl9pPr marL="3886200" indent="-228600" fontAlgn="base">
+              <a:spcBef>
+                <a:spcPct val="0"/>
+              </a:spcBef>
+              <a:spcAft>
+                <a:spcPct val="0"/>
+              </a:spcAft>
+              <a:defRPr>
+                <a:solidFill>
+                  <a:schemeClr val="tx1"/>
+                </a:solidFill>
+                <a:latin typeface="Calibri" panose="020F0502020204030204" pitchFamily="34" charset="0"/>
+              </a:defRPr>
+            </a:lvl9pPr>
+          </a:lstStyle>
+          <a:p>
+            <a:pPr eaLnBrk="1" hangingPunct="1"/>
+            <a:r>
+              <a:rPr lang="es-ES" altLang="es-MX" sz="11500" dirty="0">
+                <a:solidFill>
+                  <a:srgbClr val="356FA2"/>
+                </a:solidFill>
+              </a:rPr>
+              <a:t>6</a:t>
+            </a:r>
+            <a:endParaRPr lang="es-MX" altLang="es-MX" sz="11500" dirty="0">
+              <a:solidFill>
+                <a:srgbClr val="356FA2"/>
+              </a:solidFill>
+            </a:endParaRPr>
+          </a:p>
+        </p:txBody>
+      </p:sp>
+      <p:pic>
+        <p:nvPicPr>
+          <p:cNvPr id="3080" name="Picture 8" descr="no duplication icon">
+            <a:extLst>
+              <a:ext uri="{FF2B5EF4-FFF2-40B4-BE49-F238E27FC236}">
+                <a16:creationId xmlns:a16="http://schemas.microsoft.com/office/drawing/2014/main" id="{1AF173F7-9142-25B3-E8C3-1E1AF0BEB425}"/>
+              </a:ext>
+            </a:extLst>
+          </p:cNvPr>
+          <p:cNvPicPr>
+            <a:picLocks noChangeAspect="1" noChangeArrowheads="1"/>
+          </p:cNvPicPr>
+          <p:nvPr/>
+        </p:nvPicPr>
+        <p:blipFill>
+          <a:blip r:embed="rId5">
+            <a:duotone>
+              <a:schemeClr val="accent2">
+                <a:shade val="45000"/>
+                <a:satMod val="135000"/>
+              </a:schemeClr>
+              <a:prstClr val="white"/>
+            </a:duotone>
+            <a:extLst>
+              <a:ext uri="{28A0092B-C50C-407E-A947-70E740481C1C}">
+                <a14:useLocalDpi xmlns:a14="http://schemas.microsoft.com/office/drawing/2010/main" val="0"/>
+              </a:ext>
+            </a:extLst>
+          </a:blip>
+          <a:srcRect/>
+          <a:stretch>
+            <a:fillRect/>
+          </a:stretch>
+        </p:blipFill>
+        <p:spPr bwMode="auto">
+          <a:xfrm>
+            <a:off x="6679765" y="1706720"/>
+            <a:ext cx="606991" cy="606991"/>
+          </a:xfrm>
+          <a:prstGeom prst="rect">
+            <a:avLst/>
+          </a:prstGeom>
+          <a:noFill/>
+          <a:extLst>
+            <a:ext uri="{909E8E84-426E-40DD-AFC4-6F175D3DCCD1}">
+              <a14:hiddenFill xmlns:a14="http://schemas.microsoft.com/office/drawing/2010/main">
+                <a:solidFill>
+                  <a:srgbClr val="FFFFFF"/>
+                </a:solidFill>
+              </a14:hiddenFill>
+            </a:ext>
+          </a:extLst>
+        </p:spPr>
+      </p:pic>
+      <p:pic>
+        <p:nvPicPr>
+          <p:cNvPr id="3082" name="Picture 10" descr="surveillance icon">
+            <a:extLst>
+              <a:ext uri="{FF2B5EF4-FFF2-40B4-BE49-F238E27FC236}">
+                <a16:creationId xmlns:a16="http://schemas.microsoft.com/office/drawing/2014/main" id="{CECC9D91-05E6-7F04-895E-07228F767A21}"/>
+              </a:ext>
+            </a:extLst>
+          </p:cNvPr>
+          <p:cNvPicPr>
+            <a:picLocks noChangeAspect="1" noChangeArrowheads="1"/>
+          </p:cNvPicPr>
+          <p:nvPr/>
+        </p:nvPicPr>
+        <p:blipFill>
+          <a:blip r:embed="rId6">
+            <a:duotone>
+              <a:schemeClr val="accent2">
+                <a:shade val="45000"/>
+                <a:satMod val="135000"/>
+              </a:schemeClr>
+              <a:prstClr val="white"/>
+            </a:duotone>
+            <a:extLst>
+              <a:ext uri="{28A0092B-C50C-407E-A947-70E740481C1C}">
+                <a14:useLocalDpi xmlns:a14="http://schemas.microsoft.com/office/drawing/2010/main" val="0"/>
+              </a:ext>
+            </a:extLst>
+          </a:blip>
+          <a:srcRect/>
+          <a:stretch>
+            <a:fillRect/>
+          </a:stretch>
+        </p:blipFill>
+        <p:spPr bwMode="auto">
+          <a:xfrm>
+            <a:off x="6794226" y="3447244"/>
+            <a:ext cx="606991" cy="606991"/>
+          </a:xfrm>
+          <a:prstGeom prst="rect">
+            <a:avLst/>
+          </a:prstGeom>
+          <a:noFill/>
+          <a:extLst>
+            <a:ext uri="{909E8E84-426E-40DD-AFC4-6F175D3DCCD1}">
+              <a14:hiddenFill xmlns:a14="http://schemas.microsoft.com/office/drawing/2010/main">
+                <a:solidFill>
+                  <a:srgbClr val="FFFFFF"/>
+                </a:solidFill>
+              </a14:hiddenFill>
+            </a:ext>
+          </a:extLst>
+        </p:spPr>
+      </p:pic>
+      <p:pic>
+        <p:nvPicPr>
+          <p:cNvPr id="3084" name="Picture 12" descr="divided data dashboard icon">
+            <a:extLst>
+              <a:ext uri="{FF2B5EF4-FFF2-40B4-BE49-F238E27FC236}">
+                <a16:creationId xmlns:a16="http://schemas.microsoft.com/office/drawing/2014/main" id="{7C549A8D-2A7E-5782-1813-7442005DF528}"/>
+              </a:ext>
+            </a:extLst>
+          </p:cNvPr>
+          <p:cNvPicPr>
+            <a:picLocks noChangeAspect="1" noChangeArrowheads="1"/>
+          </p:cNvPicPr>
+          <p:nvPr/>
+        </p:nvPicPr>
+        <p:blipFill>
+          <a:blip r:embed="rId7">
+            <a:duotone>
+              <a:schemeClr val="accent2">
+                <a:shade val="45000"/>
+                <a:satMod val="135000"/>
+              </a:schemeClr>
+              <a:prstClr val="white"/>
+            </a:duotone>
+            <a:extLst>
+              <a:ext uri="{28A0092B-C50C-407E-A947-70E740481C1C}">
+                <a14:useLocalDpi xmlns:a14="http://schemas.microsoft.com/office/drawing/2010/main" val="0"/>
+              </a:ext>
+            </a:extLst>
+          </a:blip>
+          <a:srcRect/>
+          <a:stretch>
+            <a:fillRect/>
+          </a:stretch>
+        </p:blipFill>
+        <p:spPr bwMode="auto">
+          <a:xfrm>
+            <a:off x="6714655" y="5140166"/>
+            <a:ext cx="667690" cy="667690"/>
+          </a:xfrm>
+          <a:prstGeom prst="rect">
+            <a:avLst/>
+          </a:prstGeom>
+          <a:noFill/>
+          <a:extLst>
+            <a:ext uri="{909E8E84-426E-40DD-AFC4-6F175D3DCCD1}">
+              <a14:hiddenFill xmlns:a14="http://schemas.microsoft.com/office/drawing/2010/main">
+                <a:solidFill>
+                  <a:srgbClr val="FFFFFF"/>
+                </a:solidFill>
+              </a14:hiddenFill>
+            </a:ext>
+          </a:extLst>
+        </p:spPr>
+      </p:pic>
+      <p:sp>
+        <p:nvSpPr>
+          <p:cNvPr id="3077" name="TextBox 64">
+            <a:extLst>
+              <a:ext uri="{FF2B5EF4-FFF2-40B4-BE49-F238E27FC236}">
+                <a16:creationId xmlns:a16="http://schemas.microsoft.com/office/drawing/2014/main" id="{0C1A1F29-A283-FD9D-BAD7-60993124B2D4}"/>
+              </a:ext>
+            </a:extLst>
+          </p:cNvPr>
+          <p:cNvSpPr txBox="1">
+            <a:spLocks noChangeArrowheads="1"/>
+          </p:cNvSpPr>
+          <p:nvPr/>
+        </p:nvSpPr>
+        <p:spPr bwMode="auto">
+          <a:xfrm>
+            <a:off x="1597785" y="1260028"/>
+            <a:ext cx="9085975" cy="441453"/>
+          </a:xfrm>
+          <a:prstGeom prst="rect">
+            <a:avLst/>
+          </a:prstGeom>
+          <a:noFill/>
+          <a:ln>
+            <a:noFill/>
+          </a:ln>
+          <a:extLst>
+            <a:ext uri="{909E8E84-426E-40DD-AFC4-6F175D3DCCD1}">
+              <a14:hiddenFill xmlns:a14="http://schemas.microsoft.com/office/drawing/2010/main">
+                <a:solidFill>
+                  <a:srgbClr val="FFFFFF"/>
+                </a:solidFill>
+              </a14:hiddenFill>
+            </a:ext>
+            <a:ext uri="{91240B29-F687-4F45-9708-019B960494DF}">
+              <a14:hiddenLine xmlns:a14="http://schemas.microsoft.com/office/drawing/2010/main" w="9525">
+                <a:solidFill>
+                  <a:srgbClr val="000000"/>
+                </a:solidFill>
+                <a:miter lim="800000"/>
+                <a:headEnd/>
+                <a:tailEnd/>
+              </a14:hiddenLine>
+            </a:ext>
+          </a:extLst>
+        </p:spPr>
+        <p:txBody>
+          <a:bodyPr wrap="square">
+            <a:spAutoFit/>
+          </a:bodyPr>
+          <a:lstStyle>
+            <a:lvl1pPr>
+              <a:defRPr>
+                <a:solidFill>
+                  <a:schemeClr val="tx1"/>
+                </a:solidFill>
+                <a:latin typeface="Calibri" panose="020F0502020204030204" pitchFamily="34" charset="0"/>
+              </a:defRPr>
+            </a:lvl1pPr>
+            <a:lvl2pPr marL="742950" indent="-285750">
+              <a:defRPr>
+                <a:solidFill>
+                  <a:schemeClr val="tx1"/>
+                </a:solidFill>
+                <a:latin typeface="Calibri" panose="020F0502020204030204" pitchFamily="34" charset="0"/>
+              </a:defRPr>
+            </a:lvl2pPr>
+            <a:lvl3pPr marL="1143000" indent="-228600">
+              <a:defRPr>
+                <a:solidFill>
+                  <a:schemeClr val="tx1"/>
+                </a:solidFill>
+                <a:latin typeface="Calibri" panose="020F0502020204030204" pitchFamily="34" charset="0"/>
+              </a:defRPr>
+            </a:lvl3pPr>
+            <a:lvl4pPr marL="1600200" indent="-228600">
+              <a:defRPr>
+                <a:solidFill>
+                  <a:schemeClr val="tx1"/>
+                </a:solidFill>
+                <a:latin typeface="Calibri" panose="020F0502020204030204" pitchFamily="34" charset="0"/>
+              </a:defRPr>
+            </a:lvl4pPr>
+            <a:lvl5pPr marL="2057400" indent="-228600">
+              <a:defRPr>
+                <a:solidFill>
+                  <a:schemeClr val="tx1"/>
+                </a:solidFill>
+                <a:latin typeface="Calibri" panose="020F0502020204030204" pitchFamily="34" charset="0"/>
+              </a:defRPr>
+            </a:lvl5pPr>
+            <a:lvl6pPr marL="2514600" indent="-228600" fontAlgn="base">
+              <a:spcBef>
+                <a:spcPct val="0"/>
+              </a:spcBef>
+              <a:spcAft>
+                <a:spcPct val="0"/>
+              </a:spcAft>
+              <a:defRPr>
+                <a:solidFill>
+                  <a:schemeClr val="tx1"/>
+                </a:solidFill>
+                <a:latin typeface="Calibri" panose="020F0502020204030204" pitchFamily="34" charset="0"/>
+              </a:defRPr>
+            </a:lvl6pPr>
+            <a:lvl7pPr marL="2971800" indent="-228600" fontAlgn="base">
+              <a:spcBef>
+                <a:spcPct val="0"/>
+              </a:spcBef>
+              <a:spcAft>
+                <a:spcPct val="0"/>
+              </a:spcAft>
+              <a:defRPr>
+                <a:solidFill>
+                  <a:schemeClr val="tx1"/>
+                </a:solidFill>
+                <a:latin typeface="Calibri" panose="020F0502020204030204" pitchFamily="34" charset="0"/>
+              </a:defRPr>
+            </a:lvl7pPr>
+            <a:lvl8pPr marL="3429000" indent="-228600" fontAlgn="base">
+              <a:spcBef>
+                <a:spcPct val="0"/>
+              </a:spcBef>
+              <a:spcAft>
+                <a:spcPct val="0"/>
+              </a:spcAft>
+              <a:defRPr>
+                <a:solidFill>
+                  <a:schemeClr val="tx1"/>
+                </a:solidFill>
+                <a:latin typeface="Calibri" panose="020F0502020204030204" pitchFamily="34" charset="0"/>
+              </a:defRPr>
+            </a:lvl8pPr>
+            <a:lvl9pPr marL="3886200" indent="-228600" fontAlgn="base">
+              <a:spcBef>
+                <a:spcPct val="0"/>
+              </a:spcBef>
+              <a:spcAft>
+                <a:spcPct val="0"/>
+              </a:spcAft>
+              <a:defRPr>
+                <a:solidFill>
+                  <a:schemeClr val="tx1"/>
+                </a:solidFill>
+                <a:latin typeface="Calibri" panose="020F0502020204030204" pitchFamily="34" charset="0"/>
+              </a:defRPr>
+            </a:lvl9pPr>
+          </a:lstStyle>
+          <a:p>
+            <a:pPr eaLnBrk="1" hangingPunct="1"/>
+            <a:r>
+              <a:rPr lang="es-MX" altLang="es-MX" sz="1800" b="1" dirty="0">
+                <a:solidFill>
+                  <a:srgbClr val="00B050"/>
+                </a:solidFill>
+                <a:ea typeface="Verdana" panose="020B0604030504040204" pitchFamily="34" charset="0"/>
+                <a:cs typeface="Verdana" panose="020B0604030504040204" pitchFamily="34" charset="0"/>
+              </a:rPr>
+              <a:t>Beneficios para </a:t>
+            </a:r>
+            <a:r>
+              <a:rPr lang="es-MX" sz="1800" b="1" dirty="0">
+                <a:solidFill>
+                  <a:srgbClr val="00B050"/>
+                </a:solidFill>
+              </a:rPr>
+              <a:t>Inversión para todos, S.A por la implementación del nuevo MDM Informática </a:t>
+            </a:r>
+            <a:endParaRPr lang="es-MX" altLang="es-MX" sz="1800" b="1" dirty="0">
+              <a:solidFill>
+                <a:srgbClr val="00B050"/>
+              </a:solidFill>
+              <a:ea typeface="Verdana" panose="020B0604030504040204" pitchFamily="34" charset="0"/>
+              <a:cs typeface="Verdana" panose="020B0604030504040204" pitchFamily="34" charset="0"/>
+            </a:endParaRPr>
+          </a:p>
+        </p:txBody>
+      </p:sp>
+    </p:spTree>
+    <p:extLst>
+      <p:ext uri="{BB962C8B-B14F-4D97-AF65-F5344CB8AC3E}">
+        <p14:creationId xmlns:p14="http://schemas.microsoft.com/office/powerpoint/2010/main" val="1587686433"/>
+      </p:ext>
+    </p:extLst>
+  </p:cSld>
+  <p:clrMapOvr>
+    <a:masterClrMapping/>
+  </p:clrMapOvr>
+</p:sld>
+</file>
+
+<file path=ppt/slides/slide9.xml><?xml version="1.0" encoding="utf-8"?>
+<p:sld xmlns:a="http://schemas.openxmlformats.org/drawingml/2006/main" xmlns:r="http://schemas.openxmlformats.org/officeDocument/2006/relationships" xmlns:p="http://schemas.openxmlformats.org/presentationml/2006/main">
+  <p:cSld>
+    <p:spTree>
+      <p:nvGrpSpPr>
+        <p:cNvPr id="1" name=""/>
+        <p:cNvGrpSpPr/>
+        <p:nvPr/>
+      </p:nvGrpSpPr>
+      <p:grpSpPr>
+        <a:xfrm>
+          <a:off x="0" y="0"/>
+          <a:ext cx="0" cy="0"/>
+          <a:chOff x="0" y="0"/>
+          <a:chExt cx="0" cy="0"/>
+        </a:xfrm>
+      </p:grpSpPr>
+      <p:sp>
+        <p:nvSpPr>
+          <p:cNvPr id="2" name="Title 1">
+            <a:extLst>
+              <a:ext uri="{FF2B5EF4-FFF2-40B4-BE49-F238E27FC236}">
+                <a16:creationId xmlns:a16="http://schemas.microsoft.com/office/drawing/2014/main" id="{0D83F039-EE69-91EA-CF6A-1DF7034140B3}"/>
+              </a:ext>
+            </a:extLst>
+          </p:cNvPr>
+          <p:cNvSpPr txBox="1">
+            <a:spLocks/>
+          </p:cNvSpPr>
+          <p:nvPr/>
+        </p:nvSpPr>
+        <p:spPr>
+          <a:xfrm>
+            <a:off x="384694" y="294468"/>
+            <a:ext cx="11338560" cy="768263"/>
+          </a:xfrm>
+          <a:prstGeom prst="rect">
+            <a:avLst/>
+          </a:prstGeom>
+        </p:spPr>
+        <p:txBody>
+          <a:bodyPr anchor="b" anchorCtr="0"/>
+          <a:lstStyle>
+            <a:lvl1pPr algn="l" defTabSz="914400" rtl="0" eaLnBrk="1" latinLnBrk="0" hangingPunct="1">
+              <a:lnSpc>
+                <a:spcPct val="90000"/>
+              </a:lnSpc>
+              <a:spcBef>
+                <a:spcPct val="0"/>
+              </a:spcBef>
+              <a:buNone/>
+              <a:defRPr sz="2800" b="1" kern="1200">
+                <a:solidFill>
+                  <a:schemeClr val="tx1"/>
+                </a:solidFill>
+                <a:latin typeface="+mj-lt"/>
+                <a:ea typeface="+mj-ea"/>
+                <a:cs typeface="+mj-cs"/>
+              </a:defRPr>
+            </a:lvl1pPr>
+          </a:lstStyle>
+          <a:p>
+            <a:r>
+              <a:rPr lang="es-MX" sz="2400" dirty="0"/>
+              <a:t>“Inversión para todos, S.A”  cuenta con una ruta clara para </a:t>
+            </a:r>
+            <a:r>
+              <a:rPr lang="es-MX" sz="2400" dirty="0" err="1"/>
+              <a:t>implemtnar</a:t>
+            </a:r>
+            <a:r>
+              <a:rPr lang="es-MX" sz="2400" dirty="0"/>
+              <a:t> el nuevo sistema de gestión de datos </a:t>
+            </a:r>
+          </a:p>
+        </p:txBody>
+      </p:sp>
+      <p:sp>
+        <p:nvSpPr>
+          <p:cNvPr id="22" name="AutoShape 9">
+            <a:extLst>
+              <a:ext uri="{FF2B5EF4-FFF2-40B4-BE49-F238E27FC236}">
+                <a16:creationId xmlns:a16="http://schemas.microsoft.com/office/drawing/2014/main" id="{04CF3EF8-EBD5-EC11-7A6B-2EFA8AB0CC77}"/>
+              </a:ext>
+            </a:extLst>
+          </p:cNvPr>
+          <p:cNvSpPr>
+            <a:spLocks noChangeArrowheads="1"/>
+          </p:cNvSpPr>
+          <p:nvPr/>
+        </p:nvSpPr>
+        <p:spPr bwMode="gray">
+          <a:xfrm>
+            <a:off x="4663440" y="0"/>
+            <a:ext cx="2566630" cy="330088"/>
+          </a:xfrm>
+          <a:prstGeom prst="chevron">
+            <a:avLst>
+              <a:gd name="adj" fmla="val 32237"/>
+            </a:avLst>
+          </a:prstGeom>
+          <a:solidFill>
+            <a:srgbClr val="2E5960">
+              <a:alpha val="20000"/>
+            </a:srgbClr>
+          </a:solidFill>
+          <a:ln w="12700" cap="rnd" algn="ctr">
+            <a:noFill/>
+            <a:miter lim="800000"/>
+            <a:headEnd/>
+            <a:tailEnd/>
+          </a:ln>
+        </p:spPr>
+        <p:txBody>
+          <a:bodyPr lIns="0" tIns="0" rIns="0" bIns="0" anchor="ctr" anchorCtr="1"/>
+          <a:lstStyle/>
+          <a:p>
+            <a:pPr>
+              <a:lnSpc>
+                <a:spcPct val="106000"/>
+              </a:lnSpc>
+            </a:pPr>
+            <a:r>
+              <a:rPr lang="es-ES" sz="800" dirty="0">
+                <a:solidFill>
+                  <a:schemeClr val="bg1"/>
+                </a:solidFill>
+                <a:latin typeface="Candara Light" panose="020E0502030303020204" pitchFamily="34" charset="0"/>
+                <a:sym typeface="Arial"/>
+              </a:rPr>
+              <a:t>Evaluación de necesidades para elección de herramienta MDM (Master Data Management)</a:t>
+            </a:r>
+          </a:p>
+        </p:txBody>
+      </p:sp>
+      <p:sp>
+        <p:nvSpPr>
+          <p:cNvPr id="23" name="AutoShape 9">
+            <a:extLst>
+              <a:ext uri="{FF2B5EF4-FFF2-40B4-BE49-F238E27FC236}">
+                <a16:creationId xmlns:a16="http://schemas.microsoft.com/office/drawing/2014/main" id="{57CC4626-F3CA-DA48-7235-A7FE7D81B0AD}"/>
+              </a:ext>
+            </a:extLst>
+          </p:cNvPr>
+          <p:cNvSpPr>
+            <a:spLocks noChangeArrowheads="1"/>
+          </p:cNvSpPr>
+          <p:nvPr/>
+        </p:nvSpPr>
+        <p:spPr bwMode="gray">
+          <a:xfrm>
+            <a:off x="7142480" y="0"/>
+            <a:ext cx="2566630" cy="330088"/>
+          </a:xfrm>
+          <a:prstGeom prst="chevron">
+            <a:avLst>
+              <a:gd name="adj" fmla="val 32237"/>
+            </a:avLst>
+          </a:prstGeom>
+          <a:solidFill>
             <a:schemeClr val="accent5">
-              <a:lumMod val="60000"/>
-              <a:lumOff val="40000"/>
+              <a:lumMod val="75000"/>
+              <a:alpha val="20000"/>
             </a:schemeClr>
           </a:solidFill>
           <a:ln w="12700" cap="rnd" algn="ctr">
@@ -23218,6 +26074,19 @@
                 <a:spcPct val="106000"/>
               </a:lnSpc>
             </a:pPr>
+            <a:endParaRPr lang="es-MX" sz="800" dirty="0">
+              <a:solidFill>
+                <a:schemeClr val="bg1"/>
+              </a:solidFill>
+              <a:latin typeface="Candara Light" panose="020E0502030303020204" pitchFamily="34" charset="0"/>
+            </a:endParaRPr>
+          </a:p>
+          <a:p>
+            <a:pPr>
+              <a:lnSpc>
+                <a:spcPct val="106000"/>
+              </a:lnSpc>
+            </a:pPr>
             <a:r>
               <a:rPr lang="es-MX" sz="800" dirty="0">
                 <a:solidFill>
@@ -23225,11 +26094,1817 @@
                 </a:solidFill>
                 <a:latin typeface="Candara Light" panose="020E0502030303020204" pitchFamily="34" charset="0"/>
               </a:rPr>
-              <a:t>Definición de beneficios para el negocio</a:t>
-            </a:r>
+              <a:t>Requerimientos de negocio y </a:t>
+            </a:r>
+            <a:r>
+              <a:rPr lang="es-ES" sz="800" dirty="0">
+                <a:solidFill>
+                  <a:schemeClr val="bg1"/>
+                </a:solidFill>
+                <a:latin typeface="Candara Light" panose="020E0502030303020204" pitchFamily="34" charset="0"/>
+              </a:rPr>
+              <a:t>características técnicas relevantes</a:t>
+            </a:r>
+          </a:p>
+          <a:p>
+            <a:pPr>
+              <a:lnSpc>
+                <a:spcPct val="106000"/>
+              </a:lnSpc>
+            </a:pPr>
+            <a:endParaRPr lang="es-ES" sz="800" dirty="0">
+              <a:solidFill>
+                <a:schemeClr val="bg1"/>
+              </a:solidFill>
+              <a:latin typeface="Candara Light" panose="020E0502030303020204" pitchFamily="34" charset="0"/>
+              <a:sym typeface="Arial"/>
+            </a:endParaRPr>
           </a:p>
         </p:txBody>
       </p:sp>
+      <p:sp>
+        <p:nvSpPr>
+          <p:cNvPr id="24" name="AutoShape 9">
+            <a:extLst>
+              <a:ext uri="{FF2B5EF4-FFF2-40B4-BE49-F238E27FC236}">
+                <a16:creationId xmlns:a16="http://schemas.microsoft.com/office/drawing/2014/main" id="{B156549C-1B78-7AC7-D245-945146A922AA}"/>
+              </a:ext>
+            </a:extLst>
+          </p:cNvPr>
+          <p:cNvSpPr>
+            <a:spLocks noChangeArrowheads="1"/>
+          </p:cNvSpPr>
+          <p:nvPr/>
+        </p:nvSpPr>
+        <p:spPr bwMode="gray">
+          <a:xfrm>
+            <a:off x="9621520" y="0"/>
+            <a:ext cx="2566630" cy="330088"/>
+          </a:xfrm>
+          <a:prstGeom prst="chevron">
+            <a:avLst>
+              <a:gd name="adj" fmla="val 32237"/>
+            </a:avLst>
+          </a:prstGeom>
+          <a:solidFill>
+            <a:srgbClr val="89BCC5"/>
+          </a:solidFill>
+          <a:ln w="12700" cap="rnd" algn="ctr">
+            <a:noFill/>
+            <a:miter lim="800000"/>
+            <a:headEnd/>
+            <a:tailEnd/>
+          </a:ln>
+        </p:spPr>
+        <p:txBody>
+          <a:bodyPr lIns="0" tIns="0" rIns="0" bIns="0" anchor="ctr" anchorCtr="1"/>
+          <a:lstStyle/>
+          <a:p>
+            <a:pPr>
+              <a:lnSpc>
+                <a:spcPct val="106000"/>
+              </a:lnSpc>
+            </a:pPr>
+            <a:r>
+              <a:rPr lang="es-MX" sz="800" dirty="0">
+                <a:solidFill>
+                  <a:schemeClr val="bg1"/>
+                </a:solidFill>
+                <a:latin typeface="Candara Light" panose="020E0502030303020204" pitchFamily="34" charset="0"/>
+              </a:rPr>
+              <a:t>Definición de beneficios para el negocio</a:t>
+            </a:r>
+          </a:p>
+        </p:txBody>
+      </p:sp>
+      <p:sp>
+        <p:nvSpPr>
+          <p:cNvPr id="3" name="Pentagon 26">
+            <a:extLst>
+              <a:ext uri="{FF2B5EF4-FFF2-40B4-BE49-F238E27FC236}">
+                <a16:creationId xmlns:a16="http://schemas.microsoft.com/office/drawing/2014/main" id="{1598E5E7-0A8D-1871-09AE-C81C0E9277DB}"/>
+              </a:ext>
+            </a:extLst>
+          </p:cNvPr>
+          <p:cNvSpPr>
+            <a:spLocks/>
+          </p:cNvSpPr>
+          <p:nvPr/>
+        </p:nvSpPr>
+        <p:spPr>
+          <a:xfrm>
+            <a:off x="75517" y="1353498"/>
+            <a:ext cx="1967325" cy="1118769"/>
+          </a:xfrm>
+          <a:prstGeom prst="homePlate">
+            <a:avLst>
+              <a:gd name="adj" fmla="val 22180"/>
+            </a:avLst>
+          </a:prstGeom>
+          <a:noFill/>
+          <a:ln w="19050">
+            <a:solidFill>
+              <a:schemeClr val="accent1"/>
+            </a:solidFill>
+          </a:ln>
+        </p:spPr>
+        <p:style>
+          <a:lnRef idx="2">
+            <a:schemeClr val="accent1">
+              <a:shade val="50000"/>
+            </a:schemeClr>
+          </a:lnRef>
+          <a:fillRef idx="1">
+            <a:schemeClr val="accent1"/>
+          </a:fillRef>
+          <a:effectRef idx="0">
+            <a:schemeClr val="accent1"/>
+          </a:effectRef>
+          <a:fontRef idx="minor">
+            <a:schemeClr val="lt1"/>
+          </a:fontRef>
+        </p:style>
+        <p:txBody>
+          <a:bodyPr rtlCol="0" anchor="t" anchorCtr="0"/>
+          <a:lstStyle/>
+          <a:p>
+            <a:pPr>
+              <a:spcBef>
+                <a:spcPts val="600"/>
+              </a:spcBef>
+              <a:buClr>
+                <a:schemeClr val="bg1"/>
+              </a:buClr>
+            </a:pPr>
+            <a:r>
+              <a:rPr lang="es-MX" b="1" dirty="0">
+                <a:solidFill>
+                  <a:schemeClr val="accent1"/>
+                </a:solidFill>
+                <a:latin typeface="Arial" pitchFamily="34" charset="0"/>
+                <a:cs typeface="Arial" pitchFamily="34" charset="0"/>
+              </a:rPr>
+              <a:t>Fa</a:t>
+            </a:r>
+            <a:r>
+              <a:rPr lang="es-MX" sz="1400" b="1" kern="0" dirty="0">
+                <a:solidFill>
+                  <a:schemeClr val="accent1"/>
+                </a:solidFill>
+                <a:latin typeface="Arial" pitchFamily="34" charset="0"/>
+                <a:cs typeface="Arial" pitchFamily="34" charset="0"/>
+              </a:rPr>
+              <a:t>se 1</a:t>
+            </a:r>
+          </a:p>
+          <a:p>
+            <a:pPr marL="0" lvl="1">
+              <a:spcBef>
+                <a:spcPts val="600"/>
+              </a:spcBef>
+              <a:buClr>
+                <a:schemeClr val="bg1"/>
+              </a:buClr>
+            </a:pPr>
+            <a:r>
+              <a:rPr lang="es-MX" sz="1200" kern="0" dirty="0">
+                <a:solidFill>
+                  <a:schemeClr val="accent1"/>
+                </a:solidFill>
+                <a:latin typeface="Arial" pitchFamily="34" charset="0"/>
+                <a:cs typeface="Arial" pitchFamily="34" charset="0"/>
+              </a:rPr>
+              <a:t>Definir metas y objetivos </a:t>
+            </a:r>
+          </a:p>
+        </p:txBody>
+      </p:sp>
+      <p:sp>
+        <p:nvSpPr>
+          <p:cNvPr id="4" name="Chevron 27">
+            <a:extLst>
+              <a:ext uri="{FF2B5EF4-FFF2-40B4-BE49-F238E27FC236}">
+                <a16:creationId xmlns:a16="http://schemas.microsoft.com/office/drawing/2014/main" id="{3942886C-0D11-D70F-FF89-022900F41DA7}"/>
+              </a:ext>
+            </a:extLst>
+          </p:cNvPr>
+          <p:cNvSpPr>
+            <a:spLocks/>
+          </p:cNvSpPr>
+          <p:nvPr/>
+        </p:nvSpPr>
+        <p:spPr>
+          <a:xfrm>
+            <a:off x="2075005" y="1353498"/>
+            <a:ext cx="1967325" cy="1118769"/>
+          </a:xfrm>
+          <a:prstGeom prst="chevron">
+            <a:avLst>
+              <a:gd name="adj" fmla="val 21925"/>
+            </a:avLst>
+          </a:prstGeom>
+          <a:noFill/>
+          <a:ln w="19050">
+            <a:solidFill>
+              <a:schemeClr val="accent2"/>
+            </a:solidFill>
+          </a:ln>
+        </p:spPr>
+        <p:style>
+          <a:lnRef idx="2">
+            <a:schemeClr val="accent1">
+              <a:shade val="50000"/>
+            </a:schemeClr>
+          </a:lnRef>
+          <a:fillRef idx="1">
+            <a:schemeClr val="accent1"/>
+          </a:fillRef>
+          <a:effectRef idx="0">
+            <a:schemeClr val="accent1"/>
+          </a:effectRef>
+          <a:fontRef idx="minor">
+            <a:schemeClr val="lt1"/>
+          </a:fontRef>
+        </p:style>
+        <p:txBody>
+          <a:bodyPr rtlCol="0" anchor="t" anchorCtr="0"/>
+          <a:lstStyle/>
+          <a:p>
+            <a:pPr>
+              <a:spcBef>
+                <a:spcPts val="600"/>
+              </a:spcBef>
+              <a:buClr>
+                <a:schemeClr val="bg1"/>
+              </a:buClr>
+            </a:pPr>
+            <a:r>
+              <a:rPr lang="es-MX" b="1" dirty="0">
+                <a:solidFill>
+                  <a:schemeClr val="accent2"/>
+                </a:solidFill>
+                <a:latin typeface="Arial" pitchFamily="34" charset="0"/>
+                <a:cs typeface="Arial" pitchFamily="34" charset="0"/>
+              </a:rPr>
+              <a:t>F</a:t>
+            </a:r>
+            <a:r>
+              <a:rPr lang="es-MX" sz="1400" b="1" kern="0" dirty="0">
+                <a:solidFill>
+                  <a:schemeClr val="accent2"/>
+                </a:solidFill>
+                <a:latin typeface="Arial" pitchFamily="34" charset="0"/>
+                <a:cs typeface="Arial" pitchFamily="34" charset="0"/>
+              </a:rPr>
+              <a:t>ase 2</a:t>
+            </a:r>
+          </a:p>
+          <a:p>
+            <a:pPr marL="0" lvl="1">
+              <a:spcBef>
+                <a:spcPts val="600"/>
+              </a:spcBef>
+              <a:buClr>
+                <a:schemeClr val="bg1"/>
+              </a:buClr>
+            </a:pPr>
+            <a:r>
+              <a:rPr lang="es-MX" sz="1200" kern="0" dirty="0">
+                <a:solidFill>
+                  <a:schemeClr val="accent2"/>
+                </a:solidFill>
+                <a:latin typeface="Arial" pitchFamily="34" charset="0"/>
+                <a:cs typeface="Arial" pitchFamily="34" charset="0"/>
+              </a:rPr>
+              <a:t>Definir políticas de datos (con base en  Software Informática)</a:t>
+            </a:r>
+          </a:p>
+        </p:txBody>
+      </p:sp>
+      <p:sp>
+        <p:nvSpPr>
+          <p:cNvPr id="5" name="Chevron 28">
+            <a:extLst>
+              <a:ext uri="{FF2B5EF4-FFF2-40B4-BE49-F238E27FC236}">
+                <a16:creationId xmlns:a16="http://schemas.microsoft.com/office/drawing/2014/main" id="{FD5A28D9-B913-C114-3F76-845FC38E4362}"/>
+              </a:ext>
+            </a:extLst>
+          </p:cNvPr>
+          <p:cNvSpPr>
+            <a:spLocks/>
+          </p:cNvSpPr>
+          <p:nvPr/>
+        </p:nvSpPr>
+        <p:spPr>
+          <a:xfrm>
+            <a:off x="4074493" y="1353498"/>
+            <a:ext cx="1967325" cy="1118769"/>
+          </a:xfrm>
+          <a:prstGeom prst="chevron">
+            <a:avLst>
+              <a:gd name="adj" fmla="val 21925"/>
+            </a:avLst>
+          </a:prstGeom>
+          <a:noFill/>
+          <a:ln w="19050">
+            <a:solidFill>
+              <a:srgbClr val="C00000"/>
+            </a:solidFill>
+          </a:ln>
+        </p:spPr>
+        <p:style>
+          <a:lnRef idx="2">
+            <a:schemeClr val="accent1">
+              <a:shade val="50000"/>
+            </a:schemeClr>
+          </a:lnRef>
+          <a:fillRef idx="1">
+            <a:schemeClr val="accent1"/>
+          </a:fillRef>
+          <a:effectRef idx="0">
+            <a:schemeClr val="accent1"/>
+          </a:effectRef>
+          <a:fontRef idx="minor">
+            <a:schemeClr val="lt1"/>
+          </a:fontRef>
+        </p:style>
+        <p:txBody>
+          <a:bodyPr rtlCol="0" anchor="t" anchorCtr="0"/>
+          <a:lstStyle/>
+          <a:p>
+            <a:pPr>
+              <a:spcBef>
+                <a:spcPts val="600"/>
+              </a:spcBef>
+              <a:buClr>
+                <a:schemeClr val="bg1"/>
+              </a:buClr>
+            </a:pPr>
+            <a:r>
+              <a:rPr lang="es-MX" b="1" dirty="0">
+                <a:solidFill>
+                  <a:srgbClr val="C00000"/>
+                </a:solidFill>
+                <a:latin typeface="Arial" pitchFamily="34" charset="0"/>
+                <a:cs typeface="Arial" pitchFamily="34" charset="0"/>
+              </a:rPr>
+              <a:t>F</a:t>
+            </a:r>
+            <a:r>
+              <a:rPr lang="es-MX" sz="1400" b="1" kern="0" dirty="0">
+                <a:solidFill>
+                  <a:srgbClr val="C00000"/>
+                </a:solidFill>
+                <a:latin typeface="Arial" pitchFamily="34" charset="0"/>
+                <a:cs typeface="Arial" pitchFamily="34" charset="0"/>
+              </a:rPr>
+              <a:t>ase 3</a:t>
+            </a:r>
+          </a:p>
+          <a:p>
+            <a:pPr marL="0" lvl="1">
+              <a:spcBef>
+                <a:spcPts val="600"/>
+              </a:spcBef>
+              <a:buClr>
+                <a:schemeClr val="bg1"/>
+              </a:buClr>
+            </a:pPr>
+            <a:r>
+              <a:rPr lang="es-MX" sz="1200" kern="0" dirty="0">
+                <a:solidFill>
+                  <a:srgbClr val="C00000"/>
+                </a:solidFill>
+                <a:latin typeface="Arial" pitchFamily="34" charset="0"/>
+                <a:cs typeface="Arial" pitchFamily="34" charset="0"/>
+              </a:rPr>
+              <a:t>Comunicar y capacitar a los </a:t>
+            </a:r>
+            <a:r>
+              <a:rPr lang="es-MX" sz="1200" i="1" kern="0" dirty="0" err="1">
+                <a:solidFill>
+                  <a:srgbClr val="C00000"/>
+                </a:solidFill>
+                <a:latin typeface="Arial" pitchFamily="34" charset="0"/>
+                <a:cs typeface="Arial" pitchFamily="34" charset="0"/>
+              </a:rPr>
+              <a:t>stakeholders</a:t>
+            </a:r>
+            <a:r>
+              <a:rPr lang="es-MX" sz="1200" kern="0" dirty="0">
+                <a:solidFill>
+                  <a:srgbClr val="C00000"/>
+                </a:solidFill>
+                <a:latin typeface="Arial" pitchFamily="34" charset="0"/>
+                <a:cs typeface="Arial" pitchFamily="34" charset="0"/>
+              </a:rPr>
+              <a:t> para el cambio </a:t>
+            </a:r>
+          </a:p>
+        </p:txBody>
+      </p:sp>
+      <p:sp>
+        <p:nvSpPr>
+          <p:cNvPr id="6" name="Chevron 29">
+            <a:extLst>
+              <a:ext uri="{FF2B5EF4-FFF2-40B4-BE49-F238E27FC236}">
+                <a16:creationId xmlns:a16="http://schemas.microsoft.com/office/drawing/2014/main" id="{CB9B9531-DFE0-5065-5B3B-82939D23752C}"/>
+              </a:ext>
+            </a:extLst>
+          </p:cNvPr>
+          <p:cNvSpPr>
+            <a:spLocks/>
+          </p:cNvSpPr>
+          <p:nvPr/>
+        </p:nvSpPr>
+        <p:spPr>
+          <a:xfrm>
+            <a:off x="6073981" y="1353498"/>
+            <a:ext cx="1967325" cy="1118769"/>
+          </a:xfrm>
+          <a:prstGeom prst="chevron">
+            <a:avLst>
+              <a:gd name="adj" fmla="val 21925"/>
+            </a:avLst>
+          </a:prstGeom>
+          <a:noFill/>
+          <a:ln w="19050">
+            <a:solidFill>
+              <a:schemeClr val="accent5"/>
+            </a:solidFill>
+          </a:ln>
+        </p:spPr>
+        <p:style>
+          <a:lnRef idx="2">
+            <a:schemeClr val="accent1">
+              <a:shade val="50000"/>
+            </a:schemeClr>
+          </a:lnRef>
+          <a:fillRef idx="1">
+            <a:schemeClr val="accent1"/>
+          </a:fillRef>
+          <a:effectRef idx="0">
+            <a:schemeClr val="accent1"/>
+          </a:effectRef>
+          <a:fontRef idx="minor">
+            <a:schemeClr val="lt1"/>
+          </a:fontRef>
+        </p:style>
+        <p:txBody>
+          <a:bodyPr rtlCol="0" anchor="t" anchorCtr="0"/>
+          <a:lstStyle/>
+          <a:p>
+            <a:pPr>
+              <a:spcBef>
+                <a:spcPts val="600"/>
+              </a:spcBef>
+              <a:buClr>
+                <a:schemeClr val="bg1"/>
+              </a:buClr>
+            </a:pPr>
+            <a:r>
+              <a:rPr lang="es-MX" sz="1400" b="1" kern="0" dirty="0">
+                <a:solidFill>
+                  <a:schemeClr val="accent5"/>
+                </a:solidFill>
+                <a:latin typeface="Arial" pitchFamily="34" charset="0"/>
+                <a:cs typeface="Arial" pitchFamily="34" charset="0"/>
+              </a:rPr>
+              <a:t>Fase 4</a:t>
+            </a:r>
+          </a:p>
+          <a:p>
+            <a:pPr marL="0" lvl="1">
+              <a:spcBef>
+                <a:spcPts val="600"/>
+              </a:spcBef>
+              <a:buClr>
+                <a:schemeClr val="bg1"/>
+              </a:buClr>
+            </a:pPr>
+            <a:r>
+              <a:rPr lang="es-MX" sz="1200" kern="0" dirty="0">
+                <a:solidFill>
+                  <a:schemeClr val="accent5"/>
+                </a:solidFill>
+                <a:latin typeface="Arial" pitchFamily="34" charset="0"/>
+                <a:cs typeface="Arial" pitchFamily="34" charset="0"/>
+              </a:rPr>
+              <a:t>Definir y monitorear m</a:t>
+            </a:r>
+            <a:r>
+              <a:rPr lang="es-ES" sz="1200" dirty="0" err="1">
+                <a:solidFill>
+                  <a:schemeClr val="accent5"/>
+                </a:solidFill>
+                <a:latin typeface="Arial" pitchFamily="34" charset="0"/>
+                <a:cs typeface="Arial" pitchFamily="34" charset="0"/>
+              </a:rPr>
+              <a:t>e</a:t>
+            </a:r>
+            <a:r>
+              <a:rPr lang="es-ES" sz="1200" kern="0" dirty="0" err="1">
+                <a:solidFill>
+                  <a:schemeClr val="accent5"/>
+                </a:solidFill>
+                <a:latin typeface="Arial" pitchFamily="34" charset="0"/>
+                <a:cs typeface="Arial" pitchFamily="34" charset="0"/>
+              </a:rPr>
+              <a:t>tricas</a:t>
+            </a:r>
+            <a:r>
+              <a:rPr lang="es-ES" sz="1200" kern="0" dirty="0">
+                <a:solidFill>
+                  <a:schemeClr val="accent5"/>
+                </a:solidFill>
+                <a:latin typeface="Arial" pitchFamily="34" charset="0"/>
+                <a:cs typeface="Arial" pitchFamily="34" charset="0"/>
+              </a:rPr>
+              <a:t> sobre el gobierno de datos </a:t>
+            </a:r>
+            <a:endParaRPr lang="es-MX" sz="1200" kern="0" dirty="0">
+              <a:solidFill>
+                <a:schemeClr val="accent5"/>
+              </a:solidFill>
+              <a:latin typeface="Arial" pitchFamily="34" charset="0"/>
+              <a:cs typeface="Arial" pitchFamily="34" charset="0"/>
+            </a:endParaRPr>
+          </a:p>
+        </p:txBody>
+      </p:sp>
+      <p:sp>
+        <p:nvSpPr>
+          <p:cNvPr id="11" name="Chevron 29">
+            <a:extLst>
+              <a:ext uri="{FF2B5EF4-FFF2-40B4-BE49-F238E27FC236}">
+                <a16:creationId xmlns:a16="http://schemas.microsoft.com/office/drawing/2014/main" id="{64434863-4937-970D-9AB1-4D424662384B}"/>
+              </a:ext>
+            </a:extLst>
+          </p:cNvPr>
+          <p:cNvSpPr>
+            <a:spLocks/>
+          </p:cNvSpPr>
+          <p:nvPr/>
+        </p:nvSpPr>
+        <p:spPr>
+          <a:xfrm>
+            <a:off x="8073469" y="1353498"/>
+            <a:ext cx="1967325" cy="1118769"/>
+          </a:xfrm>
+          <a:prstGeom prst="chevron">
+            <a:avLst>
+              <a:gd name="adj" fmla="val 21925"/>
+            </a:avLst>
+          </a:prstGeom>
+          <a:noFill/>
+          <a:ln w="19050">
+            <a:solidFill>
+              <a:srgbClr val="CB97FF"/>
+            </a:solidFill>
+          </a:ln>
+        </p:spPr>
+        <p:style>
+          <a:lnRef idx="2">
+            <a:schemeClr val="accent1">
+              <a:shade val="50000"/>
+            </a:schemeClr>
+          </a:lnRef>
+          <a:fillRef idx="1">
+            <a:schemeClr val="accent1"/>
+          </a:fillRef>
+          <a:effectRef idx="0">
+            <a:schemeClr val="accent1"/>
+          </a:effectRef>
+          <a:fontRef idx="minor">
+            <a:schemeClr val="lt1"/>
+          </a:fontRef>
+        </p:style>
+        <p:txBody>
+          <a:bodyPr rtlCol="0" anchor="t" anchorCtr="0"/>
+          <a:lstStyle/>
+          <a:p>
+            <a:pPr>
+              <a:spcBef>
+                <a:spcPts val="600"/>
+              </a:spcBef>
+              <a:buClr>
+                <a:schemeClr val="bg1"/>
+              </a:buClr>
+            </a:pPr>
+            <a:r>
+              <a:rPr lang="es-MX" b="1" dirty="0">
+                <a:solidFill>
+                  <a:srgbClr val="CB97FF"/>
+                </a:solidFill>
+                <a:latin typeface="Arial" pitchFamily="34" charset="0"/>
+                <a:cs typeface="Arial" pitchFamily="34" charset="0"/>
+              </a:rPr>
+              <a:t>Fas</a:t>
+            </a:r>
+            <a:r>
+              <a:rPr lang="es-MX" sz="1400" b="1" kern="0" dirty="0">
+                <a:solidFill>
+                  <a:srgbClr val="CB97FF"/>
+                </a:solidFill>
+                <a:latin typeface="Arial" pitchFamily="34" charset="0"/>
+                <a:cs typeface="Arial" pitchFamily="34" charset="0"/>
+              </a:rPr>
+              <a:t>e </a:t>
+            </a:r>
+            <a:r>
+              <a:rPr lang="es-MX" b="1" dirty="0">
+                <a:solidFill>
+                  <a:srgbClr val="CB97FF"/>
+                </a:solidFill>
+                <a:latin typeface="Arial" pitchFamily="34" charset="0"/>
+                <a:cs typeface="Arial" pitchFamily="34" charset="0"/>
+              </a:rPr>
+              <a:t>5</a:t>
+            </a:r>
+            <a:endParaRPr lang="es-MX" sz="1400" b="1" kern="0" dirty="0">
+              <a:solidFill>
+                <a:srgbClr val="CB97FF"/>
+              </a:solidFill>
+              <a:latin typeface="Arial" pitchFamily="34" charset="0"/>
+              <a:cs typeface="Arial" pitchFamily="34" charset="0"/>
+            </a:endParaRPr>
+          </a:p>
+          <a:p>
+            <a:pPr marL="0" lvl="1">
+              <a:spcBef>
+                <a:spcPts val="600"/>
+              </a:spcBef>
+              <a:buClr>
+                <a:schemeClr val="bg1"/>
+              </a:buClr>
+            </a:pPr>
+            <a:r>
+              <a:rPr lang="es-MX" sz="1200" kern="0" dirty="0">
+                <a:solidFill>
+                  <a:srgbClr val="CB97FF"/>
+                </a:solidFill>
+                <a:latin typeface="Arial" pitchFamily="34" charset="0"/>
+                <a:cs typeface="Arial" pitchFamily="34" charset="0"/>
+              </a:rPr>
+              <a:t>Gestión de riesgos y evaluación de activos </a:t>
+            </a:r>
+          </a:p>
+        </p:txBody>
+      </p:sp>
+      <p:sp>
+        <p:nvSpPr>
+          <p:cNvPr id="12" name="Chevron 29">
+            <a:extLst>
+              <a:ext uri="{FF2B5EF4-FFF2-40B4-BE49-F238E27FC236}">
+                <a16:creationId xmlns:a16="http://schemas.microsoft.com/office/drawing/2014/main" id="{CA67CD4F-E13C-E7A6-4D30-284EE1740554}"/>
+              </a:ext>
+            </a:extLst>
+          </p:cNvPr>
+          <p:cNvSpPr>
+            <a:spLocks/>
+          </p:cNvSpPr>
+          <p:nvPr/>
+        </p:nvSpPr>
+        <p:spPr>
+          <a:xfrm>
+            <a:off x="10072958" y="1353498"/>
+            <a:ext cx="1967325" cy="1118769"/>
+          </a:xfrm>
+          <a:prstGeom prst="chevron">
+            <a:avLst>
+              <a:gd name="adj" fmla="val 21925"/>
+            </a:avLst>
+          </a:prstGeom>
+          <a:noFill/>
+          <a:ln w="19050">
+            <a:solidFill>
+              <a:srgbClr val="FFC1C2"/>
+            </a:solidFill>
+          </a:ln>
+        </p:spPr>
+        <p:style>
+          <a:lnRef idx="2">
+            <a:schemeClr val="accent1">
+              <a:shade val="50000"/>
+            </a:schemeClr>
+          </a:lnRef>
+          <a:fillRef idx="1">
+            <a:schemeClr val="accent1"/>
+          </a:fillRef>
+          <a:effectRef idx="0">
+            <a:schemeClr val="accent1"/>
+          </a:effectRef>
+          <a:fontRef idx="minor">
+            <a:schemeClr val="lt1"/>
+          </a:fontRef>
+        </p:style>
+        <p:txBody>
+          <a:bodyPr rtlCol="0" anchor="t" anchorCtr="0"/>
+          <a:lstStyle/>
+          <a:p>
+            <a:pPr>
+              <a:spcBef>
+                <a:spcPts val="600"/>
+              </a:spcBef>
+              <a:buClr>
+                <a:schemeClr val="bg1"/>
+              </a:buClr>
+            </a:pPr>
+            <a:r>
+              <a:rPr lang="es-MX" sz="1400" b="1" kern="0" dirty="0">
+                <a:solidFill>
+                  <a:srgbClr val="FFC1C2"/>
+                </a:solidFill>
+                <a:latin typeface="Arial" pitchFamily="34" charset="0"/>
+                <a:cs typeface="Arial" pitchFamily="34" charset="0"/>
+              </a:rPr>
+              <a:t>Fase 6</a:t>
+            </a:r>
+          </a:p>
+          <a:p>
+            <a:pPr marL="0" lvl="1">
+              <a:spcBef>
+                <a:spcPts val="600"/>
+              </a:spcBef>
+              <a:buClr>
+                <a:schemeClr val="bg1"/>
+              </a:buClr>
+            </a:pPr>
+            <a:r>
+              <a:rPr lang="es-MX" sz="1200" kern="0" dirty="0">
+                <a:solidFill>
+                  <a:srgbClr val="FFC1C2"/>
+                </a:solidFill>
+                <a:latin typeface="Arial" pitchFamily="34" charset="0"/>
+                <a:cs typeface="Arial" pitchFamily="34" charset="0"/>
+              </a:rPr>
+              <a:t>Definir glosario, implementar solución</a:t>
+            </a:r>
+          </a:p>
+        </p:txBody>
+      </p:sp>
+      <p:sp>
+        <p:nvSpPr>
+          <p:cNvPr id="13" name="Content Placeholder 7">
+            <a:extLst>
+              <a:ext uri="{FF2B5EF4-FFF2-40B4-BE49-F238E27FC236}">
+                <a16:creationId xmlns:a16="http://schemas.microsoft.com/office/drawing/2014/main" id="{0CAD9C7F-FE42-C9F1-4BE2-E4A684C5B760}"/>
+              </a:ext>
+            </a:extLst>
+          </p:cNvPr>
+          <p:cNvSpPr txBox="1">
+            <a:spLocks/>
+          </p:cNvSpPr>
+          <p:nvPr/>
+        </p:nvSpPr>
+        <p:spPr bwMode="gray">
+          <a:xfrm>
+            <a:off x="1" y="2752873"/>
+            <a:ext cx="1967325" cy="3543921"/>
+          </a:xfrm>
+          <a:prstGeom prst="rect">
+            <a:avLst/>
+          </a:prstGeom>
+          <a:noFill/>
+          <a:ln w="9525">
+            <a:noFill/>
+            <a:miter lim="800000"/>
+            <a:headEnd/>
+            <a:tailEnd/>
+          </a:ln>
+          <a:effectLst/>
+        </p:spPr>
+        <p:txBody>
+          <a:bodyPr vert="horz" wrap="square" lIns="91440" tIns="46800" rIns="45720" bIns="46800" numCol="1" anchor="t" anchorCtr="0" compatLnSpc="1">
+            <a:prstTxWarp prst="textNoShape">
+              <a:avLst/>
+            </a:prstTxWarp>
+            <a:noAutofit/>
+          </a:bodyPr>
+          <a:lstStyle/>
+          <a:p>
+            <a:pPr fontAlgn="base">
+              <a:buClr>
+                <a:schemeClr val="bg1"/>
+              </a:buClr>
+              <a:defRPr/>
+            </a:pPr>
+            <a:r>
+              <a:rPr lang="es-MX" sz="1200" b="1" dirty="0">
+                <a:solidFill>
+                  <a:schemeClr val="accent1"/>
+                </a:solidFill>
+                <a:latin typeface="+mj-lt"/>
+                <a:cs typeface="Arial" pitchFamily="34" charset="0"/>
+              </a:rPr>
+              <a:t>A</a:t>
+            </a:r>
+            <a:r>
+              <a:rPr lang="es-MX" sz="1200" b="1" kern="0" dirty="0">
+                <a:solidFill>
+                  <a:schemeClr val="accent1"/>
+                </a:solidFill>
+                <a:latin typeface="+mj-lt"/>
+                <a:cs typeface="Arial" pitchFamily="34" charset="0"/>
+              </a:rPr>
+              <a:t>ctividades principales</a:t>
+            </a:r>
+          </a:p>
+          <a:p>
+            <a:pPr fontAlgn="base">
+              <a:buClr>
+                <a:schemeClr val="bg1"/>
+              </a:buClr>
+              <a:defRPr/>
+            </a:pPr>
+            <a:r>
+              <a:rPr lang="es-MX" sz="1200" b="1" kern="0" dirty="0">
+                <a:solidFill>
+                  <a:schemeClr val="accent1"/>
+                </a:solidFill>
+                <a:latin typeface="+mj-lt"/>
+                <a:cs typeface="Arial" pitchFamily="34" charset="0"/>
+              </a:rPr>
+              <a:t> </a:t>
+            </a:r>
+          </a:p>
+          <a:p>
+            <a:pPr marL="173736" indent="-173736" defTabSz="410291">
+              <a:buClr>
+                <a:schemeClr val="tx1"/>
+              </a:buClr>
+              <a:buSzPct val="100000"/>
+              <a:buFont typeface="Arial"/>
+              <a:buChar char="•"/>
+            </a:pPr>
+            <a:r>
+              <a:rPr lang="es-MX" sz="1200" dirty="0">
+                <a:latin typeface="+mj-lt"/>
+                <a:cs typeface="Arial"/>
+                <a:sym typeface="Arial"/>
+              </a:rPr>
+              <a:t>Definir claramente la </a:t>
+            </a:r>
+            <a:r>
+              <a:rPr lang="es-MX" sz="1200" dirty="0" err="1">
+                <a:latin typeface="+mj-lt"/>
+                <a:cs typeface="Arial"/>
+                <a:sym typeface="Arial"/>
+              </a:rPr>
+              <a:t>misi</a:t>
+            </a:r>
+            <a:r>
+              <a:rPr lang="es-ES" sz="1200" dirty="0" err="1">
+                <a:latin typeface="+mj-lt"/>
+                <a:cs typeface="Arial"/>
+                <a:sym typeface="Arial"/>
+              </a:rPr>
+              <a:t>ón</a:t>
+            </a:r>
+            <a:r>
+              <a:rPr lang="es-ES" sz="1200" dirty="0">
+                <a:latin typeface="+mj-lt"/>
+                <a:cs typeface="Arial"/>
+                <a:sym typeface="Arial"/>
+              </a:rPr>
+              <a:t> y la visión de la empresa</a:t>
+            </a:r>
+          </a:p>
+          <a:p>
+            <a:pPr marL="173736" indent="-173736" defTabSz="410291">
+              <a:buClr>
+                <a:schemeClr val="tx1"/>
+              </a:buClr>
+              <a:buSzPct val="100000"/>
+              <a:buFont typeface="Arial"/>
+              <a:buChar char="•"/>
+            </a:pPr>
+            <a:endParaRPr lang="es-ES" sz="1200" dirty="0">
+              <a:latin typeface="+mj-lt"/>
+            </a:endParaRPr>
+          </a:p>
+          <a:p>
+            <a:pPr marL="173736" indent="-173736" defTabSz="410291">
+              <a:buClr>
+                <a:schemeClr val="tx1"/>
+              </a:buClr>
+              <a:buSzPct val="100000"/>
+              <a:buFont typeface="Arial"/>
+              <a:buChar char="•"/>
+            </a:pPr>
+            <a:r>
+              <a:rPr lang="es-ES" sz="1200" dirty="0">
+                <a:latin typeface="+mj-lt"/>
+                <a:cs typeface="Arial"/>
+                <a:sym typeface="Arial"/>
+              </a:rPr>
+              <a:t>Establecer metas específicas y tiempos para alcanzarlas</a:t>
+            </a:r>
+          </a:p>
+          <a:p>
+            <a:pPr marL="173736" indent="-173736" defTabSz="410291">
+              <a:buClr>
+                <a:schemeClr val="tx1"/>
+              </a:buClr>
+              <a:buSzPct val="100000"/>
+              <a:buFont typeface="Arial"/>
+              <a:buChar char="•"/>
+            </a:pPr>
+            <a:endParaRPr lang="es-ES" sz="1200" dirty="0">
+              <a:latin typeface="+mj-lt"/>
+            </a:endParaRPr>
+          </a:p>
+          <a:p>
+            <a:pPr marL="173736" indent="-173736" defTabSz="410291">
+              <a:buClr>
+                <a:schemeClr val="tx1"/>
+              </a:buClr>
+              <a:buSzPct val="100000"/>
+              <a:buFont typeface="Arial"/>
+              <a:buChar char="•"/>
+            </a:pPr>
+            <a:r>
+              <a:rPr lang="es-MX" sz="1200" dirty="0">
+                <a:latin typeface="+mj-lt"/>
+                <a:cs typeface="Arial"/>
+                <a:sym typeface="Arial"/>
+              </a:rPr>
+              <a:t>Trazar la ruta/plan a nivel estratégico que permita alcanzar la visión y metas planteadas</a:t>
+            </a:r>
+            <a:endParaRPr lang="en-GB" sz="1200" b="1" kern="0" dirty="0">
+              <a:latin typeface="+mj-lt"/>
+              <a:cs typeface="Arial" pitchFamily="34" charset="0"/>
+            </a:endParaRPr>
+          </a:p>
+        </p:txBody>
+      </p:sp>
+      <p:sp>
+        <p:nvSpPr>
+          <p:cNvPr id="14" name="Content Placeholder 7">
+            <a:extLst>
+              <a:ext uri="{FF2B5EF4-FFF2-40B4-BE49-F238E27FC236}">
+                <a16:creationId xmlns:a16="http://schemas.microsoft.com/office/drawing/2014/main" id="{4735695D-53EA-9282-7DA9-F7B982DC90AA}"/>
+              </a:ext>
+            </a:extLst>
+          </p:cNvPr>
+          <p:cNvSpPr txBox="1">
+            <a:spLocks/>
+          </p:cNvSpPr>
+          <p:nvPr/>
+        </p:nvSpPr>
+        <p:spPr bwMode="gray">
+          <a:xfrm>
+            <a:off x="2064844" y="2752873"/>
+            <a:ext cx="1967325" cy="3543921"/>
+          </a:xfrm>
+          <a:prstGeom prst="rect">
+            <a:avLst/>
+          </a:prstGeom>
+          <a:noFill/>
+          <a:ln w="9525">
+            <a:noFill/>
+            <a:miter lim="800000"/>
+            <a:headEnd/>
+            <a:tailEnd/>
+          </a:ln>
+          <a:effectLst/>
+        </p:spPr>
+        <p:txBody>
+          <a:bodyPr vert="horz" wrap="square" lIns="91440" tIns="46800" rIns="45720" bIns="46800" numCol="1" anchor="t" anchorCtr="0" compatLnSpc="1">
+            <a:prstTxWarp prst="textNoShape">
+              <a:avLst/>
+            </a:prstTxWarp>
+            <a:noAutofit/>
+          </a:bodyPr>
+          <a:lstStyle/>
+          <a:p>
+            <a:pPr fontAlgn="base">
+              <a:buClr>
+                <a:schemeClr val="bg1"/>
+              </a:buClr>
+              <a:defRPr/>
+            </a:pPr>
+            <a:r>
+              <a:rPr lang="es-MX" sz="1200" b="1" dirty="0">
+                <a:solidFill>
+                  <a:srgbClr val="629DD1"/>
+                </a:solidFill>
+                <a:latin typeface="+mj-lt"/>
+                <a:cs typeface="Arial" pitchFamily="34" charset="0"/>
+              </a:rPr>
+              <a:t>A</a:t>
+            </a:r>
+            <a:r>
+              <a:rPr lang="es-MX" sz="1200" b="1" kern="0" dirty="0">
+                <a:solidFill>
+                  <a:srgbClr val="629DD1"/>
+                </a:solidFill>
+                <a:latin typeface="+mj-lt"/>
+                <a:cs typeface="Arial" pitchFamily="34" charset="0"/>
+              </a:rPr>
+              <a:t>ctividades principales</a:t>
+            </a:r>
+          </a:p>
+          <a:p>
+            <a:pPr fontAlgn="base">
+              <a:buClr>
+                <a:schemeClr val="bg1"/>
+              </a:buClr>
+              <a:defRPr/>
+            </a:pPr>
+            <a:r>
+              <a:rPr lang="es-MX" sz="1200" b="1" kern="0" dirty="0">
+                <a:solidFill>
+                  <a:srgbClr val="629DD1"/>
+                </a:solidFill>
+                <a:latin typeface="+mj-lt"/>
+                <a:cs typeface="Arial" pitchFamily="34" charset="0"/>
+              </a:rPr>
+              <a:t> </a:t>
+            </a:r>
+          </a:p>
+          <a:p>
+            <a:pPr marL="173736" indent="-173736" defTabSz="410291">
+              <a:buClr>
+                <a:schemeClr val="tx1"/>
+              </a:buClr>
+              <a:buSzPct val="100000"/>
+              <a:buFont typeface="Arial"/>
+              <a:buChar char="•"/>
+            </a:pPr>
+            <a:r>
+              <a:rPr lang="es-MX" sz="1200" dirty="0">
+                <a:latin typeface="+mj-lt"/>
+                <a:cs typeface="Arial"/>
+                <a:sym typeface="Arial"/>
+              </a:rPr>
+              <a:t>Definir </a:t>
+            </a:r>
+            <a:r>
+              <a:rPr lang="es-ES" sz="1200" dirty="0">
+                <a:latin typeface="+mj-lt"/>
+                <a:cs typeface="Arial"/>
+                <a:sym typeface="Arial"/>
+              </a:rPr>
+              <a:t>las políticas relacionadas con la adquisición, tratamiento y uso de datos enfocadas en que sean funcionales y compatibles con el Software para MDM Informática</a:t>
+            </a:r>
+          </a:p>
+          <a:p>
+            <a:pPr marL="173736" indent="-173736" defTabSz="410291">
+              <a:buClr>
+                <a:schemeClr val="tx1"/>
+              </a:buClr>
+              <a:buSzPct val="100000"/>
+              <a:buFont typeface="Arial"/>
+              <a:buChar char="•"/>
+            </a:pPr>
+            <a:endParaRPr lang="es-ES" sz="1200" dirty="0">
+              <a:latin typeface="+mj-lt"/>
+            </a:endParaRPr>
+          </a:p>
+        </p:txBody>
+      </p:sp>
+      <p:sp>
+        <p:nvSpPr>
+          <p:cNvPr id="15" name="Content Placeholder 7">
+            <a:extLst>
+              <a:ext uri="{FF2B5EF4-FFF2-40B4-BE49-F238E27FC236}">
+                <a16:creationId xmlns:a16="http://schemas.microsoft.com/office/drawing/2014/main" id="{0137873D-44C3-5413-35CD-88B027B08A3C}"/>
+              </a:ext>
+            </a:extLst>
+          </p:cNvPr>
+          <p:cNvSpPr txBox="1">
+            <a:spLocks/>
+          </p:cNvSpPr>
+          <p:nvPr/>
+        </p:nvSpPr>
+        <p:spPr bwMode="gray">
+          <a:xfrm>
+            <a:off x="4040390" y="2752873"/>
+            <a:ext cx="1967325" cy="3543921"/>
+          </a:xfrm>
+          <a:prstGeom prst="rect">
+            <a:avLst/>
+          </a:prstGeom>
+          <a:noFill/>
+          <a:ln w="9525">
+            <a:noFill/>
+            <a:miter lim="800000"/>
+            <a:headEnd/>
+            <a:tailEnd/>
+          </a:ln>
+          <a:effectLst/>
+        </p:spPr>
+        <p:txBody>
+          <a:bodyPr vert="horz" wrap="square" lIns="91440" tIns="46800" rIns="45720" bIns="46800" numCol="1" anchor="t" anchorCtr="0" compatLnSpc="1">
+            <a:prstTxWarp prst="textNoShape">
+              <a:avLst/>
+            </a:prstTxWarp>
+            <a:noAutofit/>
+          </a:bodyPr>
+          <a:lstStyle/>
+          <a:p>
+            <a:pPr fontAlgn="base">
+              <a:buClr>
+                <a:schemeClr val="bg1"/>
+              </a:buClr>
+              <a:defRPr/>
+            </a:pPr>
+            <a:r>
+              <a:rPr lang="es-MX" sz="1200" b="1" dirty="0">
+                <a:solidFill>
+                  <a:srgbClr val="C00000"/>
+                </a:solidFill>
+                <a:latin typeface="+mj-lt"/>
+                <a:cs typeface="Arial" pitchFamily="34" charset="0"/>
+              </a:rPr>
+              <a:t>A</a:t>
+            </a:r>
+            <a:r>
+              <a:rPr lang="es-MX" sz="1200" b="1" kern="0" dirty="0">
+                <a:solidFill>
+                  <a:srgbClr val="C00000"/>
+                </a:solidFill>
+                <a:latin typeface="+mj-lt"/>
+                <a:cs typeface="Arial" pitchFamily="34" charset="0"/>
+              </a:rPr>
+              <a:t>ctividades principales</a:t>
+            </a:r>
+          </a:p>
+          <a:p>
+            <a:pPr fontAlgn="base">
+              <a:buClr>
+                <a:schemeClr val="bg1"/>
+              </a:buClr>
+              <a:defRPr/>
+            </a:pPr>
+            <a:r>
+              <a:rPr lang="es-MX" sz="1200" b="1" kern="0" dirty="0">
+                <a:solidFill>
+                  <a:srgbClr val="7F8FA9"/>
+                </a:solidFill>
+                <a:latin typeface="+mj-lt"/>
+                <a:cs typeface="Arial" pitchFamily="34" charset="0"/>
+              </a:rPr>
+              <a:t> </a:t>
+            </a:r>
+          </a:p>
+          <a:p>
+            <a:pPr marL="173736" indent="-173736" defTabSz="410291">
+              <a:buClr>
+                <a:schemeClr val="tx1"/>
+              </a:buClr>
+              <a:buSzPct val="100000"/>
+              <a:buFont typeface="Arial"/>
+              <a:buChar char="•"/>
+            </a:pPr>
+            <a:r>
+              <a:rPr lang="es-ES" sz="1200" dirty="0">
+                <a:latin typeface="+mj-lt"/>
+                <a:cs typeface="Arial"/>
+                <a:sym typeface="Arial"/>
+              </a:rPr>
+              <a:t>Establecer una comunicación clara acerca de los cambios que se suscitarán</a:t>
+            </a:r>
+            <a:r>
+              <a:rPr lang="es-ES" sz="1200" dirty="0">
+                <a:latin typeface="+mj-lt"/>
+              </a:rPr>
+              <a:t> derivado de la implementación del nuevo software Informática </a:t>
+            </a:r>
+            <a:r>
+              <a:rPr lang="es-ES" sz="1200" dirty="0">
+                <a:latin typeface="+mj-lt"/>
+                <a:cs typeface="Arial"/>
+                <a:sym typeface="Arial"/>
+              </a:rPr>
+              <a:t> </a:t>
+            </a:r>
+          </a:p>
+          <a:p>
+            <a:pPr marL="173736" indent="-173736" defTabSz="410291">
+              <a:buClr>
+                <a:schemeClr val="tx1"/>
+              </a:buClr>
+              <a:buSzPct val="100000"/>
+              <a:buFont typeface="Arial"/>
+              <a:buChar char="•"/>
+            </a:pPr>
+            <a:endParaRPr lang="es-ES" sz="1200" dirty="0">
+              <a:latin typeface="+mj-lt"/>
+            </a:endParaRPr>
+          </a:p>
+          <a:p>
+            <a:pPr marL="173736" indent="-173736" defTabSz="410291">
+              <a:buClr>
+                <a:schemeClr val="tx1"/>
+              </a:buClr>
+              <a:buSzPct val="100000"/>
+              <a:buFont typeface="Arial"/>
+              <a:buChar char="•"/>
+            </a:pPr>
+            <a:r>
+              <a:rPr lang="es-ES" sz="1200" dirty="0">
+                <a:latin typeface="+mj-lt"/>
+                <a:cs typeface="Arial"/>
+                <a:sym typeface="Arial"/>
+              </a:rPr>
+              <a:t>Capacitar a todos los </a:t>
+            </a:r>
+            <a:r>
+              <a:rPr lang="es-ES" sz="1200" i="1" dirty="0" err="1">
+                <a:latin typeface="+mj-lt"/>
+                <a:cs typeface="Arial"/>
+                <a:sym typeface="Arial"/>
+              </a:rPr>
+              <a:t>stakeholders</a:t>
+            </a:r>
+            <a:r>
+              <a:rPr lang="es-ES" sz="1200" dirty="0">
+                <a:latin typeface="+mj-lt"/>
+                <a:cs typeface="Arial"/>
+                <a:sym typeface="Arial"/>
+              </a:rPr>
+              <a:t> involucrados en el cambio y dar las herramientas necesarias para la correcta adopción  </a:t>
+            </a:r>
+          </a:p>
+          <a:p>
+            <a:pPr marL="173736" indent="-173736" defTabSz="410291">
+              <a:buClr>
+                <a:schemeClr val="tx1"/>
+              </a:buClr>
+              <a:buSzPct val="100000"/>
+              <a:buFont typeface="Arial"/>
+              <a:buChar char="•"/>
+            </a:pPr>
+            <a:endParaRPr lang="es-ES" sz="1200" dirty="0">
+              <a:latin typeface="+mj-lt"/>
+            </a:endParaRPr>
+          </a:p>
+        </p:txBody>
+      </p:sp>
+      <p:sp>
+        <p:nvSpPr>
+          <p:cNvPr id="17" name="TextBox 16">
+            <a:extLst>
+              <a:ext uri="{FF2B5EF4-FFF2-40B4-BE49-F238E27FC236}">
+                <a16:creationId xmlns:a16="http://schemas.microsoft.com/office/drawing/2014/main" id="{81F212FA-6DEA-1529-C15D-CFA273934AEE}"/>
+              </a:ext>
+            </a:extLst>
+          </p:cNvPr>
+          <p:cNvSpPr txBox="1"/>
+          <p:nvPr/>
+        </p:nvSpPr>
+        <p:spPr>
+          <a:xfrm>
+            <a:off x="4238281" y="1022708"/>
+            <a:ext cx="1459335" cy="307776"/>
+          </a:xfrm>
+          <a:prstGeom prst="rect">
+            <a:avLst/>
+          </a:prstGeom>
+          <a:noFill/>
+        </p:spPr>
+        <p:txBody>
+          <a:bodyPr wrap="square">
+            <a:spAutoFit/>
+          </a:bodyPr>
+          <a:lstStyle/>
+          <a:p>
+            <a:pPr algn="ctr"/>
+            <a:r>
+              <a:rPr lang="es-MX" sz="800" kern="0" dirty="0">
+                <a:solidFill>
+                  <a:srgbClr val="C00000"/>
+                </a:solidFill>
+                <a:latin typeface="Arial" pitchFamily="34" charset="0"/>
+                <a:cs typeface="Arial" pitchFamily="34" charset="0"/>
+              </a:rPr>
+              <a:t>Principal cambio respecto a </a:t>
+            </a:r>
+            <a:r>
+              <a:rPr lang="es-MX" sz="800" i="1" kern="0" dirty="0" err="1">
+                <a:solidFill>
+                  <a:srgbClr val="C00000"/>
+                </a:solidFill>
+                <a:latin typeface="Arial" pitchFamily="34" charset="0"/>
+                <a:cs typeface="Arial" pitchFamily="34" charset="0"/>
+              </a:rPr>
+              <a:t>Roadmap</a:t>
+            </a:r>
+            <a:r>
+              <a:rPr lang="es-MX" sz="800" i="1" kern="0" dirty="0">
+                <a:solidFill>
+                  <a:srgbClr val="C00000"/>
+                </a:solidFill>
+                <a:latin typeface="Arial" pitchFamily="34" charset="0"/>
+                <a:cs typeface="Arial" pitchFamily="34" charset="0"/>
+              </a:rPr>
+              <a:t> </a:t>
+            </a:r>
+            <a:r>
+              <a:rPr lang="es-MX" sz="800" kern="0" dirty="0">
+                <a:solidFill>
+                  <a:srgbClr val="C00000"/>
+                </a:solidFill>
+                <a:latin typeface="Arial" pitchFamily="34" charset="0"/>
+                <a:cs typeface="Arial" pitchFamily="34" charset="0"/>
+              </a:rPr>
+              <a:t>original</a:t>
+            </a:r>
+            <a:endParaRPr lang="es-MX" sz="800" dirty="0"/>
+          </a:p>
+        </p:txBody>
+      </p:sp>
+      <p:sp>
+        <p:nvSpPr>
+          <p:cNvPr id="18" name="Content Placeholder 7">
+            <a:extLst>
+              <a:ext uri="{FF2B5EF4-FFF2-40B4-BE49-F238E27FC236}">
+                <a16:creationId xmlns:a16="http://schemas.microsoft.com/office/drawing/2014/main" id="{BE6F80C1-46B7-A460-30E2-D7E5156EB326}"/>
+              </a:ext>
+            </a:extLst>
+          </p:cNvPr>
+          <p:cNvSpPr txBox="1">
+            <a:spLocks/>
+          </p:cNvSpPr>
+          <p:nvPr/>
+        </p:nvSpPr>
+        <p:spPr bwMode="gray">
+          <a:xfrm>
+            <a:off x="6085817" y="2752873"/>
+            <a:ext cx="1967325" cy="3543921"/>
+          </a:xfrm>
+          <a:prstGeom prst="rect">
+            <a:avLst/>
+          </a:prstGeom>
+          <a:noFill/>
+          <a:ln w="9525">
+            <a:noFill/>
+            <a:miter lim="800000"/>
+            <a:headEnd/>
+            <a:tailEnd/>
+          </a:ln>
+          <a:effectLst/>
+        </p:spPr>
+        <p:txBody>
+          <a:bodyPr vert="horz" wrap="square" lIns="91440" tIns="46800" rIns="45720" bIns="46800" numCol="1" anchor="t" anchorCtr="0" compatLnSpc="1">
+            <a:prstTxWarp prst="textNoShape">
+              <a:avLst/>
+            </a:prstTxWarp>
+            <a:noAutofit/>
+          </a:bodyPr>
+          <a:lstStyle/>
+          <a:p>
+            <a:pPr fontAlgn="base">
+              <a:buClr>
+                <a:schemeClr val="bg1"/>
+              </a:buClr>
+              <a:defRPr/>
+            </a:pPr>
+            <a:r>
+              <a:rPr lang="es-MX" sz="1200" b="1" dirty="0">
+                <a:solidFill>
+                  <a:srgbClr val="5AA2AE"/>
+                </a:solidFill>
+                <a:latin typeface="+mj-lt"/>
+                <a:cs typeface="Arial" pitchFamily="34" charset="0"/>
+              </a:rPr>
+              <a:t>A</a:t>
+            </a:r>
+            <a:r>
+              <a:rPr lang="es-MX" sz="1200" b="1" kern="0" dirty="0">
+                <a:solidFill>
+                  <a:srgbClr val="5AA2AE"/>
+                </a:solidFill>
+                <a:latin typeface="+mj-lt"/>
+                <a:cs typeface="Arial" pitchFamily="34" charset="0"/>
+              </a:rPr>
+              <a:t>ctividades principales</a:t>
+            </a:r>
+          </a:p>
+          <a:p>
+            <a:pPr fontAlgn="base">
+              <a:buClr>
+                <a:schemeClr val="bg1"/>
+              </a:buClr>
+              <a:defRPr/>
+            </a:pPr>
+            <a:r>
+              <a:rPr lang="es-MX" sz="1200" b="1" kern="0" dirty="0">
+                <a:solidFill>
+                  <a:srgbClr val="7F8FA9"/>
+                </a:solidFill>
+                <a:latin typeface="+mj-lt"/>
+                <a:cs typeface="Arial" pitchFamily="34" charset="0"/>
+              </a:rPr>
+              <a:t> </a:t>
+            </a:r>
+          </a:p>
+          <a:p>
+            <a:pPr marL="173736" indent="-173736" defTabSz="410291">
+              <a:buClr>
+                <a:schemeClr val="tx1"/>
+              </a:buClr>
+              <a:buSzPct val="100000"/>
+              <a:buFont typeface="Arial"/>
+              <a:buChar char="•"/>
+            </a:pPr>
+            <a:r>
+              <a:rPr lang="es-ES" sz="1200" dirty="0">
+                <a:latin typeface="+mj-lt"/>
+                <a:cs typeface="Arial"/>
+                <a:sym typeface="Arial"/>
+              </a:rPr>
+              <a:t>Definir métricas claras y medibles para cuantificar el éxito de las políticas de datos y la implementación del nuevo MDM </a:t>
+            </a:r>
+          </a:p>
+          <a:p>
+            <a:pPr marL="173736" indent="-173736" defTabSz="410291">
+              <a:buClr>
+                <a:schemeClr val="tx1"/>
+              </a:buClr>
+              <a:buSzPct val="100000"/>
+              <a:buFont typeface="Arial"/>
+              <a:buChar char="•"/>
+            </a:pPr>
+            <a:endParaRPr lang="es-ES" sz="1200" dirty="0">
+              <a:latin typeface="+mj-lt"/>
+            </a:endParaRPr>
+          </a:p>
+          <a:p>
+            <a:pPr marL="173736" indent="-173736" defTabSz="410291">
+              <a:buClr>
+                <a:schemeClr val="tx1"/>
+              </a:buClr>
+              <a:buSzPct val="100000"/>
+              <a:buFont typeface="Arial"/>
+              <a:buChar char="•"/>
+            </a:pPr>
+            <a:r>
+              <a:rPr lang="es-ES" sz="1200" dirty="0">
+                <a:latin typeface="+mj-lt"/>
+                <a:cs typeface="Arial"/>
+                <a:sym typeface="Arial"/>
+              </a:rPr>
+              <a:t>Dar seguimiento continuo al cumplimiento de las políticas de uso y tratamiento de datos en concordancia con las soluciones provistas por el Software informática </a:t>
+            </a:r>
+          </a:p>
+          <a:p>
+            <a:pPr marL="173736" indent="-173736" defTabSz="410291">
+              <a:buClr>
+                <a:schemeClr val="tx1"/>
+              </a:buClr>
+              <a:buSzPct val="100000"/>
+              <a:buFont typeface="Arial"/>
+              <a:buChar char="•"/>
+            </a:pPr>
+            <a:endParaRPr lang="es-ES" sz="1200" dirty="0">
+              <a:latin typeface="+mj-lt"/>
+            </a:endParaRPr>
+          </a:p>
+        </p:txBody>
+      </p:sp>
+      <p:sp>
+        <p:nvSpPr>
+          <p:cNvPr id="19" name="Content Placeholder 7">
+            <a:extLst>
+              <a:ext uri="{FF2B5EF4-FFF2-40B4-BE49-F238E27FC236}">
+                <a16:creationId xmlns:a16="http://schemas.microsoft.com/office/drawing/2014/main" id="{4633F45D-11FC-5CE3-4A9D-245A11B072B6}"/>
+              </a:ext>
+            </a:extLst>
+          </p:cNvPr>
+          <p:cNvSpPr txBox="1">
+            <a:spLocks/>
+          </p:cNvSpPr>
+          <p:nvPr/>
+        </p:nvSpPr>
+        <p:spPr bwMode="gray">
+          <a:xfrm>
+            <a:off x="8084223" y="2752873"/>
+            <a:ext cx="1967325" cy="3543921"/>
+          </a:xfrm>
+          <a:prstGeom prst="rect">
+            <a:avLst/>
+          </a:prstGeom>
+          <a:noFill/>
+          <a:ln w="9525">
+            <a:noFill/>
+            <a:miter lim="800000"/>
+            <a:headEnd/>
+            <a:tailEnd/>
+          </a:ln>
+          <a:effectLst/>
+        </p:spPr>
+        <p:txBody>
+          <a:bodyPr vert="horz" wrap="square" lIns="91440" tIns="46800" rIns="45720" bIns="46800" numCol="1" anchor="t" anchorCtr="0" compatLnSpc="1">
+            <a:prstTxWarp prst="textNoShape">
+              <a:avLst/>
+            </a:prstTxWarp>
+            <a:noAutofit/>
+          </a:bodyPr>
+          <a:lstStyle/>
+          <a:p>
+            <a:pPr fontAlgn="base">
+              <a:buClr>
+                <a:schemeClr val="bg1"/>
+              </a:buClr>
+              <a:defRPr/>
+            </a:pPr>
+            <a:r>
+              <a:rPr lang="es-MX" sz="1200" b="1" dirty="0">
+                <a:solidFill>
+                  <a:srgbClr val="CB97FF"/>
+                </a:solidFill>
+                <a:latin typeface="+mj-lt"/>
+                <a:cs typeface="Arial" pitchFamily="34" charset="0"/>
+              </a:rPr>
+              <a:t>A</a:t>
+            </a:r>
+            <a:r>
+              <a:rPr lang="es-MX" sz="1200" b="1" kern="0" dirty="0">
+                <a:solidFill>
+                  <a:srgbClr val="CB97FF"/>
+                </a:solidFill>
+                <a:latin typeface="+mj-lt"/>
+                <a:cs typeface="Arial" pitchFamily="34" charset="0"/>
+              </a:rPr>
+              <a:t>ctividades principales</a:t>
+            </a:r>
+          </a:p>
+          <a:p>
+            <a:pPr fontAlgn="base">
+              <a:buClr>
+                <a:schemeClr val="bg1"/>
+              </a:buClr>
+              <a:defRPr/>
+            </a:pPr>
+            <a:r>
+              <a:rPr lang="es-MX" sz="1200" b="1" kern="0" dirty="0">
+                <a:solidFill>
+                  <a:srgbClr val="7F8FA9"/>
+                </a:solidFill>
+                <a:latin typeface="+mj-lt"/>
+                <a:cs typeface="Arial" pitchFamily="34" charset="0"/>
+              </a:rPr>
+              <a:t> </a:t>
+            </a:r>
+          </a:p>
+          <a:p>
+            <a:pPr marL="173736" indent="-173736" defTabSz="410291">
+              <a:buClr>
+                <a:schemeClr val="tx1"/>
+              </a:buClr>
+              <a:buSzPct val="100000"/>
+              <a:buFont typeface="Arial"/>
+              <a:buChar char="•"/>
+            </a:pPr>
+            <a:r>
+              <a:rPr lang="es-ES" sz="1200" dirty="0">
+                <a:latin typeface="+mj-lt"/>
+                <a:cs typeface="Arial"/>
+                <a:sym typeface="Arial"/>
+              </a:rPr>
+              <a:t>Contar con una metodología clara para todos sobre el tratamiento de los riesgos y la evaluación de activos </a:t>
+            </a:r>
+          </a:p>
+          <a:p>
+            <a:pPr marL="173736" indent="-173736" defTabSz="410291">
+              <a:buClr>
+                <a:schemeClr val="tx1"/>
+              </a:buClr>
+              <a:buSzPct val="100000"/>
+              <a:buFont typeface="Arial"/>
+              <a:buChar char="•"/>
+            </a:pPr>
+            <a:endParaRPr lang="es-ES" sz="1200" dirty="0">
+              <a:latin typeface="+mj-lt"/>
+            </a:endParaRPr>
+          </a:p>
+          <a:p>
+            <a:pPr marL="173736" indent="-173736" defTabSz="410291">
+              <a:buClr>
+                <a:schemeClr val="tx1"/>
+              </a:buClr>
+              <a:buSzPct val="100000"/>
+              <a:buFont typeface="Arial"/>
+              <a:buChar char="•"/>
+            </a:pPr>
+            <a:endParaRPr lang="es-ES" sz="1200" dirty="0">
+              <a:latin typeface="+mj-lt"/>
+            </a:endParaRPr>
+          </a:p>
+        </p:txBody>
+      </p:sp>
+      <p:sp>
+        <p:nvSpPr>
+          <p:cNvPr id="20" name="Content Placeholder 7">
+            <a:extLst>
+              <a:ext uri="{FF2B5EF4-FFF2-40B4-BE49-F238E27FC236}">
+                <a16:creationId xmlns:a16="http://schemas.microsoft.com/office/drawing/2014/main" id="{15821912-76FF-72F0-CC4C-06702852173F}"/>
+              </a:ext>
+            </a:extLst>
+          </p:cNvPr>
+          <p:cNvSpPr txBox="1">
+            <a:spLocks/>
+          </p:cNvSpPr>
+          <p:nvPr/>
+        </p:nvSpPr>
+        <p:spPr bwMode="gray">
+          <a:xfrm>
+            <a:off x="10106790" y="2752873"/>
+            <a:ext cx="1967325" cy="3543921"/>
+          </a:xfrm>
+          <a:prstGeom prst="rect">
+            <a:avLst/>
+          </a:prstGeom>
+          <a:noFill/>
+          <a:ln w="9525">
+            <a:noFill/>
+            <a:miter lim="800000"/>
+            <a:headEnd/>
+            <a:tailEnd/>
+          </a:ln>
+          <a:effectLst/>
+        </p:spPr>
+        <p:txBody>
+          <a:bodyPr vert="horz" wrap="square" lIns="91440" tIns="46800" rIns="45720" bIns="46800" numCol="1" anchor="t" anchorCtr="0" compatLnSpc="1">
+            <a:prstTxWarp prst="textNoShape">
+              <a:avLst/>
+            </a:prstTxWarp>
+            <a:noAutofit/>
+          </a:bodyPr>
+          <a:lstStyle/>
+          <a:p>
+            <a:pPr fontAlgn="base">
+              <a:buClr>
+                <a:schemeClr val="bg1"/>
+              </a:buClr>
+              <a:defRPr/>
+            </a:pPr>
+            <a:r>
+              <a:rPr lang="es-MX" sz="1200" b="1" dirty="0">
+                <a:solidFill>
+                  <a:srgbClr val="FFC1C2"/>
+                </a:solidFill>
+                <a:latin typeface="+mj-lt"/>
+                <a:cs typeface="Arial" pitchFamily="34" charset="0"/>
+              </a:rPr>
+              <a:t>A</a:t>
+            </a:r>
+            <a:r>
+              <a:rPr lang="es-MX" sz="1200" b="1" kern="0" dirty="0">
+                <a:solidFill>
+                  <a:srgbClr val="FFC1C2"/>
+                </a:solidFill>
+                <a:latin typeface="+mj-lt"/>
+                <a:cs typeface="Arial" pitchFamily="34" charset="0"/>
+              </a:rPr>
+              <a:t>ctividades principales</a:t>
+            </a:r>
+          </a:p>
+          <a:p>
+            <a:pPr fontAlgn="base">
+              <a:buClr>
+                <a:schemeClr val="bg1"/>
+              </a:buClr>
+              <a:defRPr/>
+            </a:pPr>
+            <a:r>
+              <a:rPr lang="es-MX" sz="1200" b="1" kern="0" dirty="0">
+                <a:solidFill>
+                  <a:srgbClr val="7F8FA9"/>
+                </a:solidFill>
+                <a:latin typeface="+mj-lt"/>
+                <a:cs typeface="Arial" pitchFamily="34" charset="0"/>
+              </a:rPr>
+              <a:t> </a:t>
+            </a:r>
+          </a:p>
+          <a:p>
+            <a:pPr marL="173736" indent="-173736" defTabSz="410291">
+              <a:buClr>
+                <a:schemeClr val="tx1"/>
+              </a:buClr>
+              <a:buSzPct val="100000"/>
+              <a:buFont typeface="Arial"/>
+              <a:buChar char="•"/>
+            </a:pPr>
+            <a:r>
+              <a:rPr lang="es-ES" sz="1200" dirty="0">
+                <a:latin typeface="+mj-lt"/>
+                <a:cs typeface="Arial"/>
+                <a:sym typeface="Arial"/>
+              </a:rPr>
+              <a:t>Implementar gradualmente el cambio de MDM en la compañía, adaptando proceso a </a:t>
+            </a:r>
+            <a:r>
+              <a:rPr lang="es-ES" sz="1200" dirty="0">
+                <a:latin typeface="+mj-lt"/>
+              </a:rPr>
+              <a:t>la par y definiendo glosario de términos comunes </a:t>
+            </a:r>
+            <a:endParaRPr lang="es-ES" sz="1200" dirty="0">
+              <a:latin typeface="+mj-lt"/>
+              <a:cs typeface="Arial"/>
+              <a:sym typeface="Arial"/>
+            </a:endParaRPr>
+          </a:p>
+          <a:p>
+            <a:pPr marL="173736" indent="-173736" defTabSz="410291">
+              <a:buClr>
+                <a:schemeClr val="tx1"/>
+              </a:buClr>
+              <a:buSzPct val="100000"/>
+              <a:buFont typeface="Arial"/>
+              <a:buChar char="•"/>
+            </a:pPr>
+            <a:endParaRPr lang="es-ES" sz="1200" dirty="0">
+              <a:latin typeface="+mj-lt"/>
+            </a:endParaRPr>
+          </a:p>
+          <a:p>
+            <a:pPr marL="173736" indent="-173736" defTabSz="410291">
+              <a:buClr>
+                <a:schemeClr val="tx1"/>
+              </a:buClr>
+              <a:buSzPct val="100000"/>
+              <a:buFont typeface="Arial"/>
+              <a:buChar char="•"/>
+            </a:pPr>
+            <a:endParaRPr lang="es-ES" sz="1200" dirty="0">
+              <a:latin typeface="+mj-lt"/>
+            </a:endParaRPr>
+          </a:p>
+        </p:txBody>
+      </p:sp>
+      <p:pic>
+        <p:nvPicPr>
+          <p:cNvPr id="21" name="Picture 4">
+            <a:extLst>
+              <a:ext uri="{FF2B5EF4-FFF2-40B4-BE49-F238E27FC236}">
+                <a16:creationId xmlns:a16="http://schemas.microsoft.com/office/drawing/2014/main" id="{447AD836-5470-D550-8BCB-4C12076E2BE2}"/>
+              </a:ext>
+            </a:extLst>
+          </p:cNvPr>
+          <p:cNvPicPr>
+            <a:picLocks noChangeAspect="1"/>
+          </p:cNvPicPr>
+          <p:nvPr/>
+        </p:nvPicPr>
+        <p:blipFill>
+          <a:blip r:embed="rId2">
+            <a:duotone>
+              <a:schemeClr val="accent1">
+                <a:shade val="45000"/>
+                <a:satMod val="135000"/>
+              </a:schemeClr>
+              <a:prstClr val="white"/>
+            </a:duotone>
+            <a:extLst>
+              <a:ext uri="{28A0092B-C50C-407E-A947-70E740481C1C}">
+                <a14:useLocalDpi xmlns:a14="http://schemas.microsoft.com/office/drawing/2010/main" val="0"/>
+              </a:ext>
+            </a:extLst>
+          </a:blip>
+          <a:srcRect/>
+          <a:stretch>
+            <a:fillRect/>
+          </a:stretch>
+        </p:blipFill>
+        <p:spPr bwMode="auto">
+          <a:xfrm>
+            <a:off x="10578081" y="5246709"/>
+            <a:ext cx="1566886" cy="1036190"/>
+          </a:xfrm>
+          <a:prstGeom prst="rect">
+            <a:avLst/>
+          </a:prstGeom>
+          <a:noFill/>
+          <a:ln>
+            <a:noFill/>
+          </a:ln>
+          <a:extLst>
+            <a:ext uri="{909E8E84-426E-40DD-AFC4-6F175D3DCCD1}">
+              <a14:hiddenFill xmlns:a14="http://schemas.microsoft.com/office/drawing/2010/main">
+                <a:solidFill>
+                  <a:srgbClr val="FFFFFF"/>
+                </a:solidFill>
+              </a14:hiddenFill>
+            </a:ext>
+            <a:ext uri="{91240B29-F687-4F45-9708-019B960494DF}">
+              <a14:hiddenLine xmlns:a14="http://schemas.microsoft.com/office/drawing/2010/main" w="9525">
+                <a:solidFill>
+                  <a:srgbClr val="000000"/>
+                </a:solidFill>
+                <a:miter lim="800000"/>
+                <a:headEnd/>
+                <a:tailEnd/>
+              </a14:hiddenLine>
+            </a:ext>
+          </a:extLst>
+        </p:spPr>
+      </p:pic>
     </p:spTree>
     <p:extLst>
       <p:ext uri="{BB962C8B-B14F-4D97-AF65-F5344CB8AC3E}">

</xml_diff>